<commit_message>
added some explanatory slides and added slide numbers
</commit_message>
<xml_diff>
--- a/assets/ppt/intro/in1-evangelize-compilers.pptx
+++ b/assets/ppt/intro/in1-evangelize-compilers.pptx
@@ -5,29 +5,30 @@
     <p:sldMasterId id="2147483660" r:id="rId1"/>
   </p:sldMasterIdLst>
   <p:notesMasterIdLst>
-    <p:notesMasterId r:id="rId22"/>
+    <p:notesMasterId r:id="rId23"/>
   </p:notesMasterIdLst>
   <p:sldIdLst>
     <p:sldId id="256" r:id="rId2"/>
     <p:sldId id="257" r:id="rId3"/>
     <p:sldId id="258" r:id="rId4"/>
     <p:sldId id="259" r:id="rId5"/>
-    <p:sldId id="260" r:id="rId6"/>
-    <p:sldId id="261" r:id="rId7"/>
-    <p:sldId id="262" r:id="rId8"/>
-    <p:sldId id="263" r:id="rId9"/>
-    <p:sldId id="264" r:id="rId10"/>
-    <p:sldId id="265" r:id="rId11"/>
-    <p:sldId id="266" r:id="rId12"/>
-    <p:sldId id="267" r:id="rId13"/>
-    <p:sldId id="268" r:id="rId14"/>
-    <p:sldId id="269" r:id="rId15"/>
-    <p:sldId id="270" r:id="rId16"/>
-    <p:sldId id="271" r:id="rId17"/>
-    <p:sldId id="272" r:id="rId18"/>
-    <p:sldId id="273" r:id="rId19"/>
-    <p:sldId id="274" r:id="rId20"/>
-    <p:sldId id="275" r:id="rId21"/>
+    <p:sldId id="276" r:id="rId6"/>
+    <p:sldId id="260" r:id="rId7"/>
+    <p:sldId id="261" r:id="rId8"/>
+    <p:sldId id="262" r:id="rId9"/>
+    <p:sldId id="263" r:id="rId10"/>
+    <p:sldId id="264" r:id="rId11"/>
+    <p:sldId id="265" r:id="rId12"/>
+    <p:sldId id="266" r:id="rId13"/>
+    <p:sldId id="267" r:id="rId14"/>
+    <p:sldId id="268" r:id="rId15"/>
+    <p:sldId id="269" r:id="rId16"/>
+    <p:sldId id="270" r:id="rId17"/>
+    <p:sldId id="271" r:id="rId18"/>
+    <p:sldId id="272" r:id="rId19"/>
+    <p:sldId id="273" r:id="rId20"/>
+    <p:sldId id="274" r:id="rId21"/>
+    <p:sldId id="275" r:id="rId22"/>
   </p:sldIdLst>
   <p:sldSz cx="9144000" cy="6858000" type="screen4x3"/>
   <p:notesSz cx="6858000" cy="9144000"/>
@@ -233,6 +234,11 @@
       </a:defRPr>
     </a:lvl9pPr>
   </p:defaultTextStyle>
+  <p:extLst>
+    <p:ext uri="{EFAFB233-063F-42B5-8137-9DF3F51BA10A}">
+      <p15:sldGuideLst xmlns:p15="http://schemas.microsoft.com/office/powerpoint/2012/main"/>
+    </p:ext>
+  </p:extLst>
 </p:presentation>
 </file>
 
@@ -4649,7 +4655,7 @@
               <a:rPr lang="en-US"/>
               <a:t>‹#›</a:t>
             </a:fld>
-            <a:endParaRPr lang="en-US"/>
+            <a:endParaRPr lang="en-US" dirty="0"/>
           </a:p>
         </p:txBody>
       </p:sp>
@@ -6761,7 +6767,7 @@
     <p:sldLayoutId id="2147483658" r:id="rId11"/>
     <p:sldLayoutId id="2147483659" r:id="rId12"/>
   </p:sldLayoutIdLst>
-  <p:hf sldNum="0" hdr="0" ftr="0" dt="0"/>
+  <p:hf hdr="0" ftr="0" dt="0"/>
   <p:txStyles>
     <p:titleStyle>
       <a:defPPr marR="0" lvl="0" algn="l" rtl="0">
@@ -7492,6 +7498,41 @@
           </a:p>
         </p:txBody>
       </p:sp>
+      <p:sp>
+        <p:nvSpPr>
+          <p:cNvPr id="2" name="Slide Number Placeholder 1">
+            <a:extLst>
+              <a:ext uri="{FF2B5EF4-FFF2-40B4-BE49-F238E27FC236}">
+                <a16:creationId xmlns:a16="http://schemas.microsoft.com/office/drawing/2014/main" id="{0A25E998-DC2E-3A49-B675-6BE8E3289241}"/>
+              </a:ext>
+            </a:extLst>
+          </p:cNvPr>
+          <p:cNvSpPr>
+            <a:spLocks noGrp="1"/>
+          </p:cNvSpPr>
+          <p:nvPr>
+            <p:ph type="sldNum" idx="12"/>
+          </p:nvPr>
+        </p:nvSpPr>
+        <p:spPr/>
+        <p:txBody>
+          <a:bodyPr/>
+          <a:lstStyle/>
+          <a:p>
+            <a:pPr lvl="0">
+              <a:spcBef>
+                <a:spcPts val="0"/>
+              </a:spcBef>
+              <a:buNone/>
+            </a:pPr>
+            <a:fld id="{00000000-1234-1234-1234-123412341234}" type="slidenum">
+              <a:rPr lang="en-US" smtClean="0"/>
+              <a:t>1</a:t>
+            </a:fld>
+            <a:endParaRPr lang="en-US"/>
+          </a:p>
+        </p:txBody>
+      </p:sp>
     </p:spTree>
   </p:cSld>
   <p:clrMapOvr>
@@ -7505,7 +7546,7 @@
   <p:cSld>
     <p:spTree>
       <p:nvGrpSpPr>
-        <p:cNvPr id="1" name="Shape 119"/>
+        <p:cNvPr id="1" name="Shape 113"/>
         <p:cNvGrpSpPr/>
         <p:nvPr/>
       </p:nvGrpSpPr>
@@ -7519,7 +7560,7 @@
       </p:grpSpPr>
       <p:sp>
         <p:nvSpPr>
-          <p:cNvPr id="120" name="Shape 120"/>
+          <p:cNvPr id="114" name="Shape 114"/>
           <p:cNvSpPr txBox="1">
             <a:spLocks noGrp="1"/>
           </p:cNvSpPr>
@@ -7574,7 +7615,7 @@
       </p:sp>
       <p:sp>
         <p:nvSpPr>
-          <p:cNvPr id="121" name="Shape 121"/>
+          <p:cNvPr id="115" name="Shape 115"/>
           <p:cNvSpPr txBox="1">
             <a:spLocks noGrp="1"/>
           </p:cNvSpPr>
@@ -7602,6 +7643,9 @@
           <a:lstStyle/>
           <a:p>
             <a:pPr marL="342900" marR="0" lvl="0" indent="-342900" algn="l" rtl="0">
+              <a:lnSpc>
+                <a:spcPct val="90000"/>
+              </a:lnSpc>
               <a:spcBef>
                 <a:spcPts val="0"/>
               </a:spcBef>
@@ -7625,11 +7669,14 @@
                 <a:cs typeface="Calibri"/>
                 <a:sym typeface="Calibri"/>
               </a:rPr>
-              <a:t>Situation 6: The “software engineers” at your company have decided to redesign the entire code base to make it easier to add to the codebase. How do you ensure things do not get worse?</a:t>
+              <a:t>Situation 5: You have to communicate with a new router that has a telnet interface and a proprietary command language. You need to parse the responses in this language and look for patterns and produce new commands.</a:t>
             </a:r>
           </a:p>
           <a:p>
             <a:pPr marL="742950" marR="0" lvl="1" indent="-285750" algn="l" rtl="0">
+              <a:lnSpc>
+                <a:spcPct val="90000"/>
+              </a:lnSpc>
               <a:spcBef>
                 <a:spcPts val="560"/>
               </a:spcBef>
@@ -7665,11 +7712,14 @@
                 <a:cs typeface="Calibri"/>
                 <a:sym typeface="Calibri"/>
               </a:rPr>
-              <a:t>Fire all the “software engineers”</a:t>
+              <a:t>Perl. It's a swiss army knife. You can use it to sidestep this problem with honor, by disemboweling yourself.</a:t>
             </a:r>
           </a:p>
           <a:p>
             <a:pPr marL="742950" marR="0" lvl="1" indent="-285750" algn="l" rtl="0">
+              <a:lnSpc>
+                <a:spcPct val="90000"/>
+              </a:lnSpc>
               <a:spcBef>
                 <a:spcPts val="560"/>
               </a:spcBef>
@@ -7692,6 +7742,58 @@
               </a:rPr>
               <a:t>Steve’s real answer: Lexing and parsing and codegen</a:t>
             </a:r>
+          </a:p>
+        </p:txBody>
+      </p:sp>
+      <p:sp>
+        <p:nvSpPr>
+          <p:cNvPr id="2" name="Slide Number Placeholder 1">
+            <a:extLst>
+              <a:ext uri="{FF2B5EF4-FFF2-40B4-BE49-F238E27FC236}">
+                <a16:creationId xmlns:a16="http://schemas.microsoft.com/office/drawing/2014/main" id="{804FB430-AC6F-8540-8DE1-CF447B5EABD8}"/>
+              </a:ext>
+            </a:extLst>
+          </p:cNvPr>
+          <p:cNvSpPr>
+            <a:spLocks noGrp="1"/>
+          </p:cNvSpPr>
+          <p:nvPr>
+            <p:ph type="sldNum" idx="12"/>
+          </p:nvPr>
+        </p:nvSpPr>
+        <p:spPr/>
+        <p:txBody>
+          <a:bodyPr/>
+          <a:lstStyle/>
+          <a:p>
+            <a:pPr marL="0" marR="0" lvl="0" indent="0" algn="r" rtl="0">
+              <a:spcBef>
+                <a:spcPts val="0"/>
+              </a:spcBef>
+              <a:buSzPct val="25000"/>
+              <a:buNone/>
+            </a:pPr>
+            <a:fld id="{00000000-1234-1234-1234-123412341234}" type="slidenum">
+              <a:rPr lang="en-US" sz="1200" smtClean="0">
+                <a:solidFill>
+                  <a:srgbClr val="888888"/>
+                </a:solidFill>
+                <a:latin typeface="Calibri"/>
+                <a:ea typeface="Calibri"/>
+                <a:cs typeface="Calibri"/>
+                <a:sym typeface="Calibri"/>
+              </a:rPr>
+              <a:t>10</a:t>
+            </a:fld>
+            <a:endParaRPr lang="en-US" sz="1200">
+              <a:solidFill>
+                <a:srgbClr val="888888"/>
+              </a:solidFill>
+              <a:latin typeface="Calibri"/>
+              <a:ea typeface="Calibri"/>
+              <a:cs typeface="Calibri"/>
+              <a:sym typeface="Calibri"/>
+            </a:endParaRPr>
           </a:p>
         </p:txBody>
       </p:sp>
@@ -7708,7 +7810,7 @@
   <p:cSld>
     <p:spTree>
       <p:nvGrpSpPr>
-        <p:cNvPr id="1" name="Shape 125"/>
+        <p:cNvPr id="1" name="Shape 119"/>
         <p:cNvGrpSpPr/>
         <p:nvPr/>
       </p:nvGrpSpPr>
@@ -7722,7 +7824,7 @@
       </p:grpSpPr>
       <p:sp>
         <p:nvSpPr>
-          <p:cNvPr id="126" name="Shape 126"/>
+          <p:cNvPr id="120" name="Shape 120"/>
           <p:cNvSpPr txBox="1">
             <a:spLocks noGrp="1"/>
           </p:cNvSpPr>
@@ -7777,7 +7879,7 @@
       </p:sp>
       <p:sp>
         <p:nvSpPr>
-          <p:cNvPr id="127" name="Shape 127"/>
+          <p:cNvPr id="121" name="Shape 121"/>
           <p:cNvSpPr txBox="1">
             <a:spLocks noGrp="1"/>
           </p:cNvSpPr>
@@ -7828,7 +7930,7 @@
                 <a:cs typeface="Calibri"/>
                 <a:sym typeface="Calibri"/>
               </a:rPr>
-              <a:t>Situation 7: In order to remove a security hole in your Ruby on Rails website you have to make a set of non-trivial changes to the code to replace one idiom with another in your entire codebase.</a:t>
+              <a:t>Situation 6: The “software engineers” at your company have decided to redesign the entire code base to make it easier to add to the codebase. How do you ensure things do not get worse?</a:t>
             </a:r>
           </a:p>
           <a:p>
@@ -7868,7 +7970,7 @@
                 <a:cs typeface="Calibri"/>
                 <a:sym typeface="Calibri"/>
               </a:rPr>
-              <a:t>Fix it by hand. Hell, you only have about 10k lines of code for your whole site.</a:t>
+              <a:t>Fire all the “software engineers”</a:t>
             </a:r>
           </a:p>
           <a:p>
@@ -7895,6 +7997,58 @@
               </a:rPr>
               <a:t>Steve’s real answer: Lexing and parsing and codegen</a:t>
             </a:r>
+          </a:p>
+        </p:txBody>
+      </p:sp>
+      <p:sp>
+        <p:nvSpPr>
+          <p:cNvPr id="2" name="Slide Number Placeholder 1">
+            <a:extLst>
+              <a:ext uri="{FF2B5EF4-FFF2-40B4-BE49-F238E27FC236}">
+                <a16:creationId xmlns:a16="http://schemas.microsoft.com/office/drawing/2014/main" id="{17863400-17BE-F64D-9B46-0EBD34DDFFD4}"/>
+              </a:ext>
+            </a:extLst>
+          </p:cNvPr>
+          <p:cNvSpPr>
+            <a:spLocks noGrp="1"/>
+          </p:cNvSpPr>
+          <p:nvPr>
+            <p:ph type="sldNum" idx="12"/>
+          </p:nvPr>
+        </p:nvSpPr>
+        <p:spPr/>
+        <p:txBody>
+          <a:bodyPr/>
+          <a:lstStyle/>
+          <a:p>
+            <a:pPr marL="0" marR="0" lvl="0" indent="0" algn="r" rtl="0">
+              <a:spcBef>
+                <a:spcPts val="0"/>
+              </a:spcBef>
+              <a:buSzPct val="25000"/>
+              <a:buNone/>
+            </a:pPr>
+            <a:fld id="{00000000-1234-1234-1234-123412341234}" type="slidenum">
+              <a:rPr lang="en-US" sz="1200" smtClean="0">
+                <a:solidFill>
+                  <a:srgbClr val="888888"/>
+                </a:solidFill>
+                <a:latin typeface="Calibri"/>
+                <a:ea typeface="Calibri"/>
+                <a:cs typeface="Calibri"/>
+                <a:sym typeface="Calibri"/>
+              </a:rPr>
+              <a:t>11</a:t>
+            </a:fld>
+            <a:endParaRPr lang="en-US" sz="1200">
+              <a:solidFill>
+                <a:srgbClr val="888888"/>
+              </a:solidFill>
+              <a:latin typeface="Calibri"/>
+              <a:ea typeface="Calibri"/>
+              <a:cs typeface="Calibri"/>
+              <a:sym typeface="Calibri"/>
+            </a:endParaRPr>
           </a:p>
         </p:txBody>
       </p:sp>
@@ -7907,6 +8061,261 @@
 </file>
 
 <file path=ppt/slides/slide12.xml><?xml version="1.0" encoding="utf-8"?>
+<p:sld xmlns:a="http://schemas.openxmlformats.org/drawingml/2006/main" xmlns:r="http://schemas.openxmlformats.org/officeDocument/2006/relationships" xmlns:p="http://schemas.openxmlformats.org/presentationml/2006/main">
+  <p:cSld>
+    <p:spTree>
+      <p:nvGrpSpPr>
+        <p:cNvPr id="1" name="Shape 125"/>
+        <p:cNvGrpSpPr/>
+        <p:nvPr/>
+      </p:nvGrpSpPr>
+      <p:grpSpPr>
+        <a:xfrm>
+          <a:off x="0" y="0"/>
+          <a:ext cx="0" cy="0"/>
+          <a:chOff x="0" y="0"/>
+          <a:chExt cx="0" cy="0"/>
+        </a:xfrm>
+      </p:grpSpPr>
+      <p:sp>
+        <p:nvSpPr>
+          <p:cNvPr id="126" name="Shape 126"/>
+          <p:cNvSpPr txBox="1">
+            <a:spLocks noGrp="1"/>
+          </p:cNvSpPr>
+          <p:nvPr>
+            <p:ph type="title"/>
+          </p:nvPr>
+        </p:nvSpPr>
+        <p:spPr>
+          <a:xfrm>
+            <a:off x="457200" y="274637"/>
+            <a:ext cx="8229600" cy="1143000"/>
+          </a:xfrm>
+          <a:prstGeom prst="rect">
+            <a:avLst/>
+          </a:prstGeom>
+          <a:noFill/>
+          <a:ln>
+            <a:noFill/>
+          </a:ln>
+        </p:spPr>
+        <p:txBody>
+          <a:bodyPr lIns="91425" tIns="45700" rIns="91425" bIns="45700" anchor="ctr" anchorCtr="0">
+            <a:noAutofit/>
+          </a:bodyPr>
+          <a:lstStyle/>
+          <a:p>
+            <a:pPr marL="0" marR="0" lvl="0" indent="0" algn="ctr" rtl="0">
+              <a:spcBef>
+                <a:spcPts val="0"/>
+              </a:spcBef>
+              <a:buClr>
+                <a:schemeClr val="dk1"/>
+              </a:buClr>
+              <a:buSzPct val="25000"/>
+              <a:buFont typeface="Calibri"/>
+              <a:buNone/>
+            </a:pPr>
+            <a:r>
+              <a:rPr lang="en-US" sz="3959" b="0" i="0" u="none" strike="noStrike" cap="none">
+                <a:solidFill>
+                  <a:schemeClr val="dk1"/>
+                </a:solidFill>
+                <a:latin typeface="Calibri"/>
+                <a:ea typeface="Calibri"/>
+                <a:cs typeface="Calibri"/>
+                <a:sym typeface="Calibri"/>
+              </a:rPr>
+              <a:t>Rich Programmer Food, Steve Yegge</a:t>
+            </a:r>
+          </a:p>
+        </p:txBody>
+      </p:sp>
+      <p:sp>
+        <p:nvSpPr>
+          <p:cNvPr id="127" name="Shape 127"/>
+          <p:cNvSpPr txBox="1">
+            <a:spLocks noGrp="1"/>
+          </p:cNvSpPr>
+          <p:nvPr>
+            <p:ph type="body" idx="1"/>
+          </p:nvPr>
+        </p:nvSpPr>
+        <p:spPr>
+          <a:xfrm>
+            <a:off x="457200" y="1600200"/>
+            <a:ext cx="8229600" cy="4525963"/>
+          </a:xfrm>
+          <a:prstGeom prst="rect">
+            <a:avLst/>
+          </a:prstGeom>
+          <a:noFill/>
+          <a:ln>
+            <a:noFill/>
+          </a:ln>
+        </p:spPr>
+        <p:txBody>
+          <a:bodyPr lIns="91425" tIns="45700" rIns="91425" bIns="45700" anchor="t" anchorCtr="0">
+            <a:noAutofit/>
+          </a:bodyPr>
+          <a:lstStyle/>
+          <a:p>
+            <a:pPr marL="342900" marR="0" lvl="0" indent="-342900" algn="l" rtl="0">
+              <a:spcBef>
+                <a:spcPts val="0"/>
+              </a:spcBef>
+              <a:spcAft>
+                <a:spcPts val="0"/>
+              </a:spcAft>
+              <a:buClr>
+                <a:schemeClr val="dk1"/>
+              </a:buClr>
+              <a:buSzPct val="100000"/>
+              <a:buFont typeface="Arial"/>
+              <a:buChar char="•"/>
+            </a:pPr>
+            <a:r>
+              <a:rPr lang="en-US" sz="3200" b="0" i="0" u="none" strike="noStrike" cap="none">
+                <a:solidFill>
+                  <a:schemeClr val="dk1"/>
+                </a:solidFill>
+                <a:latin typeface="Calibri"/>
+                <a:ea typeface="Calibri"/>
+                <a:cs typeface="Calibri"/>
+                <a:sym typeface="Calibri"/>
+              </a:rPr>
+              <a:t>Situation 7: In order to remove a security hole in your Ruby on Rails website you have to make a set of non-trivial changes to the code to replace one idiom with another in your entire codebase.</a:t>
+            </a:r>
+          </a:p>
+          <a:p>
+            <a:pPr marL="742950" marR="0" lvl="1" indent="-285750" algn="l" rtl="0">
+              <a:spcBef>
+                <a:spcPts val="560"/>
+              </a:spcBef>
+              <a:spcAft>
+                <a:spcPts val="0"/>
+              </a:spcAft>
+              <a:buClr>
+                <a:srgbClr val="000000"/>
+              </a:buClr>
+              <a:buSzPct val="100000"/>
+              <a:buFont typeface="Arial"/>
+              <a:buChar char="–"/>
+            </a:pPr>
+            <a:r>
+              <a:rPr lang="en-US" sz="2800" b="0" i="0" u="none" strike="noStrike" cap="none">
+                <a:solidFill>
+                  <a:srgbClr val="000000"/>
+                </a:solidFill>
+                <a:latin typeface="Calibri"/>
+                <a:ea typeface="Calibri"/>
+                <a:cs typeface="Calibri"/>
+                <a:sym typeface="Calibri"/>
+              </a:rPr>
+              <a:t>Steve’s answer: </a:t>
+            </a:r>
+            <a:r>
+              <a:rPr lang="en-US" sz="2800" b="0" i="0" u="none" strike="noStrike" cap="none">
+                <a:solidFill>
+                  <a:srgbClr val="1F497D"/>
+                </a:solidFill>
+                <a:latin typeface="Calibri"/>
+                <a:ea typeface="Calibri"/>
+                <a:cs typeface="Calibri"/>
+                <a:sym typeface="Calibri"/>
+              </a:rPr>
+              <a:t>Fix it by hand. Hell, you only have about 10k lines of code for your whole site.</a:t>
+            </a:r>
+          </a:p>
+          <a:p>
+            <a:pPr marL="742950" marR="0" lvl="1" indent="-285750" algn="l" rtl="0">
+              <a:spcBef>
+                <a:spcPts val="560"/>
+              </a:spcBef>
+              <a:buClr>
+                <a:schemeClr val="dk1"/>
+              </a:buClr>
+              <a:buSzPct val="100000"/>
+              <a:buFont typeface="Arial"/>
+              <a:buChar char="–"/>
+            </a:pPr>
+            <a:r>
+              <a:rPr lang="en-US" sz="2800" b="0" i="0" u="none" strike="noStrike" cap="none">
+                <a:solidFill>
+                  <a:schemeClr val="dk1"/>
+                </a:solidFill>
+                <a:latin typeface="Calibri"/>
+                <a:ea typeface="Calibri"/>
+                <a:cs typeface="Calibri"/>
+                <a:sym typeface="Calibri"/>
+              </a:rPr>
+              <a:t>Steve’s real answer: Lexing and parsing and codegen</a:t>
+            </a:r>
+          </a:p>
+        </p:txBody>
+      </p:sp>
+      <p:sp>
+        <p:nvSpPr>
+          <p:cNvPr id="2" name="Slide Number Placeholder 1">
+            <a:extLst>
+              <a:ext uri="{FF2B5EF4-FFF2-40B4-BE49-F238E27FC236}">
+                <a16:creationId xmlns:a16="http://schemas.microsoft.com/office/drawing/2014/main" id="{D658FE81-5A02-A24B-9A35-086AF25255DA}"/>
+              </a:ext>
+            </a:extLst>
+          </p:cNvPr>
+          <p:cNvSpPr>
+            <a:spLocks noGrp="1"/>
+          </p:cNvSpPr>
+          <p:nvPr>
+            <p:ph type="sldNum" idx="12"/>
+          </p:nvPr>
+        </p:nvSpPr>
+        <p:spPr/>
+        <p:txBody>
+          <a:bodyPr/>
+          <a:lstStyle/>
+          <a:p>
+            <a:pPr marL="0" marR="0" lvl="0" indent="0" algn="r" rtl="0">
+              <a:spcBef>
+                <a:spcPts val="0"/>
+              </a:spcBef>
+              <a:buSzPct val="25000"/>
+              <a:buNone/>
+            </a:pPr>
+            <a:fld id="{00000000-1234-1234-1234-123412341234}" type="slidenum">
+              <a:rPr lang="en-US" sz="1200" smtClean="0">
+                <a:solidFill>
+                  <a:srgbClr val="888888"/>
+                </a:solidFill>
+                <a:latin typeface="Calibri"/>
+                <a:ea typeface="Calibri"/>
+                <a:cs typeface="Calibri"/>
+                <a:sym typeface="Calibri"/>
+              </a:rPr>
+              <a:t>12</a:t>
+            </a:fld>
+            <a:endParaRPr lang="en-US" sz="1200">
+              <a:solidFill>
+                <a:srgbClr val="888888"/>
+              </a:solidFill>
+              <a:latin typeface="Calibri"/>
+              <a:ea typeface="Calibri"/>
+              <a:cs typeface="Calibri"/>
+              <a:sym typeface="Calibri"/>
+            </a:endParaRPr>
+          </a:p>
+        </p:txBody>
+      </p:sp>
+    </p:spTree>
+  </p:cSld>
+  <p:clrMapOvr>
+    <a:masterClrMapping/>
+  </p:clrMapOvr>
+</p:sld>
+</file>
+
+<file path=ppt/slides/slide13.xml><?xml version="1.0" encoding="utf-8"?>
 <p:sld xmlns:a="http://schemas.openxmlformats.org/drawingml/2006/main" xmlns:r="http://schemas.openxmlformats.org/officeDocument/2006/relationships" xmlns:p="http://schemas.openxmlformats.org/presentationml/2006/main">
   <p:cSld>
     <p:spTree>
@@ -8147,6 +8556,41 @@
           </a:p>
         </p:txBody>
       </p:sp>
+      <p:sp>
+        <p:nvSpPr>
+          <p:cNvPr id="2" name="Slide Number Placeholder 1">
+            <a:extLst>
+              <a:ext uri="{FF2B5EF4-FFF2-40B4-BE49-F238E27FC236}">
+                <a16:creationId xmlns:a16="http://schemas.microsoft.com/office/drawing/2014/main" id="{0725394C-C88C-9743-9705-BEF9A4E7D78F}"/>
+              </a:ext>
+            </a:extLst>
+          </p:cNvPr>
+          <p:cNvSpPr>
+            <a:spLocks noGrp="1"/>
+          </p:cNvSpPr>
+          <p:nvPr>
+            <p:ph type="sldNum" idx="12"/>
+          </p:nvPr>
+        </p:nvSpPr>
+        <p:spPr/>
+        <p:txBody>
+          <a:bodyPr/>
+          <a:lstStyle/>
+          <a:p>
+            <a:pPr lvl="0">
+              <a:spcBef>
+                <a:spcPts val="0"/>
+              </a:spcBef>
+              <a:buNone/>
+            </a:pPr>
+            <a:fld id="{00000000-1234-1234-1234-123412341234}" type="slidenum">
+              <a:rPr lang="en-US" smtClean="0"/>
+              <a:t>13</a:t>
+            </a:fld>
+            <a:endParaRPr lang="en-US"/>
+          </a:p>
+        </p:txBody>
+      </p:sp>
     </p:spTree>
   </p:cSld>
   <p:clrMapOvr>
@@ -8155,7 +8599,7 @@
 </p:sld>
 </file>
 
-<file path=ppt/slides/slide13.xml><?xml version="1.0" encoding="utf-8"?>
+<file path=ppt/slides/slide14.xml><?xml version="1.0" encoding="utf-8"?>
 <p:sld xmlns:a="http://schemas.openxmlformats.org/drawingml/2006/main" xmlns:r="http://schemas.openxmlformats.org/officeDocument/2006/relationships" xmlns:p="http://schemas.openxmlformats.org/presentationml/2006/main">
   <p:cSld>
     <p:spTree>
@@ -8685,6 +9129,41 @@
           </a:p>
         </p:txBody>
       </p:sp>
+      <p:sp>
+        <p:nvSpPr>
+          <p:cNvPr id="2" name="Slide Number Placeholder 1">
+            <a:extLst>
+              <a:ext uri="{FF2B5EF4-FFF2-40B4-BE49-F238E27FC236}">
+                <a16:creationId xmlns:a16="http://schemas.microsoft.com/office/drawing/2014/main" id="{27B0CA46-DA8B-4D49-87B7-AE5E0C038CDC}"/>
+              </a:ext>
+            </a:extLst>
+          </p:cNvPr>
+          <p:cNvSpPr>
+            <a:spLocks noGrp="1"/>
+          </p:cNvSpPr>
+          <p:nvPr>
+            <p:ph type="sldNum" idx="12"/>
+          </p:nvPr>
+        </p:nvSpPr>
+        <p:spPr/>
+        <p:txBody>
+          <a:bodyPr/>
+          <a:lstStyle/>
+          <a:p>
+            <a:pPr lvl="0">
+              <a:spcBef>
+                <a:spcPts val="0"/>
+              </a:spcBef>
+              <a:buNone/>
+            </a:pPr>
+            <a:fld id="{00000000-1234-1234-1234-123412341234}" type="slidenum">
+              <a:rPr lang="en-US" smtClean="0"/>
+              <a:t>14</a:t>
+            </a:fld>
+            <a:endParaRPr lang="en-US"/>
+          </a:p>
+        </p:txBody>
+      </p:sp>
     </p:spTree>
   </p:cSld>
   <p:clrMapOvr>
@@ -8693,7 +9172,7 @@
 </p:sld>
 </file>
 
-<file path=ppt/slides/slide14.xml><?xml version="1.0" encoding="utf-8"?>
+<file path=ppt/slides/slide15.xml><?xml version="1.0" encoding="utf-8"?>
 <p:sld xmlns:a="http://schemas.openxmlformats.org/drawingml/2006/main" xmlns:r="http://schemas.openxmlformats.org/officeDocument/2006/relationships" xmlns:p="http://schemas.openxmlformats.org/presentationml/2006/main">
   <p:cSld>
     <p:spTree>
@@ -9249,6 +9728,58 @@
           </a:p>
         </p:txBody>
       </p:sp>
+      <p:sp>
+        <p:nvSpPr>
+          <p:cNvPr id="2" name="Slide Number Placeholder 1">
+            <a:extLst>
+              <a:ext uri="{FF2B5EF4-FFF2-40B4-BE49-F238E27FC236}">
+                <a16:creationId xmlns:a16="http://schemas.microsoft.com/office/drawing/2014/main" id="{6935F94B-ECE0-9B4D-8561-4FE0DFE0F53B}"/>
+              </a:ext>
+            </a:extLst>
+          </p:cNvPr>
+          <p:cNvSpPr>
+            <a:spLocks noGrp="1"/>
+          </p:cNvSpPr>
+          <p:nvPr>
+            <p:ph type="sldNum" idx="12"/>
+          </p:nvPr>
+        </p:nvSpPr>
+        <p:spPr/>
+        <p:txBody>
+          <a:bodyPr/>
+          <a:lstStyle/>
+          <a:p>
+            <a:pPr marL="0" marR="0" lvl="0" indent="0" algn="r" rtl="0">
+              <a:spcBef>
+                <a:spcPts val="0"/>
+              </a:spcBef>
+              <a:buSzPct val="25000"/>
+              <a:buNone/>
+            </a:pPr>
+            <a:fld id="{00000000-1234-1234-1234-123412341234}" type="slidenum">
+              <a:rPr lang="en-US" sz="1200" smtClean="0">
+                <a:solidFill>
+                  <a:srgbClr val="888888"/>
+                </a:solidFill>
+                <a:latin typeface="Calibri"/>
+                <a:ea typeface="Calibri"/>
+                <a:cs typeface="Calibri"/>
+                <a:sym typeface="Calibri"/>
+              </a:rPr>
+              <a:t>15</a:t>
+            </a:fld>
+            <a:endParaRPr lang="en-US" sz="1200">
+              <a:solidFill>
+                <a:srgbClr val="888888"/>
+              </a:solidFill>
+              <a:latin typeface="Calibri"/>
+              <a:ea typeface="Calibri"/>
+              <a:cs typeface="Calibri"/>
+              <a:sym typeface="Calibri"/>
+            </a:endParaRPr>
+          </a:p>
+        </p:txBody>
+      </p:sp>
     </p:spTree>
   </p:cSld>
   <p:clrMapOvr>
@@ -9257,7 +9788,7 @@
 </p:sld>
 </file>
 
-<file path=ppt/slides/slide15.xml><?xml version="1.0" encoding="utf-8"?>
+<file path=ppt/slides/slide16.xml><?xml version="1.0" encoding="utf-8"?>
 <p:sld xmlns:a="http://schemas.openxmlformats.org/drawingml/2006/main" xmlns:r="http://schemas.openxmlformats.org/officeDocument/2006/relationships" xmlns:p="http://schemas.openxmlformats.org/presentationml/2006/main">
   <p:cSld>
     <p:spTree>
@@ -9573,6 +10104,58 @@
           </a:p>
         </p:txBody>
       </p:sp>
+      <p:sp>
+        <p:nvSpPr>
+          <p:cNvPr id="2" name="Slide Number Placeholder 1">
+            <a:extLst>
+              <a:ext uri="{FF2B5EF4-FFF2-40B4-BE49-F238E27FC236}">
+                <a16:creationId xmlns:a16="http://schemas.microsoft.com/office/drawing/2014/main" id="{0360C1A4-D7AC-5F47-B4EE-B598E320EBCB}"/>
+              </a:ext>
+            </a:extLst>
+          </p:cNvPr>
+          <p:cNvSpPr>
+            <a:spLocks noGrp="1"/>
+          </p:cNvSpPr>
+          <p:nvPr>
+            <p:ph type="sldNum" idx="12"/>
+          </p:nvPr>
+        </p:nvSpPr>
+        <p:spPr/>
+        <p:txBody>
+          <a:bodyPr/>
+          <a:lstStyle/>
+          <a:p>
+            <a:pPr marL="0" marR="0" lvl="0" indent="0" algn="r" rtl="0">
+              <a:spcBef>
+                <a:spcPts val="0"/>
+              </a:spcBef>
+              <a:buSzPct val="25000"/>
+              <a:buNone/>
+            </a:pPr>
+            <a:fld id="{00000000-1234-1234-1234-123412341234}" type="slidenum">
+              <a:rPr lang="en-US" sz="1200" smtClean="0">
+                <a:solidFill>
+                  <a:srgbClr val="888888"/>
+                </a:solidFill>
+                <a:latin typeface="Calibri"/>
+                <a:ea typeface="Calibri"/>
+                <a:cs typeface="Calibri"/>
+                <a:sym typeface="Calibri"/>
+              </a:rPr>
+              <a:t>16</a:t>
+            </a:fld>
+            <a:endParaRPr lang="en-US" sz="1200">
+              <a:solidFill>
+                <a:srgbClr val="888888"/>
+              </a:solidFill>
+              <a:latin typeface="Calibri"/>
+              <a:ea typeface="Calibri"/>
+              <a:cs typeface="Calibri"/>
+              <a:sym typeface="Calibri"/>
+            </a:endParaRPr>
+          </a:p>
+        </p:txBody>
+      </p:sp>
     </p:spTree>
   </p:cSld>
   <p:clrMapOvr>
@@ -9581,7 +10164,7 @@
 </p:sld>
 </file>
 
-<file path=ppt/slides/slide16.xml><?xml version="1.0" encoding="utf-8"?>
+<file path=ppt/slides/slide17.xml><?xml version="1.0" encoding="utf-8"?>
 <p:sld xmlns:a="http://schemas.openxmlformats.org/drawingml/2006/main" xmlns:r="http://schemas.openxmlformats.org/officeDocument/2006/relationships" xmlns:p="http://schemas.openxmlformats.org/presentationml/2006/main">
   <p:cSld>
     <p:spTree>
@@ -9928,6 +10511,58 @@
           </a:p>
         </p:txBody>
       </p:sp>
+      <p:sp>
+        <p:nvSpPr>
+          <p:cNvPr id="2" name="Slide Number Placeholder 1">
+            <a:extLst>
+              <a:ext uri="{FF2B5EF4-FFF2-40B4-BE49-F238E27FC236}">
+                <a16:creationId xmlns:a16="http://schemas.microsoft.com/office/drawing/2014/main" id="{02E2DBF2-028C-5541-881E-59EC5E934E8C}"/>
+              </a:ext>
+            </a:extLst>
+          </p:cNvPr>
+          <p:cNvSpPr>
+            <a:spLocks noGrp="1"/>
+          </p:cNvSpPr>
+          <p:nvPr>
+            <p:ph type="sldNum" idx="12"/>
+          </p:nvPr>
+        </p:nvSpPr>
+        <p:spPr/>
+        <p:txBody>
+          <a:bodyPr/>
+          <a:lstStyle/>
+          <a:p>
+            <a:pPr marL="0" marR="0" lvl="0" indent="0" algn="r" rtl="0">
+              <a:spcBef>
+                <a:spcPts val="0"/>
+              </a:spcBef>
+              <a:buSzPct val="25000"/>
+              <a:buNone/>
+            </a:pPr>
+            <a:fld id="{00000000-1234-1234-1234-123412341234}" type="slidenum">
+              <a:rPr lang="en-US" sz="1200" smtClean="0">
+                <a:solidFill>
+                  <a:srgbClr val="888888"/>
+                </a:solidFill>
+                <a:latin typeface="Calibri"/>
+                <a:ea typeface="Calibri"/>
+                <a:cs typeface="Calibri"/>
+                <a:sym typeface="Calibri"/>
+              </a:rPr>
+              <a:t>17</a:t>
+            </a:fld>
+            <a:endParaRPr lang="en-US" sz="1200">
+              <a:solidFill>
+                <a:srgbClr val="888888"/>
+              </a:solidFill>
+              <a:latin typeface="Calibri"/>
+              <a:ea typeface="Calibri"/>
+              <a:cs typeface="Calibri"/>
+              <a:sym typeface="Calibri"/>
+            </a:endParaRPr>
+          </a:p>
+        </p:txBody>
+      </p:sp>
     </p:spTree>
   </p:cSld>
   <p:clrMapOvr>
@@ -9936,7 +10571,7 @@
 </p:sld>
 </file>
 
-<file path=ppt/slides/slide17.xml><?xml version="1.0" encoding="utf-8"?>
+<file path=ppt/slides/slide18.xml><?xml version="1.0" encoding="utf-8"?>
 <p:sld xmlns:a="http://schemas.openxmlformats.org/drawingml/2006/main" xmlns:r="http://schemas.openxmlformats.org/officeDocument/2006/relationships" xmlns:p="http://schemas.openxmlformats.org/presentationml/2006/main">
   <p:cSld>
     <p:spTree>
@@ -10232,6 +10867,58 @@
           </a:p>
         </p:txBody>
       </p:sp>
+      <p:sp>
+        <p:nvSpPr>
+          <p:cNvPr id="2" name="Slide Number Placeholder 1">
+            <a:extLst>
+              <a:ext uri="{FF2B5EF4-FFF2-40B4-BE49-F238E27FC236}">
+                <a16:creationId xmlns:a16="http://schemas.microsoft.com/office/drawing/2014/main" id="{ECF54312-725F-8348-94F4-66F711EE3687}"/>
+              </a:ext>
+            </a:extLst>
+          </p:cNvPr>
+          <p:cNvSpPr>
+            <a:spLocks noGrp="1"/>
+          </p:cNvSpPr>
+          <p:nvPr>
+            <p:ph type="sldNum" idx="12"/>
+          </p:nvPr>
+        </p:nvSpPr>
+        <p:spPr/>
+        <p:txBody>
+          <a:bodyPr/>
+          <a:lstStyle/>
+          <a:p>
+            <a:pPr marL="0" marR="0" lvl="0" indent="0" algn="r" rtl="0">
+              <a:spcBef>
+                <a:spcPts val="0"/>
+              </a:spcBef>
+              <a:buSzPct val="25000"/>
+              <a:buNone/>
+            </a:pPr>
+            <a:fld id="{00000000-1234-1234-1234-123412341234}" type="slidenum">
+              <a:rPr lang="en-US" sz="1200" smtClean="0">
+                <a:solidFill>
+                  <a:srgbClr val="888888"/>
+                </a:solidFill>
+                <a:latin typeface="Calibri"/>
+                <a:ea typeface="Calibri"/>
+                <a:cs typeface="Calibri"/>
+                <a:sym typeface="Calibri"/>
+              </a:rPr>
+              <a:t>18</a:t>
+            </a:fld>
+            <a:endParaRPr lang="en-US" sz="1200">
+              <a:solidFill>
+                <a:srgbClr val="888888"/>
+              </a:solidFill>
+              <a:latin typeface="Calibri"/>
+              <a:ea typeface="Calibri"/>
+              <a:cs typeface="Calibri"/>
+              <a:sym typeface="Calibri"/>
+            </a:endParaRPr>
+          </a:p>
+        </p:txBody>
+      </p:sp>
     </p:spTree>
   </p:cSld>
   <p:clrMapOvr>
@@ -10240,7 +10927,7 @@
 </p:sld>
 </file>
 
-<file path=ppt/slides/slide18.xml><?xml version="1.0" encoding="utf-8"?>
+<file path=ppt/slides/slide19.xml><?xml version="1.0" encoding="utf-8"?>
 <p:sld xmlns:a="http://schemas.openxmlformats.org/drawingml/2006/main" xmlns:r="http://schemas.openxmlformats.org/officeDocument/2006/relationships" xmlns:p="http://schemas.openxmlformats.org/presentationml/2006/main">
   <p:cSld>
     <p:spTree>
@@ -10711,134 +11398,38 @@
           </a:p>
         </p:txBody>
       </p:sp>
-    </p:spTree>
-  </p:cSld>
-  <p:clrMapOvr>
-    <a:masterClrMapping/>
-  </p:clrMapOvr>
-</p:sld>
-</file>
-
-<file path=ppt/slides/slide19.xml><?xml version="1.0" encoding="utf-8"?>
-<p:sld xmlns:a="http://schemas.openxmlformats.org/drawingml/2006/main" xmlns:r="http://schemas.openxmlformats.org/officeDocument/2006/relationships" xmlns:p="http://schemas.openxmlformats.org/presentationml/2006/main">
-  <p:cSld>
-    <p:spTree>
-      <p:nvGrpSpPr>
-        <p:cNvPr id="1" name="Shape 175"/>
-        <p:cNvGrpSpPr/>
-        <p:nvPr/>
-      </p:nvGrpSpPr>
-      <p:grpSpPr>
-        <a:xfrm>
-          <a:off x="0" y="0"/>
-          <a:ext cx="0" cy="0"/>
-          <a:chOff x="0" y="0"/>
-          <a:chExt cx="0" cy="0"/>
-        </a:xfrm>
-      </p:grpSpPr>
-      <p:sp>
-        <p:nvSpPr>
-          <p:cNvPr id="176" name="Shape 176"/>
-          <p:cNvSpPr txBox="1"/>
-          <p:nvPr/>
-        </p:nvSpPr>
-        <p:spPr>
-          <a:xfrm>
-            <a:off x="723481" y="2300298"/>
-            <a:ext cx="7411663" cy="2246769"/>
-          </a:xfrm>
-          <a:prstGeom prst="rect">
-            <a:avLst/>
-          </a:prstGeom>
-          <a:noFill/>
-          <a:ln>
-            <a:noFill/>
-          </a:ln>
-        </p:spPr>
+      <p:sp>
+        <p:nvSpPr>
+          <p:cNvPr id="2" name="Slide Number Placeholder 1">
+            <a:extLst>
+              <a:ext uri="{FF2B5EF4-FFF2-40B4-BE49-F238E27FC236}">
+                <a16:creationId xmlns:a16="http://schemas.microsoft.com/office/drawing/2014/main" id="{8485EFFE-6F79-F440-B543-FAF158042B23}"/>
+              </a:ext>
+            </a:extLst>
+          </p:cNvPr>
+          <p:cNvSpPr>
+            <a:spLocks noGrp="1"/>
+          </p:cNvSpPr>
+          <p:nvPr>
+            <p:ph type="sldNum" idx="12"/>
+          </p:nvPr>
+        </p:nvSpPr>
+        <p:spPr/>
         <p:txBody>
-          <a:bodyPr lIns="91425" tIns="45700" rIns="91425" bIns="45700" anchor="t" anchorCtr="0">
-            <a:noAutofit/>
-          </a:bodyPr>
+          <a:bodyPr/>
           <a:lstStyle/>
           <a:p>
-            <a:pPr marL="0" marR="0" lvl="0" indent="0" algn="l" rtl="0">
-              <a:spcBef>
-                <a:spcPts val="0"/>
-              </a:spcBef>
-              <a:buSzPct val="25000"/>
-              <a:buNone/>
-            </a:pPr>
-            <a:r>
-              <a:rPr lang="en-US" sz="2800">
-                <a:solidFill>
-                  <a:schemeClr val="dk1"/>
-                </a:solidFill>
-                <a:latin typeface="Calibri"/>
-                <a:ea typeface="Calibri"/>
-                <a:cs typeface="Calibri"/>
-                <a:sym typeface="Calibri"/>
-              </a:rPr>
-              <a:t> “I talked about the compilers project at almost every interview I've had. “</a:t>
-            </a:r>
-          </a:p>
-          <a:p>
-            <a:pPr marL="0" marR="0" lvl="0" indent="0" algn="l" rtl="0">
-              <a:spcBef>
-                <a:spcPts val="0"/>
-              </a:spcBef>
-              <a:buNone/>
-            </a:pPr>
-            <a:endParaRPr sz="2800">
-              <a:solidFill>
-                <a:schemeClr val="dk1"/>
-              </a:solidFill>
-              <a:latin typeface="Calibri"/>
-              <a:ea typeface="Calibri"/>
-              <a:cs typeface="Calibri"/>
-              <a:sym typeface="Calibri"/>
-            </a:endParaRPr>
-          </a:p>
-          <a:p>
-            <a:pPr marL="0" marR="0" lvl="0" indent="0" algn="l" rtl="0">
-              <a:spcBef>
-                <a:spcPts val="0"/>
-              </a:spcBef>
-              <a:buSzPct val="25000"/>
-              <a:buNone/>
-            </a:pPr>
-            <a:r>
-              <a:rPr lang="en-US" sz="2800">
-                <a:solidFill>
-                  <a:schemeClr val="dk1"/>
-                </a:solidFill>
-                <a:latin typeface="Calibri"/>
-                <a:ea typeface="Calibri"/>
-                <a:cs typeface="Calibri"/>
-                <a:sym typeface="Calibri"/>
-              </a:rPr>
-              <a:t>	-- Student who took CMPT 379 in Fall 2011</a:t>
-            </a:r>
-          </a:p>
-          <a:p>
-            <a:pPr marL="0" marR="0" lvl="0" indent="0" algn="l" rtl="0">
-              <a:spcBef>
-                <a:spcPts val="0"/>
-              </a:spcBef>
-              <a:buSzPct val="25000"/>
-              <a:buNone/>
-            </a:pPr>
-            <a:r>
-              <a:rPr lang="en-US" sz="2800">
-                <a:solidFill>
-                  <a:schemeClr val="dk1"/>
-                </a:solidFill>
-                <a:latin typeface="Calibri"/>
-                <a:ea typeface="Calibri"/>
-                <a:cs typeface="Calibri"/>
-                <a:sym typeface="Calibri"/>
-              </a:rPr>
-              <a:t>		(now employed in the Bay Area)</a:t>
-            </a:r>
+            <a:pPr lvl="0">
+              <a:spcBef>
+                <a:spcPts val="0"/>
+              </a:spcBef>
+              <a:buNone/>
+            </a:pPr>
+            <a:fld id="{00000000-1234-1234-1234-123412341234}" type="slidenum">
+              <a:rPr lang="en-US" smtClean="0"/>
+              <a:t>19</a:t>
+            </a:fld>
+            <a:endParaRPr lang="en-US"/>
           </a:p>
         </p:txBody>
       </p:sp>
@@ -11077,6 +11668,41 @@
           </a:p>
         </p:txBody>
       </p:sp>
+      <p:sp>
+        <p:nvSpPr>
+          <p:cNvPr id="2" name="Slide Number Placeholder 1">
+            <a:extLst>
+              <a:ext uri="{FF2B5EF4-FFF2-40B4-BE49-F238E27FC236}">
+                <a16:creationId xmlns:a16="http://schemas.microsoft.com/office/drawing/2014/main" id="{BD5DFFE1-455D-A34B-860A-8D19822AF976}"/>
+              </a:ext>
+            </a:extLst>
+          </p:cNvPr>
+          <p:cNvSpPr>
+            <a:spLocks noGrp="1"/>
+          </p:cNvSpPr>
+          <p:nvPr>
+            <p:ph type="sldNum" idx="12"/>
+          </p:nvPr>
+        </p:nvSpPr>
+        <p:spPr/>
+        <p:txBody>
+          <a:bodyPr/>
+          <a:lstStyle/>
+          <a:p>
+            <a:pPr lvl="0">
+              <a:spcBef>
+                <a:spcPts val="0"/>
+              </a:spcBef>
+              <a:buNone/>
+            </a:pPr>
+            <a:fld id="{00000000-1234-1234-1234-123412341234}" type="slidenum">
+              <a:rPr lang="en-US" smtClean="0"/>
+              <a:t>2</a:t>
+            </a:fld>
+            <a:endParaRPr lang="en-US"/>
+          </a:p>
+        </p:txBody>
+      </p:sp>
     </p:spTree>
   </p:cSld>
   <p:clrMapOvr>
@@ -11086,6 +11712,172 @@
 </file>
 
 <file path=ppt/slides/slide20.xml><?xml version="1.0" encoding="utf-8"?>
+<p:sld xmlns:a="http://schemas.openxmlformats.org/drawingml/2006/main" xmlns:r="http://schemas.openxmlformats.org/officeDocument/2006/relationships" xmlns:p="http://schemas.openxmlformats.org/presentationml/2006/main">
+  <p:cSld>
+    <p:spTree>
+      <p:nvGrpSpPr>
+        <p:cNvPr id="1" name="Shape 175"/>
+        <p:cNvGrpSpPr/>
+        <p:nvPr/>
+      </p:nvGrpSpPr>
+      <p:grpSpPr>
+        <a:xfrm>
+          <a:off x="0" y="0"/>
+          <a:ext cx="0" cy="0"/>
+          <a:chOff x="0" y="0"/>
+          <a:chExt cx="0" cy="0"/>
+        </a:xfrm>
+      </p:grpSpPr>
+      <p:sp>
+        <p:nvSpPr>
+          <p:cNvPr id="176" name="Shape 176"/>
+          <p:cNvSpPr txBox="1"/>
+          <p:nvPr/>
+        </p:nvSpPr>
+        <p:spPr>
+          <a:xfrm>
+            <a:off x="723481" y="2300298"/>
+            <a:ext cx="7411663" cy="2246769"/>
+          </a:xfrm>
+          <a:prstGeom prst="rect">
+            <a:avLst/>
+          </a:prstGeom>
+          <a:noFill/>
+          <a:ln>
+            <a:noFill/>
+          </a:ln>
+        </p:spPr>
+        <p:txBody>
+          <a:bodyPr lIns="91425" tIns="45700" rIns="91425" bIns="45700" anchor="t" anchorCtr="0">
+            <a:noAutofit/>
+          </a:bodyPr>
+          <a:lstStyle/>
+          <a:p>
+            <a:pPr marL="0" marR="0" lvl="0" indent="0" algn="l" rtl="0">
+              <a:spcBef>
+                <a:spcPts val="0"/>
+              </a:spcBef>
+              <a:buSzPct val="25000"/>
+              <a:buNone/>
+            </a:pPr>
+            <a:r>
+              <a:rPr lang="en-US" sz="2800">
+                <a:solidFill>
+                  <a:schemeClr val="dk1"/>
+                </a:solidFill>
+                <a:latin typeface="Calibri"/>
+                <a:ea typeface="Calibri"/>
+                <a:cs typeface="Calibri"/>
+                <a:sym typeface="Calibri"/>
+              </a:rPr>
+              <a:t> “I talked about the compilers project at almost every interview I've had. “</a:t>
+            </a:r>
+          </a:p>
+          <a:p>
+            <a:pPr marL="0" marR="0" lvl="0" indent="0" algn="l" rtl="0">
+              <a:spcBef>
+                <a:spcPts val="0"/>
+              </a:spcBef>
+              <a:buNone/>
+            </a:pPr>
+            <a:endParaRPr sz="2800">
+              <a:solidFill>
+                <a:schemeClr val="dk1"/>
+              </a:solidFill>
+              <a:latin typeface="Calibri"/>
+              <a:ea typeface="Calibri"/>
+              <a:cs typeface="Calibri"/>
+              <a:sym typeface="Calibri"/>
+            </a:endParaRPr>
+          </a:p>
+          <a:p>
+            <a:pPr marL="0" marR="0" lvl="0" indent="0" algn="l" rtl="0">
+              <a:spcBef>
+                <a:spcPts val="0"/>
+              </a:spcBef>
+              <a:buSzPct val="25000"/>
+              <a:buNone/>
+            </a:pPr>
+            <a:r>
+              <a:rPr lang="en-US" sz="2800">
+                <a:solidFill>
+                  <a:schemeClr val="dk1"/>
+                </a:solidFill>
+                <a:latin typeface="Calibri"/>
+                <a:ea typeface="Calibri"/>
+                <a:cs typeface="Calibri"/>
+                <a:sym typeface="Calibri"/>
+              </a:rPr>
+              <a:t>	-- Student who took CMPT 379 in Fall 2011</a:t>
+            </a:r>
+          </a:p>
+          <a:p>
+            <a:pPr marL="0" marR="0" lvl="0" indent="0" algn="l" rtl="0">
+              <a:spcBef>
+                <a:spcPts val="0"/>
+              </a:spcBef>
+              <a:buSzPct val="25000"/>
+              <a:buNone/>
+            </a:pPr>
+            <a:r>
+              <a:rPr lang="en-US" sz="2800">
+                <a:solidFill>
+                  <a:schemeClr val="dk1"/>
+                </a:solidFill>
+                <a:latin typeface="Calibri"/>
+                <a:ea typeface="Calibri"/>
+                <a:cs typeface="Calibri"/>
+                <a:sym typeface="Calibri"/>
+              </a:rPr>
+              <a:t>		(now employed in the Bay Area)</a:t>
+            </a:r>
+          </a:p>
+        </p:txBody>
+      </p:sp>
+      <p:sp>
+        <p:nvSpPr>
+          <p:cNvPr id="2" name="Slide Number Placeholder 1">
+            <a:extLst>
+              <a:ext uri="{FF2B5EF4-FFF2-40B4-BE49-F238E27FC236}">
+                <a16:creationId xmlns:a16="http://schemas.microsoft.com/office/drawing/2014/main" id="{2B28A067-1FA3-9548-8F4A-8602C0B0EFD8}"/>
+              </a:ext>
+            </a:extLst>
+          </p:cNvPr>
+          <p:cNvSpPr>
+            <a:spLocks noGrp="1"/>
+          </p:cNvSpPr>
+          <p:nvPr>
+            <p:ph type="sldNum" idx="12"/>
+          </p:nvPr>
+        </p:nvSpPr>
+        <p:spPr/>
+        <p:txBody>
+          <a:bodyPr/>
+          <a:lstStyle/>
+          <a:p>
+            <a:pPr lvl="0">
+              <a:spcBef>
+                <a:spcPts val="0"/>
+              </a:spcBef>
+              <a:buNone/>
+            </a:pPr>
+            <a:fld id="{00000000-1234-1234-1234-123412341234}" type="slidenum">
+              <a:rPr lang="en-US" smtClean="0"/>
+              <a:t>20</a:t>
+            </a:fld>
+            <a:endParaRPr lang="en-US"/>
+          </a:p>
+        </p:txBody>
+      </p:sp>
+    </p:spTree>
+  </p:cSld>
+  <p:clrMapOvr>
+    <a:masterClrMapping/>
+  </p:clrMapOvr>
+</p:sld>
+</file>
+
+<file path=ppt/slides/slide21.xml><?xml version="1.0" encoding="utf-8"?>
 <p:sld xmlns:a="http://schemas.openxmlformats.org/drawingml/2006/main" xmlns:r="http://schemas.openxmlformats.org/officeDocument/2006/relationships" xmlns:p="http://schemas.openxmlformats.org/presentationml/2006/main">
   <p:cSld>
     <p:spTree>
@@ -11365,6 +12157,41 @@
               </a:rPr>
               <a:t>”</a:t>
             </a:r>
+          </a:p>
+        </p:txBody>
+      </p:sp>
+      <p:sp>
+        <p:nvSpPr>
+          <p:cNvPr id="2" name="Slide Number Placeholder 1">
+            <a:extLst>
+              <a:ext uri="{FF2B5EF4-FFF2-40B4-BE49-F238E27FC236}">
+                <a16:creationId xmlns:a16="http://schemas.microsoft.com/office/drawing/2014/main" id="{B0FEDFCF-8D99-9843-94A0-4E9AEFDAB427}"/>
+              </a:ext>
+            </a:extLst>
+          </p:cNvPr>
+          <p:cNvSpPr>
+            <a:spLocks noGrp="1"/>
+          </p:cNvSpPr>
+          <p:nvPr>
+            <p:ph type="sldNum" idx="12"/>
+          </p:nvPr>
+        </p:nvSpPr>
+        <p:spPr/>
+        <p:txBody>
+          <a:bodyPr/>
+          <a:lstStyle/>
+          <a:p>
+            <a:pPr lvl="0">
+              <a:spcBef>
+                <a:spcPts val="0"/>
+              </a:spcBef>
+              <a:buNone/>
+            </a:pPr>
+            <a:fld id="{00000000-1234-1234-1234-123412341234}" type="slidenum">
+              <a:rPr lang="en-US" smtClean="0"/>
+              <a:t>21</a:t>
+            </a:fld>
+            <a:endParaRPr lang="en-US"/>
           </a:p>
         </p:txBody>
       </p:sp>
@@ -11567,6 +12394,41 @@
           </a:p>
         </p:txBody>
       </p:sp>
+      <p:sp>
+        <p:nvSpPr>
+          <p:cNvPr id="2" name="Slide Number Placeholder 1">
+            <a:extLst>
+              <a:ext uri="{FF2B5EF4-FFF2-40B4-BE49-F238E27FC236}">
+                <a16:creationId xmlns:a16="http://schemas.microsoft.com/office/drawing/2014/main" id="{E6F0DCD6-E2D1-0145-9190-EAE3E4BD2416}"/>
+              </a:ext>
+            </a:extLst>
+          </p:cNvPr>
+          <p:cNvSpPr>
+            <a:spLocks noGrp="1"/>
+          </p:cNvSpPr>
+          <p:nvPr>
+            <p:ph type="sldNum" idx="12"/>
+          </p:nvPr>
+        </p:nvSpPr>
+        <p:spPr/>
+        <p:txBody>
+          <a:bodyPr/>
+          <a:lstStyle/>
+          <a:p>
+            <a:pPr lvl="0">
+              <a:spcBef>
+                <a:spcPts val="0"/>
+              </a:spcBef>
+              <a:buNone/>
+            </a:pPr>
+            <a:fld id="{00000000-1234-1234-1234-123412341234}" type="slidenum">
+              <a:rPr lang="en-US" smtClean="0"/>
+              <a:t>3</a:t>
+            </a:fld>
+            <a:endParaRPr lang="en-US"/>
+          </a:p>
+        </p:txBody>
+      </p:sp>
     </p:spTree>
   </p:cSld>
   <p:clrMapOvr>
@@ -11600,8 +12462,8 @@
         </p:nvSpPr>
         <p:spPr>
           <a:xfrm>
-            <a:off x="791522" y="1626717"/>
-            <a:ext cx="7608617" cy="4401204"/>
+            <a:off x="396510" y="1545580"/>
+            <a:ext cx="8359072" cy="4719054"/>
           </a:xfrm>
           <a:prstGeom prst="rect">
             <a:avLst/>
@@ -11617,15 +12479,16 @@
           </a:bodyPr>
           <a:lstStyle/>
           <a:p>
-            <a:pPr marL="0" marR="0" lvl="0" indent="0" algn="l" rtl="0">
+            <a:pPr marL="457200" marR="0" lvl="0" indent="-457200" algn="l" rtl="0">
               <a:spcBef>
                 <a:spcPts val="0"/>
               </a:spcBef>
               <a:buSzPct val="25000"/>
-              <a:buNone/>
-            </a:pPr>
-            <a:r>
-              <a:rPr lang="en-US" sz="2800">
+              <a:buFont typeface="Arial" panose="020B0604020202020204" pitchFamily="34" charset="0"/>
+              <a:buChar char="•"/>
+            </a:pPr>
+            <a:r>
+              <a:rPr lang="en-US" sz="2800" dirty="0">
                 <a:solidFill>
                   <a:schemeClr val="dk1"/>
                 </a:solidFill>
@@ -11637,7 +12500,7 @@
               <a:t>“</a:t>
             </a:r>
             <a:r>
-              <a:rPr lang="en-US" sz="2800">
+              <a:rPr lang="en-US" sz="2800" dirty="0">
                 <a:solidFill>
                   <a:schemeClr val="dk2"/>
                 </a:solidFill>
@@ -11646,10 +12509,98 @@
                 <a:cs typeface="Calibri"/>
                 <a:sym typeface="Calibri"/>
               </a:rPr>
-              <a:t>I'm not saying other CS courses aren't important, incidentally. Operating Systems, Machine Learning, Distributed Computing and Algorithm Design are all arguably just as important as Compiler Construction. Except that you can take them all and still not know how computers work, which to me means that Compilers really needs to be a mandatory 300-level course. But it has so many prerequisites that you can't realistically make that happen at most schools</a:t>
-            </a:r>
-            <a:r>
-              <a:rPr lang="en-US" sz="2800">
+              <a:t>I'm not saying other CS courses aren't important, incidentally </a:t>
+            </a:r>
+          </a:p>
+          <a:p>
+            <a:pPr marL="457200" marR="0" lvl="0" indent="-457200" algn="l" rtl="0">
+              <a:spcBef>
+                <a:spcPts val="0"/>
+              </a:spcBef>
+              <a:buSzPct val="25000"/>
+              <a:buFont typeface="Arial" panose="020B0604020202020204" pitchFamily="34" charset="0"/>
+              <a:buChar char="•"/>
+            </a:pPr>
+            <a:r>
+              <a:rPr lang="en-US" sz="2800" dirty="0">
+                <a:solidFill>
+                  <a:schemeClr val="dk2"/>
+                </a:solidFill>
+                <a:latin typeface="Calibri"/>
+                <a:ea typeface="Calibri"/>
+                <a:cs typeface="Calibri"/>
+                <a:sym typeface="Calibri"/>
+              </a:rPr>
+              <a:t>Operating Systems, Machine Learning, Distributed Computing and Algorithm Design are all arguably just as important as Compiler Construction. </a:t>
+            </a:r>
+          </a:p>
+          <a:p>
+            <a:pPr marL="457200" marR="0" lvl="0" indent="-457200" algn="l" rtl="0">
+              <a:spcBef>
+                <a:spcPts val="0"/>
+              </a:spcBef>
+              <a:buSzPct val="25000"/>
+              <a:buFont typeface="Arial" panose="020B0604020202020204" pitchFamily="34" charset="0"/>
+              <a:buChar char="•"/>
+            </a:pPr>
+            <a:r>
+              <a:rPr lang="en-US" sz="2800" dirty="0">
+                <a:solidFill>
+                  <a:schemeClr val="dk2"/>
+                </a:solidFill>
+                <a:latin typeface="Calibri"/>
+                <a:ea typeface="Calibri"/>
+                <a:cs typeface="Calibri"/>
+                <a:sym typeface="Calibri"/>
+              </a:rPr>
+              <a:t>Except that you can take them all and still not know how computers work, </a:t>
+            </a:r>
+          </a:p>
+          <a:p>
+            <a:pPr marL="457200" marR="0" lvl="0" indent="-457200" algn="l" rtl="0">
+              <a:spcBef>
+                <a:spcPts val="0"/>
+              </a:spcBef>
+              <a:buSzPct val="25000"/>
+              <a:buFont typeface="Arial" panose="020B0604020202020204" pitchFamily="34" charset="0"/>
+              <a:buChar char="•"/>
+            </a:pPr>
+            <a:r>
+              <a:rPr lang="en-US" sz="2800" dirty="0">
+                <a:solidFill>
+                  <a:schemeClr val="dk2"/>
+                </a:solidFill>
+                <a:latin typeface="Calibri"/>
+                <a:ea typeface="Calibri"/>
+                <a:cs typeface="Calibri"/>
+                <a:sym typeface="Calibri"/>
+              </a:rPr>
+              <a:t>which to me means that Compilers really needs to be a mandatory 300-level course. </a:t>
+            </a:r>
+          </a:p>
+          <a:p>
+            <a:pPr marL="457200" marR="0" lvl="0" indent="-457200" algn="l" rtl="0">
+              <a:spcBef>
+                <a:spcPts val="0"/>
+              </a:spcBef>
+              <a:buSzPct val="25000"/>
+              <a:buFont typeface="Arial" panose="020B0604020202020204" pitchFamily="34" charset="0"/>
+              <a:buChar char="•"/>
+            </a:pPr>
+            <a:r>
+              <a:rPr lang="en-US" sz="2800" dirty="0">
+                <a:solidFill>
+                  <a:schemeClr val="dk2"/>
+                </a:solidFill>
+                <a:latin typeface="Calibri"/>
+                <a:ea typeface="Calibri"/>
+                <a:cs typeface="Calibri"/>
+                <a:sym typeface="Calibri"/>
+              </a:rPr>
+              <a:t>But it has so many prerequisites that you can't realistically make that happen at most schools</a:t>
+            </a:r>
+            <a:r>
+              <a:rPr lang="en-US" sz="2800" dirty="0">
                 <a:solidFill>
                   <a:schemeClr val="dk1"/>
                 </a:solidFill>
@@ -11718,15 +12669,1058 @@
           </a:p>
         </p:txBody>
       </p:sp>
+      <p:sp>
+        <p:nvSpPr>
+          <p:cNvPr id="2" name="Slide Number Placeholder 1">
+            <a:extLst>
+              <a:ext uri="{FF2B5EF4-FFF2-40B4-BE49-F238E27FC236}">
+                <a16:creationId xmlns:a16="http://schemas.microsoft.com/office/drawing/2014/main" id="{02C59FBD-39BE-C048-B719-AA8242D51B67}"/>
+              </a:ext>
+            </a:extLst>
+          </p:cNvPr>
+          <p:cNvSpPr>
+            <a:spLocks noGrp="1"/>
+          </p:cNvSpPr>
+          <p:nvPr>
+            <p:ph type="sldNum" idx="12"/>
+          </p:nvPr>
+        </p:nvSpPr>
+        <p:spPr/>
+        <p:txBody>
+          <a:bodyPr/>
+          <a:lstStyle/>
+          <a:p>
+            <a:pPr lvl="0">
+              <a:spcBef>
+                <a:spcPts val="0"/>
+              </a:spcBef>
+              <a:buNone/>
+            </a:pPr>
+            <a:fld id="{00000000-1234-1234-1234-123412341234}" type="slidenum">
+              <a:rPr lang="en-US" smtClean="0"/>
+              <a:t>4</a:t>
+            </a:fld>
+            <a:endParaRPr lang="en-US"/>
+          </a:p>
+        </p:txBody>
+      </p:sp>
     </p:spTree>
   </p:cSld>
   <p:clrMapOvr>
     <a:masterClrMapping/>
   </p:clrMapOvr>
+  <p:timing>
+    <p:tnLst>
+      <p:par>
+        <p:cTn id="1" dur="indefinite" restart="never" nodeType="tmRoot">
+          <p:childTnLst>
+            <p:seq concurrent="1" nextAc="seek">
+              <p:cTn id="2" dur="indefinite" nodeType="mainSeq">
+                <p:childTnLst>
+                  <p:par>
+                    <p:cTn id="3" fill="hold">
+                      <p:stCondLst>
+                        <p:cond delay="indefinite"/>
+                      </p:stCondLst>
+                      <p:childTnLst>
+                        <p:par>
+                          <p:cTn id="4" fill="hold">
+                            <p:stCondLst>
+                              <p:cond delay="0"/>
+                            </p:stCondLst>
+                            <p:childTnLst>
+                              <p:par>
+                                <p:cTn id="5" presetID="1" presetClass="entr" presetSubtype="0" fill="hold" grpId="0" nodeType="clickEffect">
+                                  <p:stCondLst>
+                                    <p:cond delay="0"/>
+                                  </p:stCondLst>
+                                  <p:childTnLst>
+                                    <p:set>
+                                      <p:cBhvr>
+                                        <p:cTn id="6" dur="1" fill="hold">
+                                          <p:stCondLst>
+                                            <p:cond delay="0"/>
+                                          </p:stCondLst>
+                                        </p:cTn>
+                                        <p:tgtEl>
+                                          <p:spTgt spid="84">
+                                            <p:txEl>
+                                              <p:pRg st="0" end="0"/>
+                                            </p:txEl>
+                                          </p:spTgt>
+                                        </p:tgtEl>
+                                        <p:attrNameLst>
+                                          <p:attrName>style.visibility</p:attrName>
+                                        </p:attrNameLst>
+                                      </p:cBhvr>
+                                      <p:to>
+                                        <p:strVal val="visible"/>
+                                      </p:to>
+                                    </p:set>
+                                  </p:childTnLst>
+                                </p:cTn>
+                              </p:par>
+                            </p:childTnLst>
+                          </p:cTn>
+                        </p:par>
+                      </p:childTnLst>
+                    </p:cTn>
+                  </p:par>
+                  <p:par>
+                    <p:cTn id="7" fill="hold">
+                      <p:stCondLst>
+                        <p:cond delay="indefinite"/>
+                      </p:stCondLst>
+                      <p:childTnLst>
+                        <p:par>
+                          <p:cTn id="8" fill="hold">
+                            <p:stCondLst>
+                              <p:cond delay="0"/>
+                            </p:stCondLst>
+                            <p:childTnLst>
+                              <p:par>
+                                <p:cTn id="9" presetID="1" presetClass="entr" presetSubtype="0" fill="hold" grpId="0" nodeType="clickEffect">
+                                  <p:stCondLst>
+                                    <p:cond delay="0"/>
+                                  </p:stCondLst>
+                                  <p:childTnLst>
+                                    <p:set>
+                                      <p:cBhvr>
+                                        <p:cTn id="10" dur="1" fill="hold">
+                                          <p:stCondLst>
+                                            <p:cond delay="0"/>
+                                          </p:stCondLst>
+                                        </p:cTn>
+                                        <p:tgtEl>
+                                          <p:spTgt spid="84">
+                                            <p:txEl>
+                                              <p:pRg st="1" end="1"/>
+                                            </p:txEl>
+                                          </p:spTgt>
+                                        </p:tgtEl>
+                                        <p:attrNameLst>
+                                          <p:attrName>style.visibility</p:attrName>
+                                        </p:attrNameLst>
+                                      </p:cBhvr>
+                                      <p:to>
+                                        <p:strVal val="visible"/>
+                                      </p:to>
+                                    </p:set>
+                                  </p:childTnLst>
+                                </p:cTn>
+                              </p:par>
+                            </p:childTnLst>
+                          </p:cTn>
+                        </p:par>
+                      </p:childTnLst>
+                    </p:cTn>
+                  </p:par>
+                  <p:par>
+                    <p:cTn id="11" fill="hold">
+                      <p:stCondLst>
+                        <p:cond delay="indefinite"/>
+                      </p:stCondLst>
+                      <p:childTnLst>
+                        <p:par>
+                          <p:cTn id="12" fill="hold">
+                            <p:stCondLst>
+                              <p:cond delay="0"/>
+                            </p:stCondLst>
+                            <p:childTnLst>
+                              <p:par>
+                                <p:cTn id="13" presetID="1" presetClass="entr" presetSubtype="0" fill="hold" grpId="0" nodeType="clickEffect">
+                                  <p:stCondLst>
+                                    <p:cond delay="0"/>
+                                  </p:stCondLst>
+                                  <p:childTnLst>
+                                    <p:set>
+                                      <p:cBhvr>
+                                        <p:cTn id="14" dur="1" fill="hold">
+                                          <p:stCondLst>
+                                            <p:cond delay="0"/>
+                                          </p:stCondLst>
+                                        </p:cTn>
+                                        <p:tgtEl>
+                                          <p:spTgt spid="84">
+                                            <p:txEl>
+                                              <p:pRg st="2" end="2"/>
+                                            </p:txEl>
+                                          </p:spTgt>
+                                        </p:tgtEl>
+                                        <p:attrNameLst>
+                                          <p:attrName>style.visibility</p:attrName>
+                                        </p:attrNameLst>
+                                      </p:cBhvr>
+                                      <p:to>
+                                        <p:strVal val="visible"/>
+                                      </p:to>
+                                    </p:set>
+                                  </p:childTnLst>
+                                </p:cTn>
+                              </p:par>
+                            </p:childTnLst>
+                          </p:cTn>
+                        </p:par>
+                      </p:childTnLst>
+                    </p:cTn>
+                  </p:par>
+                  <p:par>
+                    <p:cTn id="15" fill="hold">
+                      <p:stCondLst>
+                        <p:cond delay="indefinite"/>
+                      </p:stCondLst>
+                      <p:childTnLst>
+                        <p:par>
+                          <p:cTn id="16" fill="hold">
+                            <p:stCondLst>
+                              <p:cond delay="0"/>
+                            </p:stCondLst>
+                            <p:childTnLst>
+                              <p:par>
+                                <p:cTn id="17" presetID="1" presetClass="entr" presetSubtype="0" fill="hold" grpId="0" nodeType="clickEffect">
+                                  <p:stCondLst>
+                                    <p:cond delay="0"/>
+                                  </p:stCondLst>
+                                  <p:childTnLst>
+                                    <p:set>
+                                      <p:cBhvr>
+                                        <p:cTn id="18" dur="1" fill="hold">
+                                          <p:stCondLst>
+                                            <p:cond delay="0"/>
+                                          </p:stCondLst>
+                                        </p:cTn>
+                                        <p:tgtEl>
+                                          <p:spTgt spid="84">
+                                            <p:txEl>
+                                              <p:pRg st="3" end="3"/>
+                                            </p:txEl>
+                                          </p:spTgt>
+                                        </p:tgtEl>
+                                        <p:attrNameLst>
+                                          <p:attrName>style.visibility</p:attrName>
+                                        </p:attrNameLst>
+                                      </p:cBhvr>
+                                      <p:to>
+                                        <p:strVal val="visible"/>
+                                      </p:to>
+                                    </p:set>
+                                  </p:childTnLst>
+                                </p:cTn>
+                              </p:par>
+                            </p:childTnLst>
+                          </p:cTn>
+                        </p:par>
+                      </p:childTnLst>
+                    </p:cTn>
+                  </p:par>
+                  <p:par>
+                    <p:cTn id="19" fill="hold">
+                      <p:stCondLst>
+                        <p:cond delay="indefinite"/>
+                      </p:stCondLst>
+                      <p:childTnLst>
+                        <p:par>
+                          <p:cTn id="20" fill="hold">
+                            <p:stCondLst>
+                              <p:cond delay="0"/>
+                            </p:stCondLst>
+                            <p:childTnLst>
+                              <p:par>
+                                <p:cTn id="21" presetID="1" presetClass="entr" presetSubtype="0" fill="hold" grpId="0" nodeType="clickEffect">
+                                  <p:stCondLst>
+                                    <p:cond delay="0"/>
+                                  </p:stCondLst>
+                                  <p:childTnLst>
+                                    <p:set>
+                                      <p:cBhvr>
+                                        <p:cTn id="22" dur="1" fill="hold">
+                                          <p:stCondLst>
+                                            <p:cond delay="0"/>
+                                          </p:stCondLst>
+                                        </p:cTn>
+                                        <p:tgtEl>
+                                          <p:spTgt spid="84">
+                                            <p:txEl>
+                                              <p:pRg st="4" end="4"/>
+                                            </p:txEl>
+                                          </p:spTgt>
+                                        </p:tgtEl>
+                                        <p:attrNameLst>
+                                          <p:attrName>style.visibility</p:attrName>
+                                        </p:attrNameLst>
+                                      </p:cBhvr>
+                                      <p:to>
+                                        <p:strVal val="visible"/>
+                                      </p:to>
+                                    </p:set>
+                                  </p:childTnLst>
+                                </p:cTn>
+                              </p:par>
+                            </p:childTnLst>
+                          </p:cTn>
+                        </p:par>
+                      </p:childTnLst>
+                    </p:cTn>
+                  </p:par>
+                </p:childTnLst>
+              </p:cTn>
+              <p:prevCondLst>
+                <p:cond evt="onPrev" delay="0">
+                  <p:tgtEl>
+                    <p:sldTgt/>
+                  </p:tgtEl>
+                </p:cond>
+              </p:prevCondLst>
+              <p:nextCondLst>
+                <p:cond evt="onNext" delay="0">
+                  <p:tgtEl>
+                    <p:sldTgt/>
+                  </p:tgtEl>
+                </p:cond>
+              </p:nextCondLst>
+            </p:seq>
+          </p:childTnLst>
+        </p:cTn>
+      </p:par>
+    </p:tnLst>
+    <p:bldLst>
+      <p:bldP spid="84" grpId="0" build="p"/>
+    </p:bldLst>
+  </p:timing>
 </p:sld>
 </file>
 
 <file path=ppt/slides/slide5.xml><?xml version="1.0" encoding="utf-8"?>
+<p:sld xmlns:a="http://schemas.openxmlformats.org/drawingml/2006/main" xmlns:r="http://schemas.openxmlformats.org/officeDocument/2006/relationships" xmlns:p="http://schemas.openxmlformats.org/presentationml/2006/main">
+  <p:cSld>
+    <p:spTree>
+      <p:nvGrpSpPr>
+        <p:cNvPr id="1" name=""/>
+        <p:cNvGrpSpPr/>
+        <p:nvPr/>
+      </p:nvGrpSpPr>
+      <p:grpSpPr>
+        <a:xfrm>
+          <a:off x="0" y="0"/>
+          <a:ext cx="0" cy="0"/>
+          <a:chOff x="0" y="0"/>
+          <a:chExt cx="0" cy="0"/>
+        </a:xfrm>
+      </p:grpSpPr>
+      <p:sp>
+        <p:nvSpPr>
+          <p:cNvPr id="2" name="Title 1">
+            <a:extLst>
+              <a:ext uri="{FF2B5EF4-FFF2-40B4-BE49-F238E27FC236}">
+                <a16:creationId xmlns:a16="http://schemas.microsoft.com/office/drawing/2014/main" id="{6BEDCEF3-555D-744C-9CB1-9D5694563A03}"/>
+              </a:ext>
+            </a:extLst>
+          </p:cNvPr>
+          <p:cNvSpPr>
+            <a:spLocks noGrp="1"/>
+          </p:cNvSpPr>
+          <p:nvPr>
+            <p:ph type="title"/>
+          </p:nvPr>
+        </p:nvSpPr>
+        <p:spPr/>
+        <p:txBody>
+          <a:bodyPr/>
+          <a:lstStyle/>
+          <a:p>
+            <a:r>
+              <a:rPr lang="en-US" dirty="0"/>
+              <a:t>What do you learn?</a:t>
+            </a:r>
+          </a:p>
+        </p:txBody>
+      </p:sp>
+      <p:sp>
+        <p:nvSpPr>
+          <p:cNvPr id="3" name="Text Placeholder 2">
+            <a:extLst>
+              <a:ext uri="{FF2B5EF4-FFF2-40B4-BE49-F238E27FC236}">
+                <a16:creationId xmlns:a16="http://schemas.microsoft.com/office/drawing/2014/main" id="{2B41B729-1C1D-9C49-9461-61F91895FEFF}"/>
+              </a:ext>
+            </a:extLst>
+          </p:cNvPr>
+          <p:cNvSpPr>
+            <a:spLocks noGrp="1"/>
+          </p:cNvSpPr>
+          <p:nvPr>
+            <p:ph type="body" idx="1"/>
+          </p:nvPr>
+        </p:nvSpPr>
+        <p:spPr>
+          <a:xfrm>
+            <a:off x="457200" y="1417636"/>
+            <a:ext cx="8229600" cy="4938713"/>
+          </a:xfrm>
+        </p:spPr>
+        <p:txBody>
+          <a:bodyPr/>
+          <a:lstStyle/>
+          <a:p>
+            <a:r>
+              <a:rPr lang="en-US" dirty="0"/>
+              <a:t> </a:t>
+            </a:r>
+            <a:r>
+              <a:rPr lang="en-US" dirty="0" err="1"/>
+              <a:t>Lexing</a:t>
+            </a:r>
+            <a:r>
+              <a:rPr lang="en-US" dirty="0"/>
+              <a:t> – lexical analysis. Recognizing the tokens of the language.</a:t>
+            </a:r>
+          </a:p>
+          <a:p>
+            <a:r>
+              <a:rPr lang="en-US" dirty="0"/>
+              <a:t> Parsing – syntactic analysis, aka the structure of the program?</a:t>
+            </a:r>
+          </a:p>
+          <a:p>
+            <a:r>
+              <a:rPr lang="en-US" dirty="0"/>
+              <a:t> Type analysis – constraints on using the language.</a:t>
+            </a:r>
+          </a:p>
+          <a:p>
+            <a:r>
+              <a:rPr lang="en-US" dirty="0"/>
+              <a:t> Code generation and optimization.</a:t>
+            </a:r>
+          </a:p>
+        </p:txBody>
+      </p:sp>
+      <p:sp>
+        <p:nvSpPr>
+          <p:cNvPr id="4" name="Slide Number Placeholder 3">
+            <a:extLst>
+              <a:ext uri="{FF2B5EF4-FFF2-40B4-BE49-F238E27FC236}">
+                <a16:creationId xmlns:a16="http://schemas.microsoft.com/office/drawing/2014/main" id="{42DBB5E3-99A1-644B-BF94-DA6B29F44F98}"/>
+              </a:ext>
+            </a:extLst>
+          </p:cNvPr>
+          <p:cNvSpPr>
+            <a:spLocks noGrp="1"/>
+          </p:cNvSpPr>
+          <p:nvPr>
+            <p:ph type="sldNum" idx="12"/>
+          </p:nvPr>
+        </p:nvSpPr>
+        <p:spPr/>
+        <p:txBody>
+          <a:bodyPr/>
+          <a:lstStyle/>
+          <a:p>
+            <a:pPr marL="0" marR="0" lvl="0" indent="0" algn="r" rtl="0">
+              <a:spcBef>
+                <a:spcPts val="0"/>
+              </a:spcBef>
+              <a:buSzPct val="25000"/>
+              <a:buNone/>
+            </a:pPr>
+            <a:fld id="{00000000-1234-1234-1234-123412341234}" type="slidenum">
+              <a:rPr lang="en-US" sz="1200" smtClean="0">
+                <a:solidFill>
+                  <a:srgbClr val="888888"/>
+                </a:solidFill>
+                <a:latin typeface="Calibri"/>
+                <a:ea typeface="Calibri"/>
+                <a:cs typeface="Calibri"/>
+                <a:sym typeface="Calibri"/>
+              </a:rPr>
+              <a:t>5</a:t>
+            </a:fld>
+            <a:endParaRPr lang="en-US" sz="1200">
+              <a:solidFill>
+                <a:srgbClr val="888888"/>
+              </a:solidFill>
+              <a:latin typeface="Calibri"/>
+              <a:ea typeface="Calibri"/>
+              <a:cs typeface="Calibri"/>
+              <a:sym typeface="Calibri"/>
+            </a:endParaRPr>
+          </a:p>
+        </p:txBody>
+      </p:sp>
+      <p:sp>
+        <p:nvSpPr>
+          <p:cNvPr id="5" name="TextBox 4">
+            <a:extLst>
+              <a:ext uri="{FF2B5EF4-FFF2-40B4-BE49-F238E27FC236}">
+                <a16:creationId xmlns:a16="http://schemas.microsoft.com/office/drawing/2014/main" id="{8CB94947-6383-9540-8A14-603A243D5FF5}"/>
+              </a:ext>
+            </a:extLst>
+          </p:cNvPr>
+          <p:cNvSpPr txBox="1"/>
+          <p:nvPr/>
+        </p:nvSpPr>
+        <p:spPr>
+          <a:xfrm>
+            <a:off x="5185646" y="2266670"/>
+            <a:ext cx="3188263" cy="400110"/>
+          </a:xfrm>
+          <a:prstGeom prst="rect">
+            <a:avLst/>
+          </a:prstGeom>
+          <a:solidFill>
+            <a:srgbClr val="00B0F0"/>
+          </a:solidFill>
+        </p:spPr>
+        <p:txBody>
+          <a:bodyPr wrap="square" rtlCol="0">
+            <a:spAutoFit/>
+          </a:bodyPr>
+          <a:lstStyle/>
+          <a:p>
+            <a:r>
+              <a:rPr lang="en-US" sz="2000" dirty="0"/>
+              <a:t>Letters/Sounds and Words</a:t>
+            </a:r>
+          </a:p>
+        </p:txBody>
+      </p:sp>
+      <p:sp>
+        <p:nvSpPr>
+          <p:cNvPr id="6" name="TextBox 5">
+            <a:extLst>
+              <a:ext uri="{FF2B5EF4-FFF2-40B4-BE49-F238E27FC236}">
+                <a16:creationId xmlns:a16="http://schemas.microsoft.com/office/drawing/2014/main" id="{323DC70B-FEB9-0341-8C03-9B7B68AF57EF}"/>
+              </a:ext>
+            </a:extLst>
+          </p:cNvPr>
+          <p:cNvSpPr txBox="1"/>
+          <p:nvPr/>
+        </p:nvSpPr>
+        <p:spPr>
+          <a:xfrm>
+            <a:off x="6973986" y="3686938"/>
+            <a:ext cx="1399923" cy="400110"/>
+          </a:xfrm>
+          <a:prstGeom prst="rect">
+            <a:avLst/>
+          </a:prstGeom>
+          <a:solidFill>
+            <a:srgbClr val="00B0F0"/>
+          </a:solidFill>
+        </p:spPr>
+        <p:txBody>
+          <a:bodyPr wrap="square" rtlCol="0">
+            <a:spAutoFit/>
+          </a:bodyPr>
+          <a:lstStyle/>
+          <a:p>
+            <a:r>
+              <a:rPr lang="en-US" sz="2000" dirty="0"/>
+              <a:t>Sentences</a:t>
+            </a:r>
+          </a:p>
+        </p:txBody>
+      </p:sp>
+      <p:sp>
+        <p:nvSpPr>
+          <p:cNvPr id="7" name="TextBox 6">
+            <a:extLst>
+              <a:ext uri="{FF2B5EF4-FFF2-40B4-BE49-F238E27FC236}">
+                <a16:creationId xmlns:a16="http://schemas.microsoft.com/office/drawing/2014/main" id="{532E70D1-B73E-A946-B062-5BBE33C2DFC4}"/>
+              </a:ext>
+            </a:extLst>
+          </p:cNvPr>
+          <p:cNvSpPr txBox="1"/>
+          <p:nvPr/>
+        </p:nvSpPr>
+        <p:spPr>
+          <a:xfrm>
+            <a:off x="6990169" y="4969595"/>
+            <a:ext cx="1383740" cy="400110"/>
+          </a:xfrm>
+          <a:prstGeom prst="rect">
+            <a:avLst/>
+          </a:prstGeom>
+          <a:solidFill>
+            <a:srgbClr val="00B0F0"/>
+          </a:solidFill>
+        </p:spPr>
+        <p:txBody>
+          <a:bodyPr wrap="square" rtlCol="0">
+            <a:spAutoFit/>
+          </a:bodyPr>
+          <a:lstStyle/>
+          <a:p>
+            <a:r>
+              <a:rPr lang="en-US" sz="2000" dirty="0"/>
+              <a:t>Semantics</a:t>
+            </a:r>
+          </a:p>
+        </p:txBody>
+      </p:sp>
+      <p:sp>
+        <p:nvSpPr>
+          <p:cNvPr id="8" name="TextBox 7">
+            <a:extLst>
+              <a:ext uri="{FF2B5EF4-FFF2-40B4-BE49-F238E27FC236}">
+                <a16:creationId xmlns:a16="http://schemas.microsoft.com/office/drawing/2014/main" id="{6BBC57CC-FC09-E247-AF47-FDA966E01BB6}"/>
+              </a:ext>
+            </a:extLst>
+          </p:cNvPr>
+          <p:cNvSpPr txBox="1"/>
+          <p:nvPr/>
+        </p:nvSpPr>
+        <p:spPr>
+          <a:xfrm>
+            <a:off x="6990169" y="5817992"/>
+            <a:ext cx="1383740" cy="400110"/>
+          </a:xfrm>
+          <a:prstGeom prst="rect">
+            <a:avLst/>
+          </a:prstGeom>
+          <a:solidFill>
+            <a:srgbClr val="00B0F0"/>
+          </a:solidFill>
+        </p:spPr>
+        <p:txBody>
+          <a:bodyPr wrap="square" rtlCol="0">
+            <a:spAutoFit/>
+          </a:bodyPr>
+          <a:lstStyle/>
+          <a:p>
+            <a:r>
+              <a:rPr lang="en-US" sz="2000" dirty="0"/>
+              <a:t>”Meaning”</a:t>
+            </a:r>
+          </a:p>
+        </p:txBody>
+      </p:sp>
+    </p:spTree>
+    <p:extLst>
+      <p:ext uri="{BB962C8B-B14F-4D97-AF65-F5344CB8AC3E}">
+        <p14:creationId xmlns:p14="http://schemas.microsoft.com/office/powerpoint/2010/main" val="767551724"/>
+      </p:ext>
+    </p:extLst>
+  </p:cSld>
+  <p:clrMapOvr>
+    <a:masterClrMapping/>
+  </p:clrMapOvr>
+  <p:timing>
+    <p:tnLst>
+      <p:par>
+        <p:cTn id="1" dur="indefinite" restart="never" nodeType="tmRoot">
+          <p:childTnLst>
+            <p:seq concurrent="1" nextAc="seek">
+              <p:cTn id="2" dur="indefinite" nodeType="mainSeq">
+                <p:childTnLst>
+                  <p:par>
+                    <p:cTn id="3" fill="hold">
+                      <p:stCondLst>
+                        <p:cond delay="indefinite"/>
+                      </p:stCondLst>
+                      <p:childTnLst>
+                        <p:par>
+                          <p:cTn id="4" fill="hold">
+                            <p:stCondLst>
+                              <p:cond delay="0"/>
+                            </p:stCondLst>
+                            <p:childTnLst>
+                              <p:par>
+                                <p:cTn id="5" presetID="1" presetClass="entr" presetSubtype="0" fill="hold" grpId="0" nodeType="clickEffect">
+                                  <p:stCondLst>
+                                    <p:cond delay="0"/>
+                                  </p:stCondLst>
+                                  <p:childTnLst>
+                                    <p:set>
+                                      <p:cBhvr>
+                                        <p:cTn id="6" dur="1" fill="hold">
+                                          <p:stCondLst>
+                                            <p:cond delay="0"/>
+                                          </p:stCondLst>
+                                        </p:cTn>
+                                        <p:tgtEl>
+                                          <p:spTgt spid="3">
+                                            <p:txEl>
+                                              <p:pRg st="0" end="0"/>
+                                            </p:txEl>
+                                          </p:spTgt>
+                                        </p:tgtEl>
+                                        <p:attrNameLst>
+                                          <p:attrName>style.visibility</p:attrName>
+                                        </p:attrNameLst>
+                                      </p:cBhvr>
+                                      <p:to>
+                                        <p:strVal val="visible"/>
+                                      </p:to>
+                                    </p:set>
+                                  </p:childTnLst>
+                                </p:cTn>
+                              </p:par>
+                            </p:childTnLst>
+                          </p:cTn>
+                        </p:par>
+                      </p:childTnLst>
+                    </p:cTn>
+                  </p:par>
+                  <p:par>
+                    <p:cTn id="7" fill="hold">
+                      <p:stCondLst>
+                        <p:cond delay="indefinite"/>
+                      </p:stCondLst>
+                      <p:childTnLst>
+                        <p:par>
+                          <p:cTn id="8" fill="hold">
+                            <p:stCondLst>
+                              <p:cond delay="0"/>
+                            </p:stCondLst>
+                            <p:childTnLst>
+                              <p:par>
+                                <p:cTn id="9" presetID="1" presetClass="entr" presetSubtype="0" fill="hold" grpId="0" nodeType="clickEffect">
+                                  <p:stCondLst>
+                                    <p:cond delay="0"/>
+                                  </p:stCondLst>
+                                  <p:childTnLst>
+                                    <p:set>
+                                      <p:cBhvr>
+                                        <p:cTn id="10" dur="1" fill="hold">
+                                          <p:stCondLst>
+                                            <p:cond delay="0"/>
+                                          </p:stCondLst>
+                                        </p:cTn>
+                                        <p:tgtEl>
+                                          <p:spTgt spid="3">
+                                            <p:txEl>
+                                              <p:pRg st="1" end="1"/>
+                                            </p:txEl>
+                                          </p:spTgt>
+                                        </p:tgtEl>
+                                        <p:attrNameLst>
+                                          <p:attrName>style.visibility</p:attrName>
+                                        </p:attrNameLst>
+                                      </p:cBhvr>
+                                      <p:to>
+                                        <p:strVal val="visible"/>
+                                      </p:to>
+                                    </p:set>
+                                  </p:childTnLst>
+                                </p:cTn>
+                              </p:par>
+                            </p:childTnLst>
+                          </p:cTn>
+                        </p:par>
+                      </p:childTnLst>
+                    </p:cTn>
+                  </p:par>
+                  <p:par>
+                    <p:cTn id="11" fill="hold">
+                      <p:stCondLst>
+                        <p:cond delay="indefinite"/>
+                      </p:stCondLst>
+                      <p:childTnLst>
+                        <p:par>
+                          <p:cTn id="12" fill="hold">
+                            <p:stCondLst>
+                              <p:cond delay="0"/>
+                            </p:stCondLst>
+                            <p:childTnLst>
+                              <p:par>
+                                <p:cTn id="13" presetID="1" presetClass="entr" presetSubtype="0" fill="hold" grpId="0" nodeType="clickEffect">
+                                  <p:stCondLst>
+                                    <p:cond delay="0"/>
+                                  </p:stCondLst>
+                                  <p:childTnLst>
+                                    <p:set>
+                                      <p:cBhvr>
+                                        <p:cTn id="14" dur="1" fill="hold">
+                                          <p:stCondLst>
+                                            <p:cond delay="0"/>
+                                          </p:stCondLst>
+                                        </p:cTn>
+                                        <p:tgtEl>
+                                          <p:spTgt spid="3">
+                                            <p:txEl>
+                                              <p:pRg st="2" end="2"/>
+                                            </p:txEl>
+                                          </p:spTgt>
+                                        </p:tgtEl>
+                                        <p:attrNameLst>
+                                          <p:attrName>style.visibility</p:attrName>
+                                        </p:attrNameLst>
+                                      </p:cBhvr>
+                                      <p:to>
+                                        <p:strVal val="visible"/>
+                                      </p:to>
+                                    </p:set>
+                                  </p:childTnLst>
+                                </p:cTn>
+                              </p:par>
+                            </p:childTnLst>
+                          </p:cTn>
+                        </p:par>
+                      </p:childTnLst>
+                    </p:cTn>
+                  </p:par>
+                  <p:par>
+                    <p:cTn id="15" fill="hold">
+                      <p:stCondLst>
+                        <p:cond delay="indefinite"/>
+                      </p:stCondLst>
+                      <p:childTnLst>
+                        <p:par>
+                          <p:cTn id="16" fill="hold">
+                            <p:stCondLst>
+                              <p:cond delay="0"/>
+                            </p:stCondLst>
+                            <p:childTnLst>
+                              <p:par>
+                                <p:cTn id="17" presetID="1" presetClass="entr" presetSubtype="0" fill="hold" grpId="0" nodeType="clickEffect">
+                                  <p:stCondLst>
+                                    <p:cond delay="0"/>
+                                  </p:stCondLst>
+                                  <p:childTnLst>
+                                    <p:set>
+                                      <p:cBhvr>
+                                        <p:cTn id="18" dur="1" fill="hold">
+                                          <p:stCondLst>
+                                            <p:cond delay="0"/>
+                                          </p:stCondLst>
+                                        </p:cTn>
+                                        <p:tgtEl>
+                                          <p:spTgt spid="3">
+                                            <p:txEl>
+                                              <p:pRg st="3" end="3"/>
+                                            </p:txEl>
+                                          </p:spTgt>
+                                        </p:tgtEl>
+                                        <p:attrNameLst>
+                                          <p:attrName>style.visibility</p:attrName>
+                                        </p:attrNameLst>
+                                      </p:cBhvr>
+                                      <p:to>
+                                        <p:strVal val="visible"/>
+                                      </p:to>
+                                    </p:set>
+                                  </p:childTnLst>
+                                </p:cTn>
+                              </p:par>
+                            </p:childTnLst>
+                          </p:cTn>
+                        </p:par>
+                      </p:childTnLst>
+                    </p:cTn>
+                  </p:par>
+                  <p:par>
+                    <p:cTn id="19" fill="hold">
+                      <p:stCondLst>
+                        <p:cond delay="indefinite"/>
+                      </p:stCondLst>
+                      <p:childTnLst>
+                        <p:par>
+                          <p:cTn id="20" fill="hold">
+                            <p:stCondLst>
+                              <p:cond delay="0"/>
+                            </p:stCondLst>
+                            <p:childTnLst>
+                              <p:par>
+                                <p:cTn id="21" presetID="1" presetClass="entr" presetSubtype="0" fill="hold" grpId="0" nodeType="clickEffect">
+                                  <p:stCondLst>
+                                    <p:cond delay="0"/>
+                                  </p:stCondLst>
+                                  <p:childTnLst>
+                                    <p:set>
+                                      <p:cBhvr>
+                                        <p:cTn id="22" dur="1" fill="hold">
+                                          <p:stCondLst>
+                                            <p:cond delay="0"/>
+                                          </p:stCondLst>
+                                        </p:cTn>
+                                        <p:tgtEl>
+                                          <p:spTgt spid="5"/>
+                                        </p:tgtEl>
+                                        <p:attrNameLst>
+                                          <p:attrName>style.visibility</p:attrName>
+                                        </p:attrNameLst>
+                                      </p:cBhvr>
+                                      <p:to>
+                                        <p:strVal val="visible"/>
+                                      </p:to>
+                                    </p:set>
+                                  </p:childTnLst>
+                                </p:cTn>
+                              </p:par>
+                            </p:childTnLst>
+                          </p:cTn>
+                        </p:par>
+                      </p:childTnLst>
+                    </p:cTn>
+                  </p:par>
+                  <p:par>
+                    <p:cTn id="23" fill="hold">
+                      <p:stCondLst>
+                        <p:cond delay="indefinite"/>
+                      </p:stCondLst>
+                      <p:childTnLst>
+                        <p:par>
+                          <p:cTn id="24" fill="hold">
+                            <p:stCondLst>
+                              <p:cond delay="0"/>
+                            </p:stCondLst>
+                            <p:childTnLst>
+                              <p:par>
+                                <p:cTn id="25" presetID="1" presetClass="entr" presetSubtype="0" fill="hold" grpId="0" nodeType="clickEffect">
+                                  <p:stCondLst>
+                                    <p:cond delay="0"/>
+                                  </p:stCondLst>
+                                  <p:childTnLst>
+                                    <p:set>
+                                      <p:cBhvr>
+                                        <p:cTn id="26" dur="1" fill="hold">
+                                          <p:stCondLst>
+                                            <p:cond delay="0"/>
+                                          </p:stCondLst>
+                                        </p:cTn>
+                                        <p:tgtEl>
+                                          <p:spTgt spid="6"/>
+                                        </p:tgtEl>
+                                        <p:attrNameLst>
+                                          <p:attrName>style.visibility</p:attrName>
+                                        </p:attrNameLst>
+                                      </p:cBhvr>
+                                      <p:to>
+                                        <p:strVal val="visible"/>
+                                      </p:to>
+                                    </p:set>
+                                  </p:childTnLst>
+                                </p:cTn>
+                              </p:par>
+                            </p:childTnLst>
+                          </p:cTn>
+                        </p:par>
+                      </p:childTnLst>
+                    </p:cTn>
+                  </p:par>
+                  <p:par>
+                    <p:cTn id="27" fill="hold">
+                      <p:stCondLst>
+                        <p:cond delay="indefinite"/>
+                      </p:stCondLst>
+                      <p:childTnLst>
+                        <p:par>
+                          <p:cTn id="28" fill="hold">
+                            <p:stCondLst>
+                              <p:cond delay="0"/>
+                            </p:stCondLst>
+                            <p:childTnLst>
+                              <p:par>
+                                <p:cTn id="29" presetID="1" presetClass="entr" presetSubtype="0" fill="hold" grpId="0" nodeType="clickEffect">
+                                  <p:stCondLst>
+                                    <p:cond delay="0"/>
+                                  </p:stCondLst>
+                                  <p:childTnLst>
+                                    <p:set>
+                                      <p:cBhvr>
+                                        <p:cTn id="30" dur="1" fill="hold">
+                                          <p:stCondLst>
+                                            <p:cond delay="0"/>
+                                          </p:stCondLst>
+                                        </p:cTn>
+                                        <p:tgtEl>
+                                          <p:spTgt spid="7"/>
+                                        </p:tgtEl>
+                                        <p:attrNameLst>
+                                          <p:attrName>style.visibility</p:attrName>
+                                        </p:attrNameLst>
+                                      </p:cBhvr>
+                                      <p:to>
+                                        <p:strVal val="visible"/>
+                                      </p:to>
+                                    </p:set>
+                                  </p:childTnLst>
+                                </p:cTn>
+                              </p:par>
+                            </p:childTnLst>
+                          </p:cTn>
+                        </p:par>
+                      </p:childTnLst>
+                    </p:cTn>
+                  </p:par>
+                  <p:par>
+                    <p:cTn id="31" fill="hold">
+                      <p:stCondLst>
+                        <p:cond delay="indefinite"/>
+                      </p:stCondLst>
+                      <p:childTnLst>
+                        <p:par>
+                          <p:cTn id="32" fill="hold">
+                            <p:stCondLst>
+                              <p:cond delay="0"/>
+                            </p:stCondLst>
+                            <p:childTnLst>
+                              <p:par>
+                                <p:cTn id="33" presetID="1" presetClass="entr" presetSubtype="0" fill="hold" grpId="0" nodeType="clickEffect">
+                                  <p:stCondLst>
+                                    <p:cond delay="0"/>
+                                  </p:stCondLst>
+                                  <p:childTnLst>
+                                    <p:set>
+                                      <p:cBhvr>
+                                        <p:cTn id="34" dur="1" fill="hold">
+                                          <p:stCondLst>
+                                            <p:cond delay="0"/>
+                                          </p:stCondLst>
+                                        </p:cTn>
+                                        <p:tgtEl>
+                                          <p:spTgt spid="8"/>
+                                        </p:tgtEl>
+                                        <p:attrNameLst>
+                                          <p:attrName>style.visibility</p:attrName>
+                                        </p:attrNameLst>
+                                      </p:cBhvr>
+                                      <p:to>
+                                        <p:strVal val="visible"/>
+                                      </p:to>
+                                    </p:set>
+                                  </p:childTnLst>
+                                </p:cTn>
+                              </p:par>
+                            </p:childTnLst>
+                          </p:cTn>
+                        </p:par>
+                      </p:childTnLst>
+                    </p:cTn>
+                  </p:par>
+                </p:childTnLst>
+              </p:cTn>
+              <p:prevCondLst>
+                <p:cond evt="onPrev" delay="0">
+                  <p:tgtEl>
+                    <p:sldTgt/>
+                  </p:tgtEl>
+                </p:cond>
+              </p:prevCondLst>
+              <p:nextCondLst>
+                <p:cond evt="onNext" delay="0">
+                  <p:tgtEl>
+                    <p:sldTgt/>
+                  </p:tgtEl>
+                </p:cond>
+              </p:nextCondLst>
+            </p:seq>
+          </p:childTnLst>
+        </p:cTn>
+      </p:par>
+    </p:tnLst>
+    <p:bldLst>
+      <p:bldP spid="3" grpId="0" build="p"/>
+      <p:bldP spid="5" grpId="0" animBg="1"/>
+      <p:bldP spid="6" grpId="0" animBg="1"/>
+      <p:bldP spid="7" grpId="0" animBg="1"/>
+      <p:bldP spid="8" grpId="0" animBg="1"/>
+    </p:bldLst>
+  </p:timing>
+</p:sld>
+</file>
+
+<file path=ppt/slides/slide6.xml><?xml version="1.0" encoding="utf-8"?>
 <p:sld xmlns:a="http://schemas.openxmlformats.org/drawingml/2006/main" xmlns:r="http://schemas.openxmlformats.org/officeDocument/2006/relationships" xmlns:p="http://schemas.openxmlformats.org/presentationml/2006/main">
   <p:cSld>
     <p:spTree>
@@ -11921,6 +13915,58 @@
           </a:p>
         </p:txBody>
       </p:sp>
+      <p:sp>
+        <p:nvSpPr>
+          <p:cNvPr id="2" name="Slide Number Placeholder 1">
+            <a:extLst>
+              <a:ext uri="{FF2B5EF4-FFF2-40B4-BE49-F238E27FC236}">
+                <a16:creationId xmlns:a16="http://schemas.microsoft.com/office/drawing/2014/main" id="{7C43A16B-21EC-DF40-A024-7C72CC0531B5}"/>
+              </a:ext>
+            </a:extLst>
+          </p:cNvPr>
+          <p:cNvSpPr>
+            <a:spLocks noGrp="1"/>
+          </p:cNvSpPr>
+          <p:nvPr>
+            <p:ph type="sldNum" idx="12"/>
+          </p:nvPr>
+        </p:nvSpPr>
+        <p:spPr/>
+        <p:txBody>
+          <a:bodyPr/>
+          <a:lstStyle/>
+          <a:p>
+            <a:pPr marL="0" marR="0" lvl="0" indent="0" algn="r" rtl="0">
+              <a:spcBef>
+                <a:spcPts val="0"/>
+              </a:spcBef>
+              <a:buSzPct val="25000"/>
+              <a:buNone/>
+            </a:pPr>
+            <a:fld id="{00000000-1234-1234-1234-123412341234}" type="slidenum">
+              <a:rPr lang="en-US" sz="1200" smtClean="0">
+                <a:solidFill>
+                  <a:srgbClr val="888888"/>
+                </a:solidFill>
+                <a:latin typeface="Calibri"/>
+                <a:ea typeface="Calibri"/>
+                <a:cs typeface="Calibri"/>
+                <a:sym typeface="Calibri"/>
+              </a:rPr>
+              <a:t>6</a:t>
+            </a:fld>
+            <a:endParaRPr lang="en-US" sz="1200">
+              <a:solidFill>
+                <a:srgbClr val="888888"/>
+              </a:solidFill>
+              <a:latin typeface="Calibri"/>
+              <a:ea typeface="Calibri"/>
+              <a:cs typeface="Calibri"/>
+              <a:sym typeface="Calibri"/>
+            </a:endParaRPr>
+          </a:p>
+        </p:txBody>
+      </p:sp>
     </p:spTree>
   </p:cSld>
   <p:clrMapOvr>
@@ -11929,7 +13975,7 @@
 </p:sld>
 </file>
 
-<file path=ppt/slides/slide6.xml><?xml version="1.0" encoding="utf-8"?>
+<file path=ppt/slides/slide7.xml><?xml version="1.0" encoding="utf-8"?>
 <p:sld xmlns:a="http://schemas.openxmlformats.org/drawingml/2006/main" xmlns:r="http://schemas.openxmlformats.org/officeDocument/2006/relationships" xmlns:p="http://schemas.openxmlformats.org/presentationml/2006/main">
   <p:cSld>
     <p:spTree>
@@ -12124,6 +14170,58 @@
           </a:p>
         </p:txBody>
       </p:sp>
+      <p:sp>
+        <p:nvSpPr>
+          <p:cNvPr id="2" name="Slide Number Placeholder 1">
+            <a:extLst>
+              <a:ext uri="{FF2B5EF4-FFF2-40B4-BE49-F238E27FC236}">
+                <a16:creationId xmlns:a16="http://schemas.microsoft.com/office/drawing/2014/main" id="{9B7A854A-A5DF-5647-AF59-D7A5444C38D2}"/>
+              </a:ext>
+            </a:extLst>
+          </p:cNvPr>
+          <p:cNvSpPr>
+            <a:spLocks noGrp="1"/>
+          </p:cNvSpPr>
+          <p:nvPr>
+            <p:ph type="sldNum" idx="12"/>
+          </p:nvPr>
+        </p:nvSpPr>
+        <p:spPr/>
+        <p:txBody>
+          <a:bodyPr/>
+          <a:lstStyle/>
+          <a:p>
+            <a:pPr marL="0" marR="0" lvl="0" indent="0" algn="r" rtl="0">
+              <a:spcBef>
+                <a:spcPts val="0"/>
+              </a:spcBef>
+              <a:buSzPct val="25000"/>
+              <a:buNone/>
+            </a:pPr>
+            <a:fld id="{00000000-1234-1234-1234-123412341234}" type="slidenum">
+              <a:rPr lang="en-US" sz="1200" smtClean="0">
+                <a:solidFill>
+                  <a:srgbClr val="888888"/>
+                </a:solidFill>
+                <a:latin typeface="Calibri"/>
+                <a:ea typeface="Calibri"/>
+                <a:cs typeface="Calibri"/>
+                <a:sym typeface="Calibri"/>
+              </a:rPr>
+              <a:t>7</a:t>
+            </a:fld>
+            <a:endParaRPr lang="en-US" sz="1200">
+              <a:solidFill>
+                <a:srgbClr val="888888"/>
+              </a:solidFill>
+              <a:latin typeface="Calibri"/>
+              <a:ea typeface="Calibri"/>
+              <a:cs typeface="Calibri"/>
+              <a:sym typeface="Calibri"/>
+            </a:endParaRPr>
+          </a:p>
+        </p:txBody>
+      </p:sp>
     </p:spTree>
   </p:cSld>
   <p:clrMapOvr>
@@ -12132,7 +14230,7 @@
 </p:sld>
 </file>
 
-<file path=ppt/slides/slide7.xml><?xml version="1.0" encoding="utf-8"?>
+<file path=ppt/slides/slide8.xml><?xml version="1.0" encoding="utf-8"?>
 <p:sld xmlns:a="http://schemas.openxmlformats.org/drawingml/2006/main" xmlns:r="http://schemas.openxmlformats.org/officeDocument/2006/relationships" xmlns:p="http://schemas.openxmlformats.org/presentationml/2006/main">
   <p:cSld>
     <p:spTree>
@@ -12327,6 +14425,58 @@
           </a:p>
         </p:txBody>
       </p:sp>
+      <p:sp>
+        <p:nvSpPr>
+          <p:cNvPr id="2" name="Slide Number Placeholder 1">
+            <a:extLst>
+              <a:ext uri="{FF2B5EF4-FFF2-40B4-BE49-F238E27FC236}">
+                <a16:creationId xmlns:a16="http://schemas.microsoft.com/office/drawing/2014/main" id="{71071C89-B174-1D4E-9A44-5DA4F8747D0C}"/>
+              </a:ext>
+            </a:extLst>
+          </p:cNvPr>
+          <p:cNvSpPr>
+            <a:spLocks noGrp="1"/>
+          </p:cNvSpPr>
+          <p:nvPr>
+            <p:ph type="sldNum" idx="12"/>
+          </p:nvPr>
+        </p:nvSpPr>
+        <p:spPr/>
+        <p:txBody>
+          <a:bodyPr/>
+          <a:lstStyle/>
+          <a:p>
+            <a:pPr marL="0" marR="0" lvl="0" indent="0" algn="r" rtl="0">
+              <a:spcBef>
+                <a:spcPts val="0"/>
+              </a:spcBef>
+              <a:buSzPct val="25000"/>
+              <a:buNone/>
+            </a:pPr>
+            <a:fld id="{00000000-1234-1234-1234-123412341234}" type="slidenum">
+              <a:rPr lang="en-US" sz="1200" smtClean="0">
+                <a:solidFill>
+                  <a:srgbClr val="888888"/>
+                </a:solidFill>
+                <a:latin typeface="Calibri"/>
+                <a:ea typeface="Calibri"/>
+                <a:cs typeface="Calibri"/>
+                <a:sym typeface="Calibri"/>
+              </a:rPr>
+              <a:t>8</a:t>
+            </a:fld>
+            <a:endParaRPr lang="en-US" sz="1200">
+              <a:solidFill>
+                <a:srgbClr val="888888"/>
+              </a:solidFill>
+              <a:latin typeface="Calibri"/>
+              <a:ea typeface="Calibri"/>
+              <a:cs typeface="Calibri"/>
+              <a:sym typeface="Calibri"/>
+            </a:endParaRPr>
+          </a:p>
+        </p:txBody>
+      </p:sp>
     </p:spTree>
   </p:cSld>
   <p:clrMapOvr>
@@ -12335,7 +14485,7 @@
 </p:sld>
 </file>
 
-<file path=ppt/slides/slide8.xml><?xml version="1.0" encoding="utf-8"?>
+<file path=ppt/slides/slide9.xml><?xml version="1.0" encoding="utf-8"?>
 <p:sld xmlns:a="http://schemas.openxmlformats.org/drawingml/2006/main" xmlns:r="http://schemas.openxmlformats.org/officeDocument/2006/relationships" xmlns:p="http://schemas.openxmlformats.org/presentationml/2006/main">
   <p:cSld>
     <p:spTree>
@@ -12530,215 +14680,55 @@
           </a:p>
         </p:txBody>
       </p:sp>
-    </p:spTree>
-  </p:cSld>
-  <p:clrMapOvr>
-    <a:masterClrMapping/>
-  </p:clrMapOvr>
-</p:sld>
-</file>
-
-<file path=ppt/slides/slide9.xml><?xml version="1.0" encoding="utf-8"?>
-<p:sld xmlns:a="http://schemas.openxmlformats.org/drawingml/2006/main" xmlns:r="http://schemas.openxmlformats.org/officeDocument/2006/relationships" xmlns:p="http://schemas.openxmlformats.org/presentationml/2006/main">
-  <p:cSld>
-    <p:spTree>
-      <p:nvGrpSpPr>
-        <p:cNvPr id="1" name="Shape 113"/>
-        <p:cNvGrpSpPr/>
-        <p:nvPr/>
-      </p:nvGrpSpPr>
-      <p:grpSpPr>
-        <a:xfrm>
-          <a:off x="0" y="0"/>
-          <a:ext cx="0" cy="0"/>
-          <a:chOff x="0" y="0"/>
-          <a:chExt cx="0" cy="0"/>
-        </a:xfrm>
-      </p:grpSpPr>
-      <p:sp>
-        <p:nvSpPr>
-          <p:cNvPr id="114" name="Shape 114"/>
-          <p:cNvSpPr txBox="1">
+      <p:sp>
+        <p:nvSpPr>
+          <p:cNvPr id="2" name="Slide Number Placeholder 1">
+            <a:extLst>
+              <a:ext uri="{FF2B5EF4-FFF2-40B4-BE49-F238E27FC236}">
+                <a16:creationId xmlns:a16="http://schemas.microsoft.com/office/drawing/2014/main" id="{12240CCA-F600-C447-9D78-BA5D1F9A2754}"/>
+              </a:ext>
+            </a:extLst>
+          </p:cNvPr>
+          <p:cNvSpPr>
             <a:spLocks noGrp="1"/>
           </p:cNvSpPr>
           <p:nvPr>
-            <p:ph type="title"/>
+            <p:ph type="sldNum" idx="12"/>
           </p:nvPr>
         </p:nvSpPr>
-        <p:spPr>
-          <a:xfrm>
-            <a:off x="457200" y="274637"/>
-            <a:ext cx="8229600" cy="1143000"/>
-          </a:xfrm>
-          <a:prstGeom prst="rect">
-            <a:avLst/>
-          </a:prstGeom>
-          <a:noFill/>
-          <a:ln>
-            <a:noFill/>
-          </a:ln>
-        </p:spPr>
+        <p:spPr/>
         <p:txBody>
-          <a:bodyPr lIns="91425" tIns="45700" rIns="91425" bIns="45700" anchor="ctr" anchorCtr="0">
-            <a:noAutofit/>
-          </a:bodyPr>
+          <a:bodyPr/>
           <a:lstStyle/>
           <a:p>
-            <a:pPr marL="0" marR="0" lvl="0" indent="0" algn="ctr" rtl="0">
-              <a:spcBef>
-                <a:spcPts val="0"/>
-              </a:spcBef>
-              <a:buClr>
-                <a:schemeClr val="dk1"/>
-              </a:buClr>
+            <a:pPr marL="0" marR="0" lvl="0" indent="0" algn="r" rtl="0">
+              <a:spcBef>
+                <a:spcPts val="0"/>
+              </a:spcBef>
               <a:buSzPct val="25000"/>
-              <a:buFont typeface="Calibri"/>
-              <a:buNone/>
-            </a:pPr>
-            <a:r>
-              <a:rPr lang="en-US" sz="3959" b="0" i="0" u="none" strike="noStrike" cap="none">
-                <a:solidFill>
-                  <a:schemeClr val="dk1"/>
-                </a:solidFill>
-                <a:latin typeface="Calibri"/>
-                <a:ea typeface="Calibri"/>
-                <a:cs typeface="Calibri"/>
-                <a:sym typeface="Calibri"/>
-              </a:rPr>
-              <a:t>Rich Programmer Food, Steve Yegge</a:t>
-            </a:r>
-          </a:p>
-        </p:txBody>
-      </p:sp>
-      <p:sp>
-        <p:nvSpPr>
-          <p:cNvPr id="115" name="Shape 115"/>
-          <p:cNvSpPr txBox="1">
-            <a:spLocks noGrp="1"/>
-          </p:cNvSpPr>
-          <p:nvPr>
-            <p:ph type="body" idx="1"/>
-          </p:nvPr>
-        </p:nvSpPr>
-        <p:spPr>
-          <a:xfrm>
-            <a:off x="457200" y="1600200"/>
-            <a:ext cx="8229600" cy="4525963"/>
-          </a:xfrm>
-          <a:prstGeom prst="rect">
-            <a:avLst/>
-          </a:prstGeom>
-          <a:noFill/>
-          <a:ln>
-            <a:noFill/>
-          </a:ln>
-        </p:spPr>
-        <p:txBody>
-          <a:bodyPr lIns="91425" tIns="45700" rIns="91425" bIns="45700" anchor="t" anchorCtr="0">
-            <a:noAutofit/>
-          </a:bodyPr>
-          <a:lstStyle/>
-          <a:p>
-            <a:pPr marL="342900" marR="0" lvl="0" indent="-342900" algn="l" rtl="0">
-              <a:lnSpc>
-                <a:spcPct val="90000"/>
-              </a:lnSpc>
-              <a:spcBef>
-                <a:spcPts val="0"/>
-              </a:spcBef>
-              <a:spcAft>
-                <a:spcPts val="0"/>
-              </a:spcAft>
-              <a:buClr>
-                <a:schemeClr val="dk1"/>
-              </a:buClr>
-              <a:buSzPct val="100000"/>
-              <a:buFont typeface="Arial"/>
-              <a:buChar char="•"/>
-            </a:pPr>
-            <a:r>
-              <a:rPr lang="en-US" sz="3200" b="0" i="0" u="none" strike="noStrike" cap="none">
-                <a:solidFill>
-                  <a:schemeClr val="dk1"/>
-                </a:solidFill>
-                <a:latin typeface="Calibri"/>
-                <a:ea typeface="Calibri"/>
-                <a:cs typeface="Calibri"/>
-                <a:sym typeface="Calibri"/>
-              </a:rPr>
-              <a:t>Situation 5: You have to communicate with a new router that has a telnet interface and a proprietary command language. You need to parse the responses in this language and look for patterns and produce new commands.</a:t>
-            </a:r>
-          </a:p>
-          <a:p>
-            <a:pPr marL="742950" marR="0" lvl="1" indent="-285750" algn="l" rtl="0">
-              <a:lnSpc>
-                <a:spcPct val="90000"/>
-              </a:lnSpc>
-              <a:spcBef>
-                <a:spcPts val="560"/>
-              </a:spcBef>
-              <a:spcAft>
-                <a:spcPts val="0"/>
-              </a:spcAft>
-              <a:buClr>
-                <a:srgbClr val="000000"/>
-              </a:buClr>
-              <a:buSzPct val="100000"/>
-              <a:buFont typeface="Arial"/>
-              <a:buChar char="–"/>
-            </a:pPr>
-            <a:r>
-              <a:rPr lang="en-US" sz="2800" b="0" i="0" u="none" strike="noStrike" cap="none">
-                <a:solidFill>
-                  <a:srgbClr val="000000"/>
-                </a:solidFill>
-                <a:latin typeface="Calibri"/>
-                <a:ea typeface="Calibri"/>
-                <a:cs typeface="Calibri"/>
-                <a:sym typeface="Calibri"/>
-              </a:rPr>
-              <a:t>Steve’s answer: </a:t>
-            </a:r>
-            <a:r>
-              <a:rPr lang="en-US" sz="2800" b="0" i="0" u="none" strike="noStrike" cap="none">
-                <a:solidFill>
-                  <a:srgbClr val="1F497D"/>
-                </a:solidFill>
-                <a:latin typeface="Calibri"/>
-                <a:ea typeface="Calibri"/>
-                <a:cs typeface="Calibri"/>
-                <a:sym typeface="Calibri"/>
-              </a:rPr>
-              <a:t>Perl. It's a swiss army knife. You can use it to sidestep this problem with honor, by disemboweling yourself.</a:t>
-            </a:r>
-          </a:p>
-          <a:p>
-            <a:pPr marL="742950" marR="0" lvl="1" indent="-285750" algn="l" rtl="0">
-              <a:lnSpc>
-                <a:spcPct val="90000"/>
-              </a:lnSpc>
-              <a:spcBef>
-                <a:spcPts val="560"/>
-              </a:spcBef>
-              <a:buClr>
-                <a:schemeClr val="dk1"/>
-              </a:buClr>
-              <a:buSzPct val="100000"/>
-              <a:buFont typeface="Arial"/>
-              <a:buChar char="–"/>
-            </a:pPr>
-            <a:r>
-              <a:rPr lang="en-US" sz="2800" b="0" i="0" u="none" strike="noStrike" cap="none">
-                <a:solidFill>
-                  <a:schemeClr val="dk1"/>
-                </a:solidFill>
-                <a:latin typeface="Calibri"/>
-                <a:ea typeface="Calibri"/>
-                <a:cs typeface="Calibri"/>
-                <a:sym typeface="Calibri"/>
-              </a:rPr>
-              <a:t>Steve’s real answer: Lexing and parsing and codegen</a:t>
-            </a:r>
+              <a:buNone/>
+            </a:pPr>
+            <a:fld id="{00000000-1234-1234-1234-123412341234}" type="slidenum">
+              <a:rPr lang="en-US" sz="1200" smtClean="0">
+                <a:solidFill>
+                  <a:srgbClr val="888888"/>
+                </a:solidFill>
+                <a:latin typeface="Calibri"/>
+                <a:ea typeface="Calibri"/>
+                <a:cs typeface="Calibri"/>
+                <a:sym typeface="Calibri"/>
+              </a:rPr>
+              <a:t>9</a:t>
+            </a:fld>
+            <a:endParaRPr lang="en-US" sz="1200">
+              <a:solidFill>
+                <a:srgbClr val="888888"/>
+              </a:solidFill>
+              <a:latin typeface="Calibri"/>
+              <a:ea typeface="Calibri"/>
+              <a:cs typeface="Calibri"/>
+              <a:sym typeface="Calibri"/>
+            </a:endParaRPr>
           </a:p>
         </p:txBody>
       </p:sp>

</xml_diff>

<commit_message>
added new video lectures for IN1 and IN2
</commit_message>
<xml_diff>
--- a/assets/ppt/intro/in1-evangelize-compilers.pptx
+++ b/assets/ppt/intro/in1-evangelize-compilers.pptx
@@ -11268,8 +11268,13 @@
             </a:r>
             <a:r>
               <a:rPr lang="en-US" dirty="0"/>
-              <a:t>: How do you auto-format source code of a huge Java library?</a:t>
-            </a:r>
+              <a:t>: How do you auto-format source code of a Java library</a:t>
+            </a:r>
+            <a:r>
+              <a:rPr lang="en-CA" dirty="0"/>
+              <a:t> with &gt;1M lines of code using your company’s formatting guidelines?</a:t>
+            </a:r>
+            <a:endParaRPr lang="en-US" dirty="0"/>
           </a:p>
           <a:p>
             <a:r>
@@ -11352,6 +11357,137 @@
   <p:clrMapOvr>
     <a:masterClrMapping/>
   </p:clrMapOvr>
+  <p:timing>
+    <p:tnLst>
+      <p:par>
+        <p:cTn id="1" dur="indefinite" restart="never" nodeType="tmRoot">
+          <p:childTnLst>
+            <p:seq concurrent="1" nextAc="seek">
+              <p:cTn id="2" dur="indefinite" nodeType="mainSeq">
+                <p:childTnLst>
+                  <p:par>
+                    <p:cTn id="3" fill="hold">
+                      <p:stCondLst>
+                        <p:cond delay="indefinite"/>
+                      </p:stCondLst>
+                      <p:childTnLst>
+                        <p:par>
+                          <p:cTn id="4" fill="hold">
+                            <p:stCondLst>
+                              <p:cond delay="0"/>
+                            </p:stCondLst>
+                            <p:childTnLst>
+                              <p:par>
+                                <p:cTn id="5" presetID="1" presetClass="entr" presetSubtype="0" fill="hold" grpId="0" nodeType="clickEffect">
+                                  <p:stCondLst>
+                                    <p:cond delay="0"/>
+                                  </p:stCondLst>
+                                  <p:childTnLst>
+                                    <p:set>
+                                      <p:cBhvr>
+                                        <p:cTn id="6" dur="1" fill="hold">
+                                          <p:stCondLst>
+                                            <p:cond delay="0"/>
+                                          </p:stCondLst>
+                                        </p:cTn>
+                                        <p:tgtEl>
+                                          <p:spTgt spid="3">
+                                            <p:txEl>
+                                              <p:pRg st="0" end="0"/>
+                                            </p:txEl>
+                                          </p:spTgt>
+                                        </p:tgtEl>
+                                        <p:attrNameLst>
+                                          <p:attrName>style.visibility</p:attrName>
+                                        </p:attrNameLst>
+                                      </p:cBhvr>
+                                      <p:to>
+                                        <p:strVal val="visible"/>
+                                      </p:to>
+                                    </p:set>
+                                  </p:childTnLst>
+                                </p:cTn>
+                              </p:par>
+                            </p:childTnLst>
+                          </p:cTn>
+                        </p:par>
+                      </p:childTnLst>
+                    </p:cTn>
+                  </p:par>
+                  <p:par>
+                    <p:cTn id="7" fill="hold">
+                      <p:stCondLst>
+                        <p:cond delay="indefinite"/>
+                      </p:stCondLst>
+                      <p:childTnLst>
+                        <p:par>
+                          <p:cTn id="8" fill="hold">
+                            <p:stCondLst>
+                              <p:cond delay="0"/>
+                            </p:stCondLst>
+                            <p:childTnLst>
+                              <p:par>
+                                <p:cTn id="9" presetID="1" presetClass="entr" presetSubtype="0" fill="hold" grpId="0" nodeType="clickEffect">
+                                  <p:stCondLst>
+                                    <p:cond delay="0"/>
+                                  </p:stCondLst>
+                                  <p:childTnLst>
+                                    <p:set>
+                                      <p:cBhvr>
+                                        <p:cTn id="10" dur="1" fill="hold">
+                                          <p:stCondLst>
+                                            <p:cond delay="0"/>
+                                          </p:stCondLst>
+                                        </p:cTn>
+                                        <p:tgtEl>
+                                          <p:spTgt spid="3">
+                                            <p:txEl>
+                                              <p:pRg st="1" end="1"/>
+                                            </p:txEl>
+                                          </p:spTgt>
+                                        </p:tgtEl>
+                                        <p:attrNameLst>
+                                          <p:attrName>style.visibility</p:attrName>
+                                        </p:attrNameLst>
+                                      </p:cBhvr>
+                                      <p:to>
+                                        <p:strVal val="visible"/>
+                                      </p:to>
+                                    </p:set>
+                                  </p:childTnLst>
+                                </p:cTn>
+                              </p:par>
+                            </p:childTnLst>
+                          </p:cTn>
+                        </p:par>
+                      </p:childTnLst>
+                    </p:cTn>
+                  </p:par>
+                </p:childTnLst>
+              </p:cTn>
+              <p:prevCondLst>
+                <p:cond evt="onPrev" delay="0">
+                  <p:tgtEl>
+                    <p:sldTgt/>
+                  </p:tgtEl>
+                </p:cond>
+              </p:prevCondLst>
+              <p:nextCondLst>
+                <p:cond evt="onNext" delay="0">
+                  <p:tgtEl>
+                    <p:sldTgt/>
+                  </p:tgtEl>
+                </p:cond>
+              </p:nextCondLst>
+            </p:seq>
+          </p:childTnLst>
+        </p:cTn>
+      </p:par>
+    </p:tnLst>
+    <p:bldLst>
+      <p:bldP spid="3" grpId="0" build="p"/>
+    </p:bldLst>
+  </p:timing>
 </p:sld>
 </file>
 
@@ -11842,8 +11978,13 @@
             </a:r>
             <a:r>
               <a:rPr lang="en-US" dirty="0"/>
-              <a:t>: The “software engineers” at your company have decided to redesign the entire code base to make it easier to add to the codebase. You have to write them a tool to ensure code maintenance does not get worse?</a:t>
-            </a:r>
+              <a:t>: The “software engineers” at your company have decided to redesign the entire code base to make it easier to add to the codebase. You have to write them a tool to ensure code maintenance does not get worse</a:t>
+            </a:r>
+            <a:r>
+              <a:rPr lang="en-CA" dirty="0"/>
+              <a:t>.</a:t>
+            </a:r>
+            <a:endParaRPr lang="en-US" dirty="0"/>
           </a:p>
           <a:p>
             <a:r>

</xml_diff>

<commit_message>
add zip file names
</commit_message>
<xml_diff>
--- a/assets/ppt/intro/in1-evangelize-compilers.pptx
+++ b/assets/ppt/intro/in1-evangelize-compilers.pptx
@@ -1593,7 +1593,7 @@
           <a:p>
             <a:fld id="{031950AD-E443-1743-A459-21F1AAF6F81A}" type="datetime1">
               <a:rPr lang="en-CA" smtClean="0"/>
-              <a:t>2020-09-07</a:t>
+              <a:t>2020-09-10</a:t>
             </a:fld>
             <a:endParaRPr lang="en-US"/>
           </a:p>
@@ -1791,7 +1791,7 @@
           <a:p>
             <a:fld id="{06378DE7-32B7-DE46-BFEF-C88F96B6CB46}" type="datetime1">
               <a:rPr lang="en-CA" smtClean="0"/>
-              <a:t>2020-09-07</a:t>
+              <a:t>2020-09-10</a:t>
             </a:fld>
             <a:endParaRPr lang="en-US"/>
           </a:p>
@@ -1999,7 +1999,7 @@
           <a:p>
             <a:fld id="{E9DA3F3E-97D7-E44B-928F-428312F41925}" type="datetime1">
               <a:rPr lang="en-CA" smtClean="0"/>
-              <a:t>2020-09-07</a:t>
+              <a:t>2020-09-10</a:t>
             </a:fld>
             <a:endParaRPr lang="en-US"/>
           </a:p>
@@ -2349,7 +2349,7 @@
           <a:p>
             <a:fld id="{B8239F57-6224-5A48-B5A0-8B41CBC82DE5}" type="datetime1">
               <a:rPr lang="en-CA" smtClean="0"/>
-              <a:t>2020-09-07</a:t>
+              <a:t>2020-09-10</a:t>
             </a:fld>
             <a:endParaRPr lang="en-US"/>
           </a:p>
@@ -2624,7 +2624,7 @@
           <a:p>
             <a:fld id="{82B3F797-7154-BC4F-9D0E-5EAD5AEED6D6}" type="datetime1">
               <a:rPr lang="en-CA" smtClean="0"/>
-              <a:t>2020-09-07</a:t>
+              <a:t>2020-09-10</a:t>
             </a:fld>
             <a:endParaRPr lang="en-US"/>
           </a:p>
@@ -2889,7 +2889,7 @@
           <a:p>
             <a:fld id="{3097AE3F-C575-B946-9624-8F064FF29641}" type="datetime1">
               <a:rPr lang="en-CA" smtClean="0"/>
-              <a:t>2020-09-07</a:t>
+              <a:t>2020-09-10</a:t>
             </a:fld>
             <a:endParaRPr lang="en-US"/>
           </a:p>
@@ -3301,7 +3301,7 @@
           <a:p>
             <a:fld id="{FCF57352-CE81-D949-8615-D94A6D43C5AB}" type="datetime1">
               <a:rPr lang="en-CA" smtClean="0"/>
-              <a:t>2020-09-07</a:t>
+              <a:t>2020-09-10</a:t>
             </a:fld>
             <a:endParaRPr lang="en-US"/>
           </a:p>
@@ -3442,7 +3442,7 @@
           <a:p>
             <a:fld id="{5644584D-0879-4C43-9A33-9262212C8909}" type="datetime1">
               <a:rPr lang="en-CA" smtClean="0"/>
-              <a:t>2020-09-07</a:t>
+              <a:t>2020-09-10</a:t>
             </a:fld>
             <a:endParaRPr lang="en-US"/>
           </a:p>
@@ -3555,7 +3555,7 @@
           <a:p>
             <a:fld id="{1EF55C8E-3F84-9742-9F0E-FF66F4EE05BA}" type="datetime1">
               <a:rPr lang="en-CA" smtClean="0"/>
-              <a:t>2020-09-07</a:t>
+              <a:t>2020-09-10</a:t>
             </a:fld>
             <a:endParaRPr lang="en-US"/>
           </a:p>
@@ -3866,7 +3866,7 @@
           <a:p>
             <a:fld id="{9F487085-DD22-E94F-A745-BA3BAACACBF9}" type="datetime1">
               <a:rPr lang="en-CA" smtClean="0"/>
-              <a:t>2020-09-07</a:t>
+              <a:t>2020-09-10</a:t>
             </a:fld>
             <a:endParaRPr lang="en-US"/>
           </a:p>
@@ -4154,7 +4154,7 @@
           <a:p>
             <a:fld id="{DF553C96-34AC-1447-87E6-A53840AE668C}" type="datetime1">
               <a:rPr lang="en-CA" smtClean="0"/>
-              <a:t>2020-09-07</a:t>
+              <a:t>2020-09-10</a:t>
             </a:fld>
             <a:endParaRPr lang="en-US"/>
           </a:p>
@@ -4395,7 +4395,7 @@
           <a:p>
             <a:fld id="{478D0DE7-FBBE-9D43-9800-3DF9B4EF63B2}" type="datetime1">
               <a:rPr lang="en-CA" smtClean="0"/>
-              <a:t>2020-09-07</a:t>
+              <a:t>2020-09-10</a:t>
             </a:fld>
             <a:endParaRPr lang="en-US"/>
           </a:p>

</xml_diff>

<commit_message>
updated IN1 lecture notes and video
</commit_message>
<xml_diff>
--- a/assets/ppt/intro/in1-evangelize-compilers.pptx
+++ b/assets/ppt/intro/in1-evangelize-compilers.pptx
@@ -1593,7 +1593,7 @@
           <a:p>
             <a:fld id="{031950AD-E443-1743-A459-21F1AAF6F81A}" type="datetime1">
               <a:rPr lang="en-CA" smtClean="0"/>
-              <a:t>2020-09-10</a:t>
+              <a:t>2021-09-26</a:t>
             </a:fld>
             <a:endParaRPr lang="en-US"/>
           </a:p>
@@ -1791,7 +1791,7 @@
           <a:p>
             <a:fld id="{06378DE7-32B7-DE46-BFEF-C88F96B6CB46}" type="datetime1">
               <a:rPr lang="en-CA" smtClean="0"/>
-              <a:t>2020-09-10</a:t>
+              <a:t>2021-09-26</a:t>
             </a:fld>
             <a:endParaRPr lang="en-US"/>
           </a:p>
@@ -1999,7 +1999,7 @@
           <a:p>
             <a:fld id="{E9DA3F3E-97D7-E44B-928F-428312F41925}" type="datetime1">
               <a:rPr lang="en-CA" smtClean="0"/>
-              <a:t>2020-09-10</a:t>
+              <a:t>2021-09-26</a:t>
             </a:fld>
             <a:endParaRPr lang="en-US"/>
           </a:p>
@@ -2349,7 +2349,7 @@
           <a:p>
             <a:fld id="{B8239F57-6224-5A48-B5A0-8B41CBC82DE5}" type="datetime1">
               <a:rPr lang="en-CA" smtClean="0"/>
-              <a:t>2020-09-10</a:t>
+              <a:t>2021-09-26</a:t>
             </a:fld>
             <a:endParaRPr lang="en-US"/>
           </a:p>
@@ -2624,7 +2624,7 @@
           <a:p>
             <a:fld id="{82B3F797-7154-BC4F-9D0E-5EAD5AEED6D6}" type="datetime1">
               <a:rPr lang="en-CA" smtClean="0"/>
-              <a:t>2020-09-10</a:t>
+              <a:t>2021-09-26</a:t>
             </a:fld>
             <a:endParaRPr lang="en-US"/>
           </a:p>
@@ -2889,7 +2889,7 @@
           <a:p>
             <a:fld id="{3097AE3F-C575-B946-9624-8F064FF29641}" type="datetime1">
               <a:rPr lang="en-CA" smtClean="0"/>
-              <a:t>2020-09-10</a:t>
+              <a:t>2021-09-26</a:t>
             </a:fld>
             <a:endParaRPr lang="en-US"/>
           </a:p>
@@ -3301,7 +3301,7 @@
           <a:p>
             <a:fld id="{FCF57352-CE81-D949-8615-D94A6D43C5AB}" type="datetime1">
               <a:rPr lang="en-CA" smtClean="0"/>
-              <a:t>2020-09-10</a:t>
+              <a:t>2021-09-26</a:t>
             </a:fld>
             <a:endParaRPr lang="en-US"/>
           </a:p>
@@ -3442,7 +3442,7 @@
           <a:p>
             <a:fld id="{5644584D-0879-4C43-9A33-9262212C8909}" type="datetime1">
               <a:rPr lang="en-CA" smtClean="0"/>
-              <a:t>2020-09-10</a:t>
+              <a:t>2021-09-26</a:t>
             </a:fld>
             <a:endParaRPr lang="en-US"/>
           </a:p>
@@ -3555,7 +3555,7 @@
           <a:p>
             <a:fld id="{1EF55C8E-3F84-9742-9F0E-FF66F4EE05BA}" type="datetime1">
               <a:rPr lang="en-CA" smtClean="0"/>
-              <a:t>2020-09-10</a:t>
+              <a:t>2021-09-26</a:t>
             </a:fld>
             <a:endParaRPr lang="en-US"/>
           </a:p>
@@ -3866,7 +3866,7 @@
           <a:p>
             <a:fld id="{9F487085-DD22-E94F-A745-BA3BAACACBF9}" type="datetime1">
               <a:rPr lang="en-CA" smtClean="0"/>
-              <a:t>2020-09-10</a:t>
+              <a:t>2021-09-26</a:t>
             </a:fld>
             <a:endParaRPr lang="en-US"/>
           </a:p>
@@ -4154,7 +4154,7 @@
           <a:p>
             <a:fld id="{DF553C96-34AC-1447-87E6-A53840AE668C}" type="datetime1">
               <a:rPr lang="en-CA" smtClean="0"/>
-              <a:t>2020-09-10</a:t>
+              <a:t>2021-09-26</a:t>
             </a:fld>
             <a:endParaRPr lang="en-US"/>
           </a:p>
@@ -4395,7 +4395,7 @@
           <a:p>
             <a:fld id="{478D0DE7-FBBE-9D43-9800-3DF9B4EF63B2}" type="datetime1">
               <a:rPr lang="en-CA" smtClean="0"/>
-              <a:t>2020-09-10</a:t>
+              <a:t>2021-09-26</a:t>
             </a:fld>
             <a:endParaRPr lang="en-US"/>
           </a:p>
@@ -5083,7 +5083,7 @@
         <p:spPr>
           <a:xfrm>
             <a:off x="709404" y="150998"/>
-            <a:ext cx="7725192" cy="4708981"/>
+            <a:ext cx="6955750" cy="4708981"/>
           </a:xfrm>
           <a:prstGeom prst="rect">
             <a:avLst/>
@@ -5435,6 +5435,1084 @@
                 </a:solidFill>
                 <a:latin typeface="Courier-Bold" pitchFamily="2" charset="0"/>
               </a:rPr>
+              <a:t>do </a:t>
+            </a:r>
+            <a:r>
+              <a:rPr lang="en-US" sz="2000" dirty="0">
+                <a:solidFill>
+                  <a:prstClr val="black"/>
+                </a:solidFill>
+                <a:latin typeface="Courier" pitchFamily="2" charset="0"/>
+              </a:rPr>
+              <a:t>{ </a:t>
+            </a:r>
+            <a:r>
+              <a:rPr lang="en-US" sz="2000" dirty="0">
+                <a:solidFill>
+                  <a:srgbClr val="666666"/>
+                </a:solidFill>
+                <a:latin typeface="Courier" pitchFamily="2" charset="0"/>
+              </a:rPr>
+              <a:t>*</a:t>
+            </a:r>
+            <a:r>
+              <a:rPr lang="en-US" sz="2000" dirty="0">
+                <a:solidFill>
+                  <a:prstClr val="black"/>
+                </a:solidFill>
+                <a:latin typeface="Courier" pitchFamily="2" charset="0"/>
+              </a:rPr>
+              <a:t>to</a:t>
+            </a:r>
+            <a:r>
+              <a:rPr lang="en-US" sz="2000" dirty="0">
+                <a:solidFill>
+                  <a:srgbClr val="666666"/>
+                </a:solidFill>
+                <a:latin typeface="Courier" pitchFamily="2" charset="0"/>
+              </a:rPr>
+              <a:t>++</a:t>
+            </a:r>
+            <a:r>
+              <a:rPr lang="en-US" sz="2000" dirty="0">
+                <a:solidFill>
+                  <a:prstClr val="black"/>
+                </a:solidFill>
+                <a:latin typeface="Courier" pitchFamily="2" charset="0"/>
+              </a:rPr>
+              <a:t> </a:t>
+            </a:r>
+            <a:r>
+              <a:rPr lang="en-US" sz="2000" dirty="0">
+                <a:solidFill>
+                  <a:srgbClr val="666666"/>
+                </a:solidFill>
+                <a:latin typeface="Courier" pitchFamily="2" charset="0"/>
+              </a:rPr>
+              <a:t>=</a:t>
+            </a:r>
+            <a:r>
+              <a:rPr lang="en-US" sz="2000" dirty="0">
+                <a:solidFill>
+                  <a:prstClr val="black"/>
+                </a:solidFill>
+                <a:latin typeface="Courier" pitchFamily="2" charset="0"/>
+              </a:rPr>
+              <a:t> </a:t>
+            </a:r>
+            <a:r>
+              <a:rPr lang="en-US" sz="2000" dirty="0">
+                <a:solidFill>
+                  <a:srgbClr val="666666"/>
+                </a:solidFill>
+                <a:latin typeface="Courier" pitchFamily="2" charset="0"/>
+              </a:rPr>
+              <a:t>*</a:t>
+            </a:r>
+            <a:r>
+              <a:rPr lang="en-US" sz="2000" dirty="0">
+                <a:solidFill>
+                  <a:prstClr val="black"/>
+                </a:solidFill>
+                <a:latin typeface="Courier" pitchFamily="2" charset="0"/>
+              </a:rPr>
+              <a:t>from</a:t>
+            </a:r>
+            <a:r>
+              <a:rPr lang="en-US" sz="2000" dirty="0">
+                <a:solidFill>
+                  <a:srgbClr val="666666"/>
+                </a:solidFill>
+                <a:latin typeface="Courier" pitchFamily="2" charset="0"/>
+              </a:rPr>
+              <a:t>++</a:t>
+            </a:r>
+            <a:r>
+              <a:rPr lang="en-US" sz="2000" dirty="0">
+                <a:solidFill>
+                  <a:prstClr val="black"/>
+                </a:solidFill>
+                <a:latin typeface="Courier" pitchFamily="2" charset="0"/>
+              </a:rPr>
+              <a:t>;  </a:t>
+            </a:r>
+          </a:p>
+          <a:p>
+            <a:r>
+              <a:rPr lang="en-US" sz="2000" b="1" dirty="0">
+                <a:solidFill>
+                  <a:prstClr val="black"/>
+                </a:solidFill>
+                <a:latin typeface="Courier" pitchFamily="2" charset="0"/>
+              </a:rPr>
+              <a:t>	</a:t>
+            </a:r>
+            <a:r>
+              <a:rPr lang="en-US" sz="2000" b="1" dirty="0">
+                <a:solidFill>
+                  <a:srgbClr val="008000"/>
+                </a:solidFill>
+                <a:latin typeface="Courier-Bold" pitchFamily="2" charset="0"/>
+              </a:rPr>
+              <a:t>case</a:t>
+            </a:r>
+            <a:r>
+              <a:rPr lang="en-US" sz="2000" dirty="0">
+                <a:solidFill>
+                  <a:prstClr val="black"/>
+                </a:solidFill>
+                <a:latin typeface="Courier" pitchFamily="2" charset="0"/>
+              </a:rPr>
+              <a:t> </a:t>
+            </a:r>
+            <a:r>
+              <a:rPr lang="en-US" sz="2000" dirty="0">
+                <a:solidFill>
+                  <a:srgbClr val="666666"/>
+                </a:solidFill>
+                <a:latin typeface="Courier" pitchFamily="2" charset="0"/>
+              </a:rPr>
+              <a:t>7:</a:t>
+            </a:r>
+            <a:r>
+              <a:rPr lang="en-US" sz="2000" dirty="0">
+                <a:solidFill>
+                  <a:prstClr val="black"/>
+                </a:solidFill>
+                <a:latin typeface="Courier" pitchFamily="2" charset="0"/>
+              </a:rPr>
+              <a:t>      </a:t>
+            </a:r>
+            <a:r>
+              <a:rPr lang="en-US" sz="2000" dirty="0">
+                <a:solidFill>
+                  <a:srgbClr val="666666"/>
+                </a:solidFill>
+                <a:latin typeface="Courier" pitchFamily="2" charset="0"/>
+              </a:rPr>
+              <a:t>*</a:t>
+            </a:r>
+            <a:r>
+              <a:rPr lang="en-US" sz="2000" dirty="0">
+                <a:solidFill>
+                  <a:prstClr val="black"/>
+                </a:solidFill>
+                <a:latin typeface="Courier" pitchFamily="2" charset="0"/>
+              </a:rPr>
+              <a:t>to</a:t>
+            </a:r>
+            <a:r>
+              <a:rPr lang="en-US" sz="2000" dirty="0">
+                <a:solidFill>
+                  <a:srgbClr val="666666"/>
+                </a:solidFill>
+                <a:latin typeface="Courier" pitchFamily="2" charset="0"/>
+              </a:rPr>
+              <a:t>++</a:t>
+            </a:r>
+            <a:r>
+              <a:rPr lang="en-US" sz="2000" dirty="0">
+                <a:solidFill>
+                  <a:prstClr val="black"/>
+                </a:solidFill>
+                <a:latin typeface="Courier" pitchFamily="2" charset="0"/>
+              </a:rPr>
+              <a:t> </a:t>
+            </a:r>
+            <a:r>
+              <a:rPr lang="en-US" sz="2000" dirty="0">
+                <a:solidFill>
+                  <a:srgbClr val="666666"/>
+                </a:solidFill>
+                <a:latin typeface="Courier" pitchFamily="2" charset="0"/>
+              </a:rPr>
+              <a:t>=</a:t>
+            </a:r>
+            <a:r>
+              <a:rPr lang="en-US" sz="2000" dirty="0">
+                <a:solidFill>
+                  <a:prstClr val="black"/>
+                </a:solidFill>
+                <a:latin typeface="Courier" pitchFamily="2" charset="0"/>
+              </a:rPr>
+              <a:t> </a:t>
+            </a:r>
+            <a:r>
+              <a:rPr lang="en-US" sz="2000" dirty="0">
+                <a:solidFill>
+                  <a:srgbClr val="666666"/>
+                </a:solidFill>
+                <a:latin typeface="Courier" pitchFamily="2" charset="0"/>
+              </a:rPr>
+              <a:t>*</a:t>
+            </a:r>
+            <a:r>
+              <a:rPr lang="en-US" sz="2000" dirty="0">
+                <a:solidFill>
+                  <a:prstClr val="black"/>
+                </a:solidFill>
+                <a:latin typeface="Courier" pitchFamily="2" charset="0"/>
+              </a:rPr>
+              <a:t>from</a:t>
+            </a:r>
+            <a:r>
+              <a:rPr lang="en-US" sz="2000" dirty="0">
+                <a:solidFill>
+                  <a:srgbClr val="666666"/>
+                </a:solidFill>
+                <a:latin typeface="Courier" pitchFamily="2" charset="0"/>
+              </a:rPr>
+              <a:t>++</a:t>
+            </a:r>
+            <a:r>
+              <a:rPr lang="en-US" sz="2000" dirty="0">
+                <a:solidFill>
+                  <a:prstClr val="black"/>
+                </a:solidFill>
+                <a:latin typeface="Courier" pitchFamily="2" charset="0"/>
+              </a:rPr>
+              <a:t>;  </a:t>
+            </a:r>
+          </a:p>
+          <a:p>
+            <a:r>
+              <a:rPr lang="en-US" sz="2000" b="1" dirty="0">
+                <a:solidFill>
+                  <a:prstClr val="black"/>
+                </a:solidFill>
+                <a:latin typeface="Courier" pitchFamily="2" charset="0"/>
+              </a:rPr>
+              <a:t>	</a:t>
+            </a:r>
+            <a:r>
+              <a:rPr lang="en-US" sz="2000" b="1" dirty="0">
+                <a:solidFill>
+                  <a:srgbClr val="008000"/>
+                </a:solidFill>
+                <a:latin typeface="Courier-Bold" pitchFamily="2" charset="0"/>
+              </a:rPr>
+              <a:t>case</a:t>
+            </a:r>
+            <a:r>
+              <a:rPr lang="en-US" sz="2000" dirty="0">
+                <a:solidFill>
+                  <a:prstClr val="black"/>
+                </a:solidFill>
+                <a:latin typeface="Courier" pitchFamily="2" charset="0"/>
+              </a:rPr>
+              <a:t> </a:t>
+            </a:r>
+            <a:r>
+              <a:rPr lang="en-US" sz="2000" dirty="0">
+                <a:solidFill>
+                  <a:srgbClr val="666666"/>
+                </a:solidFill>
+                <a:latin typeface="Courier" pitchFamily="2" charset="0"/>
+              </a:rPr>
+              <a:t>6:</a:t>
+            </a:r>
+            <a:r>
+              <a:rPr lang="en-US" sz="2000" dirty="0">
+                <a:solidFill>
+                  <a:prstClr val="black"/>
+                </a:solidFill>
+                <a:latin typeface="Courier" pitchFamily="2" charset="0"/>
+              </a:rPr>
+              <a:t>      </a:t>
+            </a:r>
+            <a:r>
+              <a:rPr lang="en-US" sz="2000" dirty="0">
+                <a:solidFill>
+                  <a:srgbClr val="666666"/>
+                </a:solidFill>
+                <a:latin typeface="Courier" pitchFamily="2" charset="0"/>
+              </a:rPr>
+              <a:t>*</a:t>
+            </a:r>
+            <a:r>
+              <a:rPr lang="en-US" sz="2000" dirty="0">
+                <a:solidFill>
+                  <a:prstClr val="black"/>
+                </a:solidFill>
+                <a:latin typeface="Courier" pitchFamily="2" charset="0"/>
+              </a:rPr>
+              <a:t>to</a:t>
+            </a:r>
+            <a:r>
+              <a:rPr lang="en-US" sz="2000" dirty="0">
+                <a:solidFill>
+                  <a:srgbClr val="666666"/>
+                </a:solidFill>
+                <a:latin typeface="Courier" pitchFamily="2" charset="0"/>
+              </a:rPr>
+              <a:t>++</a:t>
+            </a:r>
+            <a:r>
+              <a:rPr lang="en-US" sz="2000" dirty="0">
+                <a:solidFill>
+                  <a:prstClr val="black"/>
+                </a:solidFill>
+                <a:latin typeface="Courier" pitchFamily="2" charset="0"/>
+              </a:rPr>
+              <a:t> </a:t>
+            </a:r>
+            <a:r>
+              <a:rPr lang="en-US" sz="2000" dirty="0">
+                <a:solidFill>
+                  <a:srgbClr val="666666"/>
+                </a:solidFill>
+                <a:latin typeface="Courier" pitchFamily="2" charset="0"/>
+              </a:rPr>
+              <a:t>=</a:t>
+            </a:r>
+            <a:r>
+              <a:rPr lang="en-US" sz="2000" dirty="0">
+                <a:solidFill>
+                  <a:prstClr val="black"/>
+                </a:solidFill>
+                <a:latin typeface="Courier" pitchFamily="2" charset="0"/>
+              </a:rPr>
+              <a:t> </a:t>
+            </a:r>
+            <a:r>
+              <a:rPr lang="en-US" sz="2000" dirty="0">
+                <a:solidFill>
+                  <a:srgbClr val="666666"/>
+                </a:solidFill>
+                <a:latin typeface="Courier" pitchFamily="2" charset="0"/>
+              </a:rPr>
+              <a:t>*</a:t>
+            </a:r>
+            <a:r>
+              <a:rPr lang="en-US" sz="2000" dirty="0">
+                <a:solidFill>
+                  <a:prstClr val="black"/>
+                </a:solidFill>
+                <a:latin typeface="Courier" pitchFamily="2" charset="0"/>
+              </a:rPr>
+              <a:t>from</a:t>
+            </a:r>
+            <a:r>
+              <a:rPr lang="en-US" sz="2000" dirty="0">
+                <a:solidFill>
+                  <a:srgbClr val="666666"/>
+                </a:solidFill>
+                <a:latin typeface="Courier" pitchFamily="2" charset="0"/>
+              </a:rPr>
+              <a:t>++</a:t>
+            </a:r>
+            <a:r>
+              <a:rPr lang="en-US" sz="2000" dirty="0">
+                <a:solidFill>
+                  <a:prstClr val="black"/>
+                </a:solidFill>
+                <a:latin typeface="Courier" pitchFamily="2" charset="0"/>
+              </a:rPr>
+              <a:t>;  </a:t>
+            </a:r>
+          </a:p>
+          <a:p>
+            <a:r>
+              <a:rPr lang="en-US" sz="2000" b="1" dirty="0">
+                <a:solidFill>
+                  <a:prstClr val="black"/>
+                </a:solidFill>
+                <a:latin typeface="Courier" pitchFamily="2" charset="0"/>
+              </a:rPr>
+              <a:t>	</a:t>
+            </a:r>
+            <a:r>
+              <a:rPr lang="en-US" sz="2000" b="1" dirty="0">
+                <a:solidFill>
+                  <a:srgbClr val="008000"/>
+                </a:solidFill>
+                <a:latin typeface="Courier-Bold" pitchFamily="2" charset="0"/>
+              </a:rPr>
+              <a:t>case</a:t>
+            </a:r>
+            <a:r>
+              <a:rPr lang="en-US" sz="2000" dirty="0">
+                <a:solidFill>
+                  <a:prstClr val="black"/>
+                </a:solidFill>
+                <a:latin typeface="Courier" pitchFamily="2" charset="0"/>
+              </a:rPr>
+              <a:t> </a:t>
+            </a:r>
+            <a:r>
+              <a:rPr lang="en-US" sz="2000" dirty="0">
+                <a:solidFill>
+                  <a:srgbClr val="666666"/>
+                </a:solidFill>
+                <a:latin typeface="Courier" pitchFamily="2" charset="0"/>
+              </a:rPr>
+              <a:t>5:</a:t>
+            </a:r>
+            <a:r>
+              <a:rPr lang="en-US" sz="2000" dirty="0">
+                <a:solidFill>
+                  <a:prstClr val="black"/>
+                </a:solidFill>
+                <a:latin typeface="Courier" pitchFamily="2" charset="0"/>
+              </a:rPr>
+              <a:t>      </a:t>
+            </a:r>
+            <a:r>
+              <a:rPr lang="en-US" sz="2000" dirty="0">
+                <a:solidFill>
+                  <a:srgbClr val="666666"/>
+                </a:solidFill>
+                <a:latin typeface="Courier" pitchFamily="2" charset="0"/>
+              </a:rPr>
+              <a:t>*</a:t>
+            </a:r>
+            <a:r>
+              <a:rPr lang="en-US" sz="2000" dirty="0">
+                <a:solidFill>
+                  <a:prstClr val="black"/>
+                </a:solidFill>
+                <a:latin typeface="Courier" pitchFamily="2" charset="0"/>
+              </a:rPr>
+              <a:t>to</a:t>
+            </a:r>
+            <a:r>
+              <a:rPr lang="en-US" sz="2000" dirty="0">
+                <a:solidFill>
+                  <a:srgbClr val="666666"/>
+                </a:solidFill>
+                <a:latin typeface="Courier" pitchFamily="2" charset="0"/>
+              </a:rPr>
+              <a:t>++</a:t>
+            </a:r>
+            <a:r>
+              <a:rPr lang="en-US" sz="2000" dirty="0">
+                <a:solidFill>
+                  <a:prstClr val="black"/>
+                </a:solidFill>
+                <a:latin typeface="Courier" pitchFamily="2" charset="0"/>
+              </a:rPr>
+              <a:t> </a:t>
+            </a:r>
+            <a:r>
+              <a:rPr lang="en-US" sz="2000" dirty="0">
+                <a:solidFill>
+                  <a:srgbClr val="666666"/>
+                </a:solidFill>
+                <a:latin typeface="Courier" pitchFamily="2" charset="0"/>
+              </a:rPr>
+              <a:t>=</a:t>
+            </a:r>
+            <a:r>
+              <a:rPr lang="en-US" sz="2000" dirty="0">
+                <a:solidFill>
+                  <a:prstClr val="black"/>
+                </a:solidFill>
+                <a:latin typeface="Courier" pitchFamily="2" charset="0"/>
+              </a:rPr>
+              <a:t> </a:t>
+            </a:r>
+            <a:r>
+              <a:rPr lang="en-US" sz="2000" dirty="0">
+                <a:solidFill>
+                  <a:srgbClr val="666666"/>
+                </a:solidFill>
+                <a:latin typeface="Courier" pitchFamily="2" charset="0"/>
+              </a:rPr>
+              <a:t>*</a:t>
+            </a:r>
+            <a:r>
+              <a:rPr lang="en-US" sz="2000" dirty="0">
+                <a:solidFill>
+                  <a:prstClr val="black"/>
+                </a:solidFill>
+                <a:latin typeface="Courier" pitchFamily="2" charset="0"/>
+              </a:rPr>
+              <a:t>from</a:t>
+            </a:r>
+            <a:r>
+              <a:rPr lang="en-US" sz="2000" dirty="0">
+                <a:solidFill>
+                  <a:srgbClr val="666666"/>
+                </a:solidFill>
+                <a:latin typeface="Courier" pitchFamily="2" charset="0"/>
+              </a:rPr>
+              <a:t>++</a:t>
+            </a:r>
+            <a:r>
+              <a:rPr lang="en-US" sz="2000" dirty="0">
+                <a:solidFill>
+                  <a:prstClr val="black"/>
+                </a:solidFill>
+                <a:latin typeface="Courier" pitchFamily="2" charset="0"/>
+              </a:rPr>
+              <a:t>;  </a:t>
+            </a:r>
+          </a:p>
+          <a:p>
+            <a:r>
+              <a:rPr lang="en-US" sz="2000" b="1" dirty="0">
+                <a:solidFill>
+                  <a:prstClr val="black"/>
+                </a:solidFill>
+                <a:latin typeface="Courier" pitchFamily="2" charset="0"/>
+              </a:rPr>
+              <a:t>	</a:t>
+            </a:r>
+            <a:r>
+              <a:rPr lang="en-US" sz="2000" b="1" dirty="0">
+                <a:solidFill>
+                  <a:srgbClr val="008000"/>
+                </a:solidFill>
+                <a:latin typeface="Courier-Bold" pitchFamily="2" charset="0"/>
+              </a:rPr>
+              <a:t>case</a:t>
+            </a:r>
+            <a:r>
+              <a:rPr lang="en-US" sz="2000" dirty="0">
+                <a:solidFill>
+                  <a:prstClr val="black"/>
+                </a:solidFill>
+                <a:latin typeface="Courier" pitchFamily="2" charset="0"/>
+              </a:rPr>
+              <a:t> </a:t>
+            </a:r>
+            <a:r>
+              <a:rPr lang="en-US" sz="2000" dirty="0">
+                <a:solidFill>
+                  <a:srgbClr val="666666"/>
+                </a:solidFill>
+                <a:latin typeface="Courier" pitchFamily="2" charset="0"/>
+              </a:rPr>
+              <a:t>4:</a:t>
+            </a:r>
+            <a:r>
+              <a:rPr lang="en-US" sz="2000" dirty="0">
+                <a:solidFill>
+                  <a:prstClr val="black"/>
+                </a:solidFill>
+                <a:latin typeface="Courier" pitchFamily="2" charset="0"/>
+              </a:rPr>
+              <a:t>      </a:t>
+            </a:r>
+            <a:r>
+              <a:rPr lang="en-US" sz="2000" dirty="0">
+                <a:solidFill>
+                  <a:srgbClr val="666666"/>
+                </a:solidFill>
+                <a:latin typeface="Courier" pitchFamily="2" charset="0"/>
+              </a:rPr>
+              <a:t>*</a:t>
+            </a:r>
+            <a:r>
+              <a:rPr lang="en-US" sz="2000" dirty="0">
+                <a:solidFill>
+                  <a:prstClr val="black"/>
+                </a:solidFill>
+                <a:latin typeface="Courier" pitchFamily="2" charset="0"/>
+              </a:rPr>
+              <a:t>to</a:t>
+            </a:r>
+            <a:r>
+              <a:rPr lang="en-US" sz="2000" dirty="0">
+                <a:solidFill>
+                  <a:srgbClr val="666666"/>
+                </a:solidFill>
+                <a:latin typeface="Courier" pitchFamily="2" charset="0"/>
+              </a:rPr>
+              <a:t>++</a:t>
+            </a:r>
+            <a:r>
+              <a:rPr lang="en-US" sz="2000" dirty="0">
+                <a:solidFill>
+                  <a:prstClr val="black"/>
+                </a:solidFill>
+                <a:latin typeface="Courier" pitchFamily="2" charset="0"/>
+              </a:rPr>
+              <a:t> </a:t>
+            </a:r>
+            <a:r>
+              <a:rPr lang="en-US" sz="2000" dirty="0">
+                <a:solidFill>
+                  <a:srgbClr val="666666"/>
+                </a:solidFill>
+                <a:latin typeface="Courier" pitchFamily="2" charset="0"/>
+              </a:rPr>
+              <a:t>=</a:t>
+            </a:r>
+            <a:r>
+              <a:rPr lang="en-US" sz="2000" dirty="0">
+                <a:solidFill>
+                  <a:prstClr val="black"/>
+                </a:solidFill>
+                <a:latin typeface="Courier" pitchFamily="2" charset="0"/>
+              </a:rPr>
+              <a:t> </a:t>
+            </a:r>
+            <a:r>
+              <a:rPr lang="en-US" sz="2000" dirty="0">
+                <a:solidFill>
+                  <a:srgbClr val="666666"/>
+                </a:solidFill>
+                <a:latin typeface="Courier" pitchFamily="2" charset="0"/>
+              </a:rPr>
+              <a:t>*</a:t>
+            </a:r>
+            <a:r>
+              <a:rPr lang="en-US" sz="2000" dirty="0">
+                <a:solidFill>
+                  <a:prstClr val="black"/>
+                </a:solidFill>
+                <a:latin typeface="Courier" pitchFamily="2" charset="0"/>
+              </a:rPr>
+              <a:t>from</a:t>
+            </a:r>
+            <a:r>
+              <a:rPr lang="en-US" sz="2000" dirty="0">
+                <a:solidFill>
+                  <a:srgbClr val="666666"/>
+                </a:solidFill>
+                <a:latin typeface="Courier" pitchFamily="2" charset="0"/>
+              </a:rPr>
+              <a:t>++</a:t>
+            </a:r>
+            <a:r>
+              <a:rPr lang="en-US" sz="2000" dirty="0">
+                <a:solidFill>
+                  <a:prstClr val="black"/>
+                </a:solidFill>
+                <a:latin typeface="Courier" pitchFamily="2" charset="0"/>
+              </a:rPr>
+              <a:t>;  </a:t>
+            </a:r>
+          </a:p>
+          <a:p>
+            <a:r>
+              <a:rPr lang="en-US" sz="2000" b="1" dirty="0">
+                <a:solidFill>
+                  <a:prstClr val="black"/>
+                </a:solidFill>
+                <a:latin typeface="Courier" pitchFamily="2" charset="0"/>
+              </a:rPr>
+              <a:t>	</a:t>
+            </a:r>
+            <a:r>
+              <a:rPr lang="en-US" sz="2000" b="1" dirty="0">
+                <a:solidFill>
+                  <a:srgbClr val="008000"/>
+                </a:solidFill>
+                <a:latin typeface="Courier-Bold" pitchFamily="2" charset="0"/>
+              </a:rPr>
+              <a:t>case</a:t>
+            </a:r>
+            <a:r>
+              <a:rPr lang="en-US" sz="2000" dirty="0">
+                <a:solidFill>
+                  <a:prstClr val="black"/>
+                </a:solidFill>
+                <a:latin typeface="Courier" pitchFamily="2" charset="0"/>
+              </a:rPr>
+              <a:t> </a:t>
+            </a:r>
+            <a:r>
+              <a:rPr lang="en-US" sz="2000" dirty="0">
+                <a:solidFill>
+                  <a:srgbClr val="666666"/>
+                </a:solidFill>
+                <a:latin typeface="Courier" pitchFamily="2" charset="0"/>
+              </a:rPr>
+              <a:t>3:</a:t>
+            </a:r>
+            <a:r>
+              <a:rPr lang="en-US" sz="2000" dirty="0">
+                <a:solidFill>
+                  <a:prstClr val="black"/>
+                </a:solidFill>
+                <a:latin typeface="Courier" pitchFamily="2" charset="0"/>
+              </a:rPr>
+              <a:t>      </a:t>
+            </a:r>
+            <a:r>
+              <a:rPr lang="en-US" sz="2000" dirty="0">
+                <a:solidFill>
+                  <a:srgbClr val="666666"/>
+                </a:solidFill>
+                <a:latin typeface="Courier" pitchFamily="2" charset="0"/>
+              </a:rPr>
+              <a:t>*</a:t>
+            </a:r>
+            <a:r>
+              <a:rPr lang="en-US" sz="2000" dirty="0">
+                <a:solidFill>
+                  <a:prstClr val="black"/>
+                </a:solidFill>
+                <a:latin typeface="Courier" pitchFamily="2" charset="0"/>
+              </a:rPr>
+              <a:t>to</a:t>
+            </a:r>
+            <a:r>
+              <a:rPr lang="en-US" sz="2000" dirty="0">
+                <a:solidFill>
+                  <a:srgbClr val="666666"/>
+                </a:solidFill>
+                <a:latin typeface="Courier" pitchFamily="2" charset="0"/>
+              </a:rPr>
+              <a:t>++</a:t>
+            </a:r>
+            <a:r>
+              <a:rPr lang="en-US" sz="2000" dirty="0">
+                <a:solidFill>
+                  <a:prstClr val="black"/>
+                </a:solidFill>
+                <a:latin typeface="Courier" pitchFamily="2" charset="0"/>
+              </a:rPr>
+              <a:t> </a:t>
+            </a:r>
+            <a:r>
+              <a:rPr lang="en-US" sz="2000" dirty="0">
+                <a:solidFill>
+                  <a:srgbClr val="666666"/>
+                </a:solidFill>
+                <a:latin typeface="Courier" pitchFamily="2" charset="0"/>
+              </a:rPr>
+              <a:t>=</a:t>
+            </a:r>
+            <a:r>
+              <a:rPr lang="en-US" sz="2000" dirty="0">
+                <a:solidFill>
+                  <a:prstClr val="black"/>
+                </a:solidFill>
+                <a:latin typeface="Courier" pitchFamily="2" charset="0"/>
+              </a:rPr>
+              <a:t> </a:t>
+            </a:r>
+            <a:r>
+              <a:rPr lang="en-US" sz="2000" dirty="0">
+                <a:solidFill>
+                  <a:srgbClr val="666666"/>
+                </a:solidFill>
+                <a:latin typeface="Courier" pitchFamily="2" charset="0"/>
+              </a:rPr>
+              <a:t>*</a:t>
+            </a:r>
+            <a:r>
+              <a:rPr lang="en-US" sz="2000" dirty="0">
+                <a:solidFill>
+                  <a:prstClr val="black"/>
+                </a:solidFill>
+                <a:latin typeface="Courier" pitchFamily="2" charset="0"/>
+              </a:rPr>
+              <a:t>from</a:t>
+            </a:r>
+            <a:r>
+              <a:rPr lang="en-US" sz="2000" dirty="0">
+                <a:solidFill>
+                  <a:srgbClr val="666666"/>
+                </a:solidFill>
+                <a:latin typeface="Courier" pitchFamily="2" charset="0"/>
+              </a:rPr>
+              <a:t>++</a:t>
+            </a:r>
+            <a:r>
+              <a:rPr lang="en-US" sz="2000" dirty="0">
+                <a:solidFill>
+                  <a:prstClr val="black"/>
+                </a:solidFill>
+                <a:latin typeface="Courier" pitchFamily="2" charset="0"/>
+              </a:rPr>
+              <a:t>;  </a:t>
+            </a:r>
+          </a:p>
+          <a:p>
+            <a:r>
+              <a:rPr lang="en-US" sz="2000" b="1" dirty="0">
+                <a:solidFill>
+                  <a:prstClr val="black"/>
+                </a:solidFill>
+                <a:latin typeface="Courier" pitchFamily="2" charset="0"/>
+              </a:rPr>
+              <a:t>	</a:t>
+            </a:r>
+            <a:r>
+              <a:rPr lang="en-US" sz="2000" b="1" dirty="0">
+                <a:solidFill>
+                  <a:srgbClr val="008000"/>
+                </a:solidFill>
+                <a:latin typeface="Courier-Bold" pitchFamily="2" charset="0"/>
+              </a:rPr>
+              <a:t>case</a:t>
+            </a:r>
+            <a:r>
+              <a:rPr lang="en-US" sz="2000" dirty="0">
+                <a:solidFill>
+                  <a:prstClr val="black"/>
+                </a:solidFill>
+                <a:latin typeface="Courier" pitchFamily="2" charset="0"/>
+              </a:rPr>
+              <a:t> </a:t>
+            </a:r>
+            <a:r>
+              <a:rPr lang="en-US" sz="2000" dirty="0">
+                <a:solidFill>
+                  <a:srgbClr val="666666"/>
+                </a:solidFill>
+                <a:latin typeface="Courier" pitchFamily="2" charset="0"/>
+              </a:rPr>
+              <a:t>2:</a:t>
+            </a:r>
+            <a:r>
+              <a:rPr lang="en-US" sz="2000" dirty="0">
+                <a:solidFill>
+                  <a:prstClr val="black"/>
+                </a:solidFill>
+                <a:latin typeface="Courier" pitchFamily="2" charset="0"/>
+              </a:rPr>
+              <a:t>      </a:t>
+            </a:r>
+            <a:r>
+              <a:rPr lang="en-US" sz="2000" dirty="0">
+                <a:solidFill>
+                  <a:srgbClr val="666666"/>
+                </a:solidFill>
+                <a:latin typeface="Courier" pitchFamily="2" charset="0"/>
+              </a:rPr>
+              <a:t>*</a:t>
+            </a:r>
+            <a:r>
+              <a:rPr lang="en-US" sz="2000" dirty="0">
+                <a:solidFill>
+                  <a:prstClr val="black"/>
+                </a:solidFill>
+                <a:latin typeface="Courier" pitchFamily="2" charset="0"/>
+              </a:rPr>
+              <a:t>to</a:t>
+            </a:r>
+            <a:r>
+              <a:rPr lang="en-US" sz="2000" dirty="0">
+                <a:solidFill>
+                  <a:srgbClr val="666666"/>
+                </a:solidFill>
+                <a:latin typeface="Courier" pitchFamily="2" charset="0"/>
+              </a:rPr>
+              <a:t>++</a:t>
+            </a:r>
+            <a:r>
+              <a:rPr lang="en-US" sz="2000" dirty="0">
+                <a:solidFill>
+                  <a:prstClr val="black"/>
+                </a:solidFill>
+                <a:latin typeface="Courier" pitchFamily="2" charset="0"/>
+              </a:rPr>
+              <a:t> </a:t>
+            </a:r>
+            <a:r>
+              <a:rPr lang="en-US" sz="2000" dirty="0">
+                <a:solidFill>
+                  <a:srgbClr val="666666"/>
+                </a:solidFill>
+                <a:latin typeface="Courier" pitchFamily="2" charset="0"/>
+              </a:rPr>
+              <a:t>=</a:t>
+            </a:r>
+            <a:r>
+              <a:rPr lang="en-US" sz="2000" dirty="0">
+                <a:solidFill>
+                  <a:prstClr val="black"/>
+                </a:solidFill>
+                <a:latin typeface="Courier" pitchFamily="2" charset="0"/>
+              </a:rPr>
+              <a:t> </a:t>
+            </a:r>
+            <a:r>
+              <a:rPr lang="en-US" sz="2000" dirty="0">
+                <a:solidFill>
+                  <a:srgbClr val="666666"/>
+                </a:solidFill>
+                <a:latin typeface="Courier" pitchFamily="2" charset="0"/>
+              </a:rPr>
+              <a:t>*</a:t>
+            </a:r>
+            <a:r>
+              <a:rPr lang="en-US" sz="2000" dirty="0">
+                <a:solidFill>
+                  <a:prstClr val="black"/>
+                </a:solidFill>
+                <a:latin typeface="Courier" pitchFamily="2" charset="0"/>
+              </a:rPr>
+              <a:t>from</a:t>
+            </a:r>
+            <a:r>
+              <a:rPr lang="en-US" sz="2000" dirty="0">
+                <a:solidFill>
+                  <a:srgbClr val="666666"/>
+                </a:solidFill>
+                <a:latin typeface="Courier" pitchFamily="2" charset="0"/>
+              </a:rPr>
+              <a:t>++</a:t>
+            </a:r>
+            <a:r>
+              <a:rPr lang="en-US" sz="2000" dirty="0">
+                <a:solidFill>
+                  <a:prstClr val="black"/>
+                </a:solidFill>
+                <a:latin typeface="Courier" pitchFamily="2" charset="0"/>
+              </a:rPr>
+              <a:t>;  </a:t>
+            </a:r>
+          </a:p>
+          <a:p>
+            <a:r>
+              <a:rPr lang="en-US" sz="2000" b="1" dirty="0">
+                <a:solidFill>
+                  <a:prstClr val="black"/>
+                </a:solidFill>
+                <a:latin typeface="Courier" pitchFamily="2" charset="0"/>
+              </a:rPr>
+              <a:t>	</a:t>
+            </a:r>
+            <a:r>
+              <a:rPr lang="en-US" sz="2000" b="1" dirty="0">
+                <a:solidFill>
+                  <a:srgbClr val="008000"/>
+                </a:solidFill>
+                <a:latin typeface="Courier-Bold" pitchFamily="2" charset="0"/>
+              </a:rPr>
+              <a:t>case</a:t>
+            </a:r>
+            <a:r>
+              <a:rPr lang="en-US" sz="2000" dirty="0">
+                <a:solidFill>
+                  <a:prstClr val="black"/>
+                </a:solidFill>
+                <a:latin typeface="Courier" pitchFamily="2" charset="0"/>
+              </a:rPr>
+              <a:t> </a:t>
+            </a:r>
+            <a:r>
+              <a:rPr lang="en-US" sz="2000" dirty="0">
+                <a:solidFill>
+                  <a:srgbClr val="666666"/>
+                </a:solidFill>
+                <a:latin typeface="Courier" pitchFamily="2" charset="0"/>
+              </a:rPr>
+              <a:t>1:</a:t>
+            </a:r>
+            <a:r>
+              <a:rPr lang="en-US" sz="2000" dirty="0">
+                <a:solidFill>
+                  <a:prstClr val="black"/>
+                </a:solidFill>
+                <a:latin typeface="Courier" pitchFamily="2" charset="0"/>
+              </a:rPr>
+              <a:t>      </a:t>
+            </a:r>
+            <a:r>
+              <a:rPr lang="en-US" sz="2000" dirty="0">
+                <a:solidFill>
+                  <a:srgbClr val="666666"/>
+                </a:solidFill>
+                <a:latin typeface="Courier" pitchFamily="2" charset="0"/>
+              </a:rPr>
+              <a:t>*</a:t>
+            </a:r>
+            <a:r>
+              <a:rPr lang="en-US" sz="2000" dirty="0">
+                <a:solidFill>
+                  <a:prstClr val="black"/>
+                </a:solidFill>
+                <a:latin typeface="Courier" pitchFamily="2" charset="0"/>
+              </a:rPr>
+              <a:t>to</a:t>
+            </a:r>
+            <a:r>
+              <a:rPr lang="en-US" sz="2000" dirty="0">
+                <a:solidFill>
+                  <a:srgbClr val="666666"/>
+                </a:solidFill>
+                <a:latin typeface="Courier" pitchFamily="2" charset="0"/>
+              </a:rPr>
+              <a:t>++</a:t>
+            </a:r>
+            <a:r>
+              <a:rPr lang="en-US" sz="2000" dirty="0">
+                <a:solidFill>
+                  <a:prstClr val="black"/>
+                </a:solidFill>
+                <a:latin typeface="Courier" pitchFamily="2" charset="0"/>
+              </a:rPr>
+              <a:t> </a:t>
+            </a:r>
+            <a:r>
+              <a:rPr lang="en-US" sz="2000" dirty="0">
+                <a:solidFill>
+                  <a:srgbClr val="666666"/>
+                </a:solidFill>
+                <a:latin typeface="Courier" pitchFamily="2" charset="0"/>
+              </a:rPr>
+              <a:t>=</a:t>
+            </a:r>
+            <a:r>
+              <a:rPr lang="en-US" sz="2000" dirty="0">
+                <a:solidFill>
+                  <a:prstClr val="black"/>
+                </a:solidFill>
+                <a:latin typeface="Courier" pitchFamily="2" charset="0"/>
+              </a:rPr>
+              <a:t> </a:t>
+            </a:r>
+            <a:r>
+              <a:rPr lang="en-US" sz="2000" dirty="0">
+                <a:solidFill>
+                  <a:srgbClr val="666666"/>
+                </a:solidFill>
+                <a:latin typeface="Courier" pitchFamily="2" charset="0"/>
+              </a:rPr>
+              <a:t>*</a:t>
+            </a:r>
+            <a:r>
+              <a:rPr lang="en-US" sz="2000" dirty="0">
+                <a:solidFill>
+                  <a:prstClr val="black"/>
+                </a:solidFill>
+                <a:latin typeface="Courier" pitchFamily="2" charset="0"/>
+              </a:rPr>
+              <a:t>from</a:t>
+            </a:r>
+            <a:r>
+              <a:rPr lang="en-US" sz="2000" dirty="0">
+                <a:solidFill>
+                  <a:srgbClr val="666666"/>
+                </a:solidFill>
+                <a:latin typeface="Courier" pitchFamily="2" charset="0"/>
+              </a:rPr>
+              <a:t>++</a:t>
+            </a:r>
+            <a:r>
+              <a:rPr lang="en-US" sz="2000" dirty="0">
+                <a:solidFill>
+                  <a:prstClr val="black"/>
+                </a:solidFill>
+                <a:latin typeface="Courier" pitchFamily="2" charset="0"/>
+              </a:rPr>
+              <a:t>;</a:t>
+            </a:r>
+          </a:p>
+          <a:p>
+            <a:r>
+              <a:rPr lang="en-US" sz="2000" dirty="0">
+                <a:solidFill>
+                  <a:prstClr val="black"/>
+                </a:solidFill>
+                <a:latin typeface="Courier" pitchFamily="2" charset="0"/>
+              </a:rPr>
+              <a:t>		  } </a:t>
+            </a:r>
+            <a:r>
+              <a:rPr lang="en-US" sz="2000" b="1" dirty="0">
+                <a:solidFill>
+                  <a:srgbClr val="008000"/>
+                </a:solidFill>
+                <a:latin typeface="Courier-Bold" pitchFamily="2" charset="0"/>
+              </a:rPr>
               <a:t>while</a:t>
             </a:r>
             <a:r>
@@ -5444,7 +6522,7 @@
                 </a:solidFill>
                 <a:latin typeface="Courier" pitchFamily="2" charset="0"/>
               </a:rPr>
-              <a:t>(n</a:t>
+              <a:t>(--n </a:t>
             </a:r>
             <a:r>
               <a:rPr lang="en-US" sz="2000" dirty="0">
@@ -5453,7 +6531,7 @@
                 </a:solidFill>
                 <a:latin typeface="Courier" pitchFamily="2" charset="0"/>
               </a:rPr>
-              <a:t>--</a:t>
+              <a:t>&gt;</a:t>
             </a:r>
             <a:r>
               <a:rPr lang="en-US" sz="2000" dirty="0">
@@ -5471,7 +6549,7 @@
                 </a:solidFill>
                 <a:latin typeface="Courier" pitchFamily="2" charset="0"/>
               </a:rPr>
-              <a:t>&gt;</a:t>
+              <a:t>0</a:t>
             </a:r>
             <a:r>
               <a:rPr lang="en-US" sz="2000" dirty="0">
@@ -5480,1085 +6558,7 @@
                 </a:solidFill>
                 <a:latin typeface="Courier" pitchFamily="2" charset="0"/>
               </a:rPr>
-              <a:t> </a:t>
-            </a:r>
-            <a:r>
-              <a:rPr lang="en-US" sz="2000" dirty="0">
-                <a:solidFill>
-                  <a:srgbClr val="666666"/>
-                </a:solidFill>
-                <a:latin typeface="Courier" pitchFamily="2" charset="0"/>
-              </a:rPr>
-              <a:t>0</a:t>
-            </a:r>
-            <a:r>
-              <a:rPr lang="en-US" sz="2000" dirty="0">
-                <a:solidFill>
-                  <a:prstClr val="black"/>
-                </a:solidFill>
-                <a:latin typeface="Courier" pitchFamily="2" charset="0"/>
-              </a:rPr>
-              <a:t>) { </a:t>
-            </a:r>
-            <a:r>
-              <a:rPr lang="en-US" sz="2000" dirty="0">
-                <a:solidFill>
-                  <a:srgbClr val="666666"/>
-                </a:solidFill>
-                <a:latin typeface="Courier" pitchFamily="2" charset="0"/>
-              </a:rPr>
-              <a:t>*</a:t>
-            </a:r>
-            <a:r>
-              <a:rPr lang="en-US" sz="2000" dirty="0">
-                <a:solidFill>
-                  <a:prstClr val="black"/>
-                </a:solidFill>
-                <a:latin typeface="Courier" pitchFamily="2" charset="0"/>
-              </a:rPr>
-              <a:t>to</a:t>
-            </a:r>
-            <a:r>
-              <a:rPr lang="en-US" sz="2000" dirty="0">
-                <a:solidFill>
-                  <a:srgbClr val="666666"/>
-                </a:solidFill>
-                <a:latin typeface="Courier" pitchFamily="2" charset="0"/>
-              </a:rPr>
-              <a:t>++</a:t>
-            </a:r>
-            <a:r>
-              <a:rPr lang="en-US" sz="2000" dirty="0">
-                <a:solidFill>
-                  <a:prstClr val="black"/>
-                </a:solidFill>
-                <a:latin typeface="Courier" pitchFamily="2" charset="0"/>
-              </a:rPr>
-              <a:t> </a:t>
-            </a:r>
-            <a:r>
-              <a:rPr lang="en-US" sz="2000" dirty="0">
-                <a:solidFill>
-                  <a:srgbClr val="666666"/>
-                </a:solidFill>
-                <a:latin typeface="Courier" pitchFamily="2" charset="0"/>
-              </a:rPr>
-              <a:t>=</a:t>
-            </a:r>
-            <a:r>
-              <a:rPr lang="en-US" sz="2000" dirty="0">
-                <a:solidFill>
-                  <a:prstClr val="black"/>
-                </a:solidFill>
-                <a:latin typeface="Courier" pitchFamily="2" charset="0"/>
-              </a:rPr>
-              <a:t> </a:t>
-            </a:r>
-            <a:r>
-              <a:rPr lang="en-US" sz="2000" dirty="0">
-                <a:solidFill>
-                  <a:srgbClr val="666666"/>
-                </a:solidFill>
-                <a:latin typeface="Courier" pitchFamily="2" charset="0"/>
-              </a:rPr>
-              <a:t>*</a:t>
-            </a:r>
-            <a:r>
-              <a:rPr lang="en-US" sz="2000" dirty="0">
-                <a:solidFill>
-                  <a:prstClr val="black"/>
-                </a:solidFill>
-                <a:latin typeface="Courier" pitchFamily="2" charset="0"/>
-              </a:rPr>
-              <a:t>from</a:t>
-            </a:r>
-            <a:r>
-              <a:rPr lang="en-US" sz="2000" dirty="0">
-                <a:solidFill>
-                  <a:srgbClr val="666666"/>
-                </a:solidFill>
-                <a:latin typeface="Courier" pitchFamily="2" charset="0"/>
-              </a:rPr>
-              <a:t>++</a:t>
-            </a:r>
-            <a:r>
-              <a:rPr lang="en-US" sz="2000" dirty="0">
-                <a:solidFill>
-                  <a:prstClr val="black"/>
-                </a:solidFill>
-                <a:latin typeface="Courier" pitchFamily="2" charset="0"/>
-              </a:rPr>
-              <a:t>;  </a:t>
-            </a:r>
-          </a:p>
-          <a:p>
-            <a:r>
-              <a:rPr lang="en-US" sz="2000" b="1" dirty="0">
-                <a:solidFill>
-                  <a:prstClr val="black"/>
-                </a:solidFill>
-                <a:latin typeface="Courier" pitchFamily="2" charset="0"/>
-              </a:rPr>
-              <a:t>	</a:t>
-            </a:r>
-            <a:r>
-              <a:rPr lang="en-US" sz="2000" b="1" dirty="0">
-                <a:solidFill>
-                  <a:srgbClr val="008000"/>
-                </a:solidFill>
-                <a:latin typeface="Courier-Bold" pitchFamily="2" charset="0"/>
-              </a:rPr>
-              <a:t>case</a:t>
-            </a:r>
-            <a:r>
-              <a:rPr lang="en-US" sz="2000" dirty="0">
-                <a:solidFill>
-                  <a:prstClr val="black"/>
-                </a:solidFill>
-                <a:latin typeface="Courier" pitchFamily="2" charset="0"/>
-              </a:rPr>
-              <a:t> </a:t>
-            </a:r>
-            <a:r>
-              <a:rPr lang="en-US" sz="2000" dirty="0">
-                <a:solidFill>
-                  <a:srgbClr val="666666"/>
-                </a:solidFill>
-                <a:latin typeface="Courier" pitchFamily="2" charset="0"/>
-              </a:rPr>
-              <a:t>7:</a:t>
-            </a:r>
-            <a:r>
-              <a:rPr lang="en-US" sz="2000" dirty="0">
-                <a:solidFill>
-                  <a:prstClr val="black"/>
-                </a:solidFill>
-                <a:latin typeface="Courier" pitchFamily="2" charset="0"/>
-              </a:rPr>
-              <a:t>                  </a:t>
-            </a:r>
-            <a:r>
-              <a:rPr lang="en-US" sz="2000" dirty="0">
-                <a:solidFill>
-                  <a:srgbClr val="666666"/>
-                </a:solidFill>
-                <a:latin typeface="Courier" pitchFamily="2" charset="0"/>
-              </a:rPr>
-              <a:t>*</a:t>
-            </a:r>
-            <a:r>
-              <a:rPr lang="en-US" sz="2000" dirty="0">
-                <a:solidFill>
-                  <a:prstClr val="black"/>
-                </a:solidFill>
-                <a:latin typeface="Courier" pitchFamily="2" charset="0"/>
-              </a:rPr>
-              <a:t>to</a:t>
-            </a:r>
-            <a:r>
-              <a:rPr lang="en-US" sz="2000" dirty="0">
-                <a:solidFill>
-                  <a:srgbClr val="666666"/>
-                </a:solidFill>
-                <a:latin typeface="Courier" pitchFamily="2" charset="0"/>
-              </a:rPr>
-              <a:t>++</a:t>
-            </a:r>
-            <a:r>
-              <a:rPr lang="en-US" sz="2000" dirty="0">
-                <a:solidFill>
-                  <a:prstClr val="black"/>
-                </a:solidFill>
-                <a:latin typeface="Courier" pitchFamily="2" charset="0"/>
-              </a:rPr>
-              <a:t> </a:t>
-            </a:r>
-            <a:r>
-              <a:rPr lang="en-US" sz="2000" dirty="0">
-                <a:solidFill>
-                  <a:srgbClr val="666666"/>
-                </a:solidFill>
-                <a:latin typeface="Courier" pitchFamily="2" charset="0"/>
-              </a:rPr>
-              <a:t>=</a:t>
-            </a:r>
-            <a:r>
-              <a:rPr lang="en-US" sz="2000" dirty="0">
-                <a:solidFill>
-                  <a:prstClr val="black"/>
-                </a:solidFill>
-                <a:latin typeface="Courier" pitchFamily="2" charset="0"/>
-              </a:rPr>
-              <a:t> </a:t>
-            </a:r>
-            <a:r>
-              <a:rPr lang="en-US" sz="2000" dirty="0">
-                <a:solidFill>
-                  <a:srgbClr val="666666"/>
-                </a:solidFill>
-                <a:latin typeface="Courier" pitchFamily="2" charset="0"/>
-              </a:rPr>
-              <a:t>*</a:t>
-            </a:r>
-            <a:r>
-              <a:rPr lang="en-US" sz="2000" dirty="0">
-                <a:solidFill>
-                  <a:prstClr val="black"/>
-                </a:solidFill>
-                <a:latin typeface="Courier" pitchFamily="2" charset="0"/>
-              </a:rPr>
-              <a:t>from</a:t>
-            </a:r>
-            <a:r>
-              <a:rPr lang="en-US" sz="2000" dirty="0">
-                <a:solidFill>
-                  <a:srgbClr val="666666"/>
-                </a:solidFill>
-                <a:latin typeface="Courier" pitchFamily="2" charset="0"/>
-              </a:rPr>
-              <a:t>++</a:t>
-            </a:r>
-            <a:r>
-              <a:rPr lang="en-US" sz="2000" dirty="0">
-                <a:solidFill>
-                  <a:prstClr val="black"/>
-                </a:solidFill>
-                <a:latin typeface="Courier" pitchFamily="2" charset="0"/>
-              </a:rPr>
-              <a:t>;  </a:t>
-            </a:r>
-          </a:p>
-          <a:p>
-            <a:r>
-              <a:rPr lang="en-US" sz="2000" b="1" dirty="0">
-                <a:solidFill>
-                  <a:prstClr val="black"/>
-                </a:solidFill>
-                <a:latin typeface="Courier" pitchFamily="2" charset="0"/>
-              </a:rPr>
-              <a:t>	</a:t>
-            </a:r>
-            <a:r>
-              <a:rPr lang="en-US" sz="2000" b="1" dirty="0">
-                <a:solidFill>
-                  <a:srgbClr val="008000"/>
-                </a:solidFill>
-                <a:latin typeface="Courier-Bold" pitchFamily="2" charset="0"/>
-              </a:rPr>
-              <a:t>case</a:t>
-            </a:r>
-            <a:r>
-              <a:rPr lang="en-US" sz="2000" dirty="0">
-                <a:solidFill>
-                  <a:prstClr val="black"/>
-                </a:solidFill>
-                <a:latin typeface="Courier" pitchFamily="2" charset="0"/>
-              </a:rPr>
-              <a:t> </a:t>
-            </a:r>
-            <a:r>
-              <a:rPr lang="en-US" sz="2000" dirty="0">
-                <a:solidFill>
-                  <a:srgbClr val="666666"/>
-                </a:solidFill>
-                <a:latin typeface="Courier" pitchFamily="2" charset="0"/>
-              </a:rPr>
-              <a:t>6:</a:t>
-            </a:r>
-            <a:r>
-              <a:rPr lang="en-US" sz="2000" dirty="0">
-                <a:solidFill>
-                  <a:prstClr val="black"/>
-                </a:solidFill>
-                <a:latin typeface="Courier" pitchFamily="2" charset="0"/>
-              </a:rPr>
-              <a:t>                  </a:t>
-            </a:r>
-            <a:r>
-              <a:rPr lang="en-US" sz="2000" dirty="0">
-                <a:solidFill>
-                  <a:srgbClr val="666666"/>
-                </a:solidFill>
-                <a:latin typeface="Courier" pitchFamily="2" charset="0"/>
-              </a:rPr>
-              <a:t>*</a:t>
-            </a:r>
-            <a:r>
-              <a:rPr lang="en-US" sz="2000" dirty="0">
-                <a:solidFill>
-                  <a:prstClr val="black"/>
-                </a:solidFill>
-                <a:latin typeface="Courier" pitchFamily="2" charset="0"/>
-              </a:rPr>
-              <a:t>to</a:t>
-            </a:r>
-            <a:r>
-              <a:rPr lang="en-US" sz="2000" dirty="0">
-                <a:solidFill>
-                  <a:srgbClr val="666666"/>
-                </a:solidFill>
-                <a:latin typeface="Courier" pitchFamily="2" charset="0"/>
-              </a:rPr>
-              <a:t>++</a:t>
-            </a:r>
-            <a:r>
-              <a:rPr lang="en-US" sz="2000" dirty="0">
-                <a:solidFill>
-                  <a:prstClr val="black"/>
-                </a:solidFill>
-                <a:latin typeface="Courier" pitchFamily="2" charset="0"/>
-              </a:rPr>
-              <a:t> </a:t>
-            </a:r>
-            <a:r>
-              <a:rPr lang="en-US" sz="2000" dirty="0">
-                <a:solidFill>
-                  <a:srgbClr val="666666"/>
-                </a:solidFill>
-                <a:latin typeface="Courier" pitchFamily="2" charset="0"/>
-              </a:rPr>
-              <a:t>=</a:t>
-            </a:r>
-            <a:r>
-              <a:rPr lang="en-US" sz="2000" dirty="0">
-                <a:solidFill>
-                  <a:prstClr val="black"/>
-                </a:solidFill>
-                <a:latin typeface="Courier" pitchFamily="2" charset="0"/>
-              </a:rPr>
-              <a:t> </a:t>
-            </a:r>
-            <a:r>
-              <a:rPr lang="en-US" sz="2000" dirty="0">
-                <a:solidFill>
-                  <a:srgbClr val="666666"/>
-                </a:solidFill>
-                <a:latin typeface="Courier" pitchFamily="2" charset="0"/>
-              </a:rPr>
-              <a:t>*</a:t>
-            </a:r>
-            <a:r>
-              <a:rPr lang="en-US" sz="2000" dirty="0">
-                <a:solidFill>
-                  <a:prstClr val="black"/>
-                </a:solidFill>
-                <a:latin typeface="Courier" pitchFamily="2" charset="0"/>
-              </a:rPr>
-              <a:t>from</a:t>
-            </a:r>
-            <a:r>
-              <a:rPr lang="en-US" sz="2000" dirty="0">
-                <a:solidFill>
-                  <a:srgbClr val="666666"/>
-                </a:solidFill>
-                <a:latin typeface="Courier" pitchFamily="2" charset="0"/>
-              </a:rPr>
-              <a:t>++</a:t>
-            </a:r>
-            <a:r>
-              <a:rPr lang="en-US" sz="2000" dirty="0">
-                <a:solidFill>
-                  <a:prstClr val="black"/>
-                </a:solidFill>
-                <a:latin typeface="Courier" pitchFamily="2" charset="0"/>
-              </a:rPr>
-              <a:t>;  </a:t>
-            </a:r>
-          </a:p>
-          <a:p>
-            <a:r>
-              <a:rPr lang="en-US" sz="2000" b="1" dirty="0">
-                <a:solidFill>
-                  <a:prstClr val="black"/>
-                </a:solidFill>
-                <a:latin typeface="Courier" pitchFamily="2" charset="0"/>
-              </a:rPr>
-              <a:t>	</a:t>
-            </a:r>
-            <a:r>
-              <a:rPr lang="en-US" sz="2000" b="1" dirty="0">
-                <a:solidFill>
-                  <a:srgbClr val="008000"/>
-                </a:solidFill>
-                <a:latin typeface="Courier-Bold" pitchFamily="2" charset="0"/>
-              </a:rPr>
-              <a:t>case</a:t>
-            </a:r>
-            <a:r>
-              <a:rPr lang="en-US" sz="2000" dirty="0">
-                <a:solidFill>
-                  <a:prstClr val="black"/>
-                </a:solidFill>
-                <a:latin typeface="Courier" pitchFamily="2" charset="0"/>
-              </a:rPr>
-              <a:t> </a:t>
-            </a:r>
-            <a:r>
-              <a:rPr lang="en-US" sz="2000" dirty="0">
-                <a:solidFill>
-                  <a:srgbClr val="666666"/>
-                </a:solidFill>
-                <a:latin typeface="Courier" pitchFamily="2" charset="0"/>
-              </a:rPr>
-              <a:t>5:</a:t>
-            </a:r>
-            <a:r>
-              <a:rPr lang="en-US" sz="2000" dirty="0">
-                <a:solidFill>
-                  <a:prstClr val="black"/>
-                </a:solidFill>
-                <a:latin typeface="Courier" pitchFamily="2" charset="0"/>
-              </a:rPr>
-              <a:t>                  </a:t>
-            </a:r>
-            <a:r>
-              <a:rPr lang="en-US" sz="2000" dirty="0">
-                <a:solidFill>
-                  <a:srgbClr val="666666"/>
-                </a:solidFill>
-                <a:latin typeface="Courier" pitchFamily="2" charset="0"/>
-              </a:rPr>
-              <a:t>*</a:t>
-            </a:r>
-            <a:r>
-              <a:rPr lang="en-US" sz="2000" dirty="0">
-                <a:solidFill>
-                  <a:prstClr val="black"/>
-                </a:solidFill>
-                <a:latin typeface="Courier" pitchFamily="2" charset="0"/>
-              </a:rPr>
-              <a:t>to</a:t>
-            </a:r>
-            <a:r>
-              <a:rPr lang="en-US" sz="2000" dirty="0">
-                <a:solidFill>
-                  <a:srgbClr val="666666"/>
-                </a:solidFill>
-                <a:latin typeface="Courier" pitchFamily="2" charset="0"/>
-              </a:rPr>
-              <a:t>++</a:t>
-            </a:r>
-            <a:r>
-              <a:rPr lang="en-US" sz="2000" dirty="0">
-                <a:solidFill>
-                  <a:prstClr val="black"/>
-                </a:solidFill>
-                <a:latin typeface="Courier" pitchFamily="2" charset="0"/>
-              </a:rPr>
-              <a:t> </a:t>
-            </a:r>
-            <a:r>
-              <a:rPr lang="en-US" sz="2000" dirty="0">
-                <a:solidFill>
-                  <a:srgbClr val="666666"/>
-                </a:solidFill>
-                <a:latin typeface="Courier" pitchFamily="2" charset="0"/>
-              </a:rPr>
-              <a:t>=</a:t>
-            </a:r>
-            <a:r>
-              <a:rPr lang="en-US" sz="2000" dirty="0">
-                <a:solidFill>
-                  <a:prstClr val="black"/>
-                </a:solidFill>
-                <a:latin typeface="Courier" pitchFamily="2" charset="0"/>
-              </a:rPr>
-              <a:t> </a:t>
-            </a:r>
-            <a:r>
-              <a:rPr lang="en-US" sz="2000" dirty="0">
-                <a:solidFill>
-                  <a:srgbClr val="666666"/>
-                </a:solidFill>
-                <a:latin typeface="Courier" pitchFamily="2" charset="0"/>
-              </a:rPr>
-              <a:t>*</a:t>
-            </a:r>
-            <a:r>
-              <a:rPr lang="en-US" sz="2000" dirty="0">
-                <a:solidFill>
-                  <a:prstClr val="black"/>
-                </a:solidFill>
-                <a:latin typeface="Courier" pitchFamily="2" charset="0"/>
-              </a:rPr>
-              <a:t>from</a:t>
-            </a:r>
-            <a:r>
-              <a:rPr lang="en-US" sz="2000" dirty="0">
-                <a:solidFill>
-                  <a:srgbClr val="666666"/>
-                </a:solidFill>
-                <a:latin typeface="Courier" pitchFamily="2" charset="0"/>
-              </a:rPr>
-              <a:t>++</a:t>
-            </a:r>
-            <a:r>
-              <a:rPr lang="en-US" sz="2000" dirty="0">
-                <a:solidFill>
-                  <a:prstClr val="black"/>
-                </a:solidFill>
-                <a:latin typeface="Courier" pitchFamily="2" charset="0"/>
-              </a:rPr>
-              <a:t>;  </a:t>
-            </a:r>
-          </a:p>
-          <a:p>
-            <a:r>
-              <a:rPr lang="en-US" sz="2000" b="1" dirty="0">
-                <a:solidFill>
-                  <a:prstClr val="black"/>
-                </a:solidFill>
-                <a:latin typeface="Courier" pitchFamily="2" charset="0"/>
-              </a:rPr>
-              <a:t>	</a:t>
-            </a:r>
-            <a:r>
-              <a:rPr lang="en-US" sz="2000" b="1" dirty="0">
-                <a:solidFill>
-                  <a:srgbClr val="008000"/>
-                </a:solidFill>
-                <a:latin typeface="Courier-Bold" pitchFamily="2" charset="0"/>
-              </a:rPr>
-              <a:t>case</a:t>
-            </a:r>
-            <a:r>
-              <a:rPr lang="en-US" sz="2000" dirty="0">
-                <a:solidFill>
-                  <a:prstClr val="black"/>
-                </a:solidFill>
-                <a:latin typeface="Courier" pitchFamily="2" charset="0"/>
-              </a:rPr>
-              <a:t> </a:t>
-            </a:r>
-            <a:r>
-              <a:rPr lang="en-US" sz="2000" dirty="0">
-                <a:solidFill>
-                  <a:srgbClr val="666666"/>
-                </a:solidFill>
-                <a:latin typeface="Courier" pitchFamily="2" charset="0"/>
-              </a:rPr>
-              <a:t>4:</a:t>
-            </a:r>
-            <a:r>
-              <a:rPr lang="en-US" sz="2000" dirty="0">
-                <a:solidFill>
-                  <a:prstClr val="black"/>
-                </a:solidFill>
-                <a:latin typeface="Courier" pitchFamily="2" charset="0"/>
-              </a:rPr>
-              <a:t>                  </a:t>
-            </a:r>
-            <a:r>
-              <a:rPr lang="en-US" sz="2000" dirty="0">
-                <a:solidFill>
-                  <a:srgbClr val="666666"/>
-                </a:solidFill>
-                <a:latin typeface="Courier" pitchFamily="2" charset="0"/>
-              </a:rPr>
-              <a:t>*</a:t>
-            </a:r>
-            <a:r>
-              <a:rPr lang="en-US" sz="2000" dirty="0">
-                <a:solidFill>
-                  <a:prstClr val="black"/>
-                </a:solidFill>
-                <a:latin typeface="Courier" pitchFamily="2" charset="0"/>
-              </a:rPr>
-              <a:t>to</a:t>
-            </a:r>
-            <a:r>
-              <a:rPr lang="en-US" sz="2000" dirty="0">
-                <a:solidFill>
-                  <a:srgbClr val="666666"/>
-                </a:solidFill>
-                <a:latin typeface="Courier" pitchFamily="2" charset="0"/>
-              </a:rPr>
-              <a:t>++</a:t>
-            </a:r>
-            <a:r>
-              <a:rPr lang="en-US" sz="2000" dirty="0">
-                <a:solidFill>
-                  <a:prstClr val="black"/>
-                </a:solidFill>
-                <a:latin typeface="Courier" pitchFamily="2" charset="0"/>
-              </a:rPr>
-              <a:t> </a:t>
-            </a:r>
-            <a:r>
-              <a:rPr lang="en-US" sz="2000" dirty="0">
-                <a:solidFill>
-                  <a:srgbClr val="666666"/>
-                </a:solidFill>
-                <a:latin typeface="Courier" pitchFamily="2" charset="0"/>
-              </a:rPr>
-              <a:t>=</a:t>
-            </a:r>
-            <a:r>
-              <a:rPr lang="en-US" sz="2000" dirty="0">
-                <a:solidFill>
-                  <a:prstClr val="black"/>
-                </a:solidFill>
-                <a:latin typeface="Courier" pitchFamily="2" charset="0"/>
-              </a:rPr>
-              <a:t> </a:t>
-            </a:r>
-            <a:r>
-              <a:rPr lang="en-US" sz="2000" dirty="0">
-                <a:solidFill>
-                  <a:srgbClr val="666666"/>
-                </a:solidFill>
-                <a:latin typeface="Courier" pitchFamily="2" charset="0"/>
-              </a:rPr>
-              <a:t>*</a:t>
-            </a:r>
-            <a:r>
-              <a:rPr lang="en-US" sz="2000" dirty="0">
-                <a:solidFill>
-                  <a:prstClr val="black"/>
-                </a:solidFill>
-                <a:latin typeface="Courier" pitchFamily="2" charset="0"/>
-              </a:rPr>
-              <a:t>from</a:t>
-            </a:r>
-            <a:r>
-              <a:rPr lang="en-US" sz="2000" dirty="0">
-                <a:solidFill>
-                  <a:srgbClr val="666666"/>
-                </a:solidFill>
-                <a:latin typeface="Courier" pitchFamily="2" charset="0"/>
-              </a:rPr>
-              <a:t>++</a:t>
-            </a:r>
-            <a:r>
-              <a:rPr lang="en-US" sz="2000" dirty="0">
-                <a:solidFill>
-                  <a:prstClr val="black"/>
-                </a:solidFill>
-                <a:latin typeface="Courier" pitchFamily="2" charset="0"/>
-              </a:rPr>
-              <a:t>;  </a:t>
-            </a:r>
-          </a:p>
-          <a:p>
-            <a:r>
-              <a:rPr lang="en-US" sz="2000" b="1" dirty="0">
-                <a:solidFill>
-                  <a:prstClr val="black"/>
-                </a:solidFill>
-                <a:latin typeface="Courier" pitchFamily="2" charset="0"/>
-              </a:rPr>
-              <a:t>	</a:t>
-            </a:r>
-            <a:r>
-              <a:rPr lang="en-US" sz="2000" b="1" dirty="0">
-                <a:solidFill>
-                  <a:srgbClr val="008000"/>
-                </a:solidFill>
-                <a:latin typeface="Courier-Bold" pitchFamily="2" charset="0"/>
-              </a:rPr>
-              <a:t>case</a:t>
-            </a:r>
-            <a:r>
-              <a:rPr lang="en-US" sz="2000" dirty="0">
-                <a:solidFill>
-                  <a:prstClr val="black"/>
-                </a:solidFill>
-                <a:latin typeface="Courier" pitchFamily="2" charset="0"/>
-              </a:rPr>
-              <a:t> </a:t>
-            </a:r>
-            <a:r>
-              <a:rPr lang="en-US" sz="2000" dirty="0">
-                <a:solidFill>
-                  <a:srgbClr val="666666"/>
-                </a:solidFill>
-                <a:latin typeface="Courier" pitchFamily="2" charset="0"/>
-              </a:rPr>
-              <a:t>3:</a:t>
-            </a:r>
-            <a:r>
-              <a:rPr lang="en-US" sz="2000" dirty="0">
-                <a:solidFill>
-                  <a:prstClr val="black"/>
-                </a:solidFill>
-                <a:latin typeface="Courier" pitchFamily="2" charset="0"/>
-              </a:rPr>
-              <a:t>                  </a:t>
-            </a:r>
-            <a:r>
-              <a:rPr lang="en-US" sz="2000" dirty="0">
-                <a:solidFill>
-                  <a:srgbClr val="666666"/>
-                </a:solidFill>
-                <a:latin typeface="Courier" pitchFamily="2" charset="0"/>
-              </a:rPr>
-              <a:t>*</a:t>
-            </a:r>
-            <a:r>
-              <a:rPr lang="en-US" sz="2000" dirty="0">
-                <a:solidFill>
-                  <a:prstClr val="black"/>
-                </a:solidFill>
-                <a:latin typeface="Courier" pitchFamily="2" charset="0"/>
-              </a:rPr>
-              <a:t>to</a:t>
-            </a:r>
-            <a:r>
-              <a:rPr lang="en-US" sz="2000" dirty="0">
-                <a:solidFill>
-                  <a:srgbClr val="666666"/>
-                </a:solidFill>
-                <a:latin typeface="Courier" pitchFamily="2" charset="0"/>
-              </a:rPr>
-              <a:t>++</a:t>
-            </a:r>
-            <a:r>
-              <a:rPr lang="en-US" sz="2000" dirty="0">
-                <a:solidFill>
-                  <a:prstClr val="black"/>
-                </a:solidFill>
-                <a:latin typeface="Courier" pitchFamily="2" charset="0"/>
-              </a:rPr>
-              <a:t> </a:t>
-            </a:r>
-            <a:r>
-              <a:rPr lang="en-US" sz="2000" dirty="0">
-                <a:solidFill>
-                  <a:srgbClr val="666666"/>
-                </a:solidFill>
-                <a:latin typeface="Courier" pitchFamily="2" charset="0"/>
-              </a:rPr>
-              <a:t>=</a:t>
-            </a:r>
-            <a:r>
-              <a:rPr lang="en-US" sz="2000" dirty="0">
-                <a:solidFill>
-                  <a:prstClr val="black"/>
-                </a:solidFill>
-                <a:latin typeface="Courier" pitchFamily="2" charset="0"/>
-              </a:rPr>
-              <a:t> </a:t>
-            </a:r>
-            <a:r>
-              <a:rPr lang="en-US" sz="2000" dirty="0">
-                <a:solidFill>
-                  <a:srgbClr val="666666"/>
-                </a:solidFill>
-                <a:latin typeface="Courier" pitchFamily="2" charset="0"/>
-              </a:rPr>
-              <a:t>*</a:t>
-            </a:r>
-            <a:r>
-              <a:rPr lang="en-US" sz="2000" dirty="0">
-                <a:solidFill>
-                  <a:prstClr val="black"/>
-                </a:solidFill>
-                <a:latin typeface="Courier" pitchFamily="2" charset="0"/>
-              </a:rPr>
-              <a:t>from</a:t>
-            </a:r>
-            <a:r>
-              <a:rPr lang="en-US" sz="2000" dirty="0">
-                <a:solidFill>
-                  <a:srgbClr val="666666"/>
-                </a:solidFill>
-                <a:latin typeface="Courier" pitchFamily="2" charset="0"/>
-              </a:rPr>
-              <a:t>++</a:t>
-            </a:r>
-            <a:r>
-              <a:rPr lang="en-US" sz="2000" dirty="0">
-                <a:solidFill>
-                  <a:prstClr val="black"/>
-                </a:solidFill>
-                <a:latin typeface="Courier" pitchFamily="2" charset="0"/>
-              </a:rPr>
-              <a:t>;  </a:t>
-            </a:r>
-          </a:p>
-          <a:p>
-            <a:r>
-              <a:rPr lang="en-US" sz="2000" b="1" dirty="0">
-                <a:solidFill>
-                  <a:prstClr val="black"/>
-                </a:solidFill>
-                <a:latin typeface="Courier" pitchFamily="2" charset="0"/>
-              </a:rPr>
-              <a:t>	</a:t>
-            </a:r>
-            <a:r>
-              <a:rPr lang="en-US" sz="2000" b="1" dirty="0">
-                <a:solidFill>
-                  <a:srgbClr val="008000"/>
-                </a:solidFill>
-                <a:latin typeface="Courier-Bold" pitchFamily="2" charset="0"/>
-              </a:rPr>
-              <a:t>case</a:t>
-            </a:r>
-            <a:r>
-              <a:rPr lang="en-US" sz="2000" dirty="0">
-                <a:solidFill>
-                  <a:prstClr val="black"/>
-                </a:solidFill>
-                <a:latin typeface="Courier" pitchFamily="2" charset="0"/>
-              </a:rPr>
-              <a:t> </a:t>
-            </a:r>
-            <a:r>
-              <a:rPr lang="en-US" sz="2000" dirty="0">
-                <a:solidFill>
-                  <a:srgbClr val="666666"/>
-                </a:solidFill>
-                <a:latin typeface="Courier" pitchFamily="2" charset="0"/>
-              </a:rPr>
-              <a:t>2:</a:t>
-            </a:r>
-            <a:r>
-              <a:rPr lang="en-US" sz="2000" dirty="0">
-                <a:solidFill>
-                  <a:prstClr val="black"/>
-                </a:solidFill>
-                <a:latin typeface="Courier" pitchFamily="2" charset="0"/>
-              </a:rPr>
-              <a:t>                  </a:t>
-            </a:r>
-            <a:r>
-              <a:rPr lang="en-US" sz="2000" dirty="0">
-                <a:solidFill>
-                  <a:srgbClr val="666666"/>
-                </a:solidFill>
-                <a:latin typeface="Courier" pitchFamily="2" charset="0"/>
-              </a:rPr>
-              <a:t>*</a:t>
-            </a:r>
-            <a:r>
-              <a:rPr lang="en-US" sz="2000" dirty="0">
-                <a:solidFill>
-                  <a:prstClr val="black"/>
-                </a:solidFill>
-                <a:latin typeface="Courier" pitchFamily="2" charset="0"/>
-              </a:rPr>
-              <a:t>to</a:t>
-            </a:r>
-            <a:r>
-              <a:rPr lang="en-US" sz="2000" dirty="0">
-                <a:solidFill>
-                  <a:srgbClr val="666666"/>
-                </a:solidFill>
-                <a:latin typeface="Courier" pitchFamily="2" charset="0"/>
-              </a:rPr>
-              <a:t>++</a:t>
-            </a:r>
-            <a:r>
-              <a:rPr lang="en-US" sz="2000" dirty="0">
-                <a:solidFill>
-                  <a:prstClr val="black"/>
-                </a:solidFill>
-                <a:latin typeface="Courier" pitchFamily="2" charset="0"/>
-              </a:rPr>
-              <a:t> </a:t>
-            </a:r>
-            <a:r>
-              <a:rPr lang="en-US" sz="2000" dirty="0">
-                <a:solidFill>
-                  <a:srgbClr val="666666"/>
-                </a:solidFill>
-                <a:latin typeface="Courier" pitchFamily="2" charset="0"/>
-              </a:rPr>
-              <a:t>=</a:t>
-            </a:r>
-            <a:r>
-              <a:rPr lang="en-US" sz="2000" dirty="0">
-                <a:solidFill>
-                  <a:prstClr val="black"/>
-                </a:solidFill>
-                <a:latin typeface="Courier" pitchFamily="2" charset="0"/>
-              </a:rPr>
-              <a:t> </a:t>
-            </a:r>
-            <a:r>
-              <a:rPr lang="en-US" sz="2000" dirty="0">
-                <a:solidFill>
-                  <a:srgbClr val="666666"/>
-                </a:solidFill>
-                <a:latin typeface="Courier" pitchFamily="2" charset="0"/>
-              </a:rPr>
-              <a:t>*</a:t>
-            </a:r>
-            <a:r>
-              <a:rPr lang="en-US" sz="2000" dirty="0">
-                <a:solidFill>
-                  <a:prstClr val="black"/>
-                </a:solidFill>
-                <a:latin typeface="Courier" pitchFamily="2" charset="0"/>
-              </a:rPr>
-              <a:t>from</a:t>
-            </a:r>
-            <a:r>
-              <a:rPr lang="en-US" sz="2000" dirty="0">
-                <a:solidFill>
-                  <a:srgbClr val="666666"/>
-                </a:solidFill>
-                <a:latin typeface="Courier" pitchFamily="2" charset="0"/>
-              </a:rPr>
-              <a:t>++</a:t>
-            </a:r>
-            <a:r>
-              <a:rPr lang="en-US" sz="2000" dirty="0">
-                <a:solidFill>
-                  <a:prstClr val="black"/>
-                </a:solidFill>
-                <a:latin typeface="Courier" pitchFamily="2" charset="0"/>
-              </a:rPr>
-              <a:t>;  </a:t>
-            </a:r>
-          </a:p>
-          <a:p>
-            <a:r>
-              <a:rPr lang="en-US" sz="2000" b="1" dirty="0">
-                <a:solidFill>
-                  <a:prstClr val="black"/>
-                </a:solidFill>
-                <a:latin typeface="Courier" pitchFamily="2" charset="0"/>
-              </a:rPr>
-              <a:t>	</a:t>
-            </a:r>
-            <a:r>
-              <a:rPr lang="en-US" sz="2000" b="1" dirty="0">
-                <a:solidFill>
-                  <a:srgbClr val="008000"/>
-                </a:solidFill>
-                <a:latin typeface="Courier-Bold" pitchFamily="2" charset="0"/>
-              </a:rPr>
-              <a:t>case</a:t>
-            </a:r>
-            <a:r>
-              <a:rPr lang="en-US" sz="2000" dirty="0">
-                <a:solidFill>
-                  <a:prstClr val="black"/>
-                </a:solidFill>
-                <a:latin typeface="Courier" pitchFamily="2" charset="0"/>
-              </a:rPr>
-              <a:t> </a:t>
-            </a:r>
-            <a:r>
-              <a:rPr lang="en-US" sz="2000" dirty="0">
-                <a:solidFill>
-                  <a:srgbClr val="666666"/>
-                </a:solidFill>
-                <a:latin typeface="Courier" pitchFamily="2" charset="0"/>
-              </a:rPr>
-              <a:t>1:</a:t>
-            </a:r>
-            <a:r>
-              <a:rPr lang="en-US" sz="2000" dirty="0">
-                <a:solidFill>
-                  <a:prstClr val="black"/>
-                </a:solidFill>
-                <a:latin typeface="Courier" pitchFamily="2" charset="0"/>
-              </a:rPr>
-              <a:t>                  </a:t>
-            </a:r>
-            <a:r>
-              <a:rPr lang="en-US" sz="2000" dirty="0">
-                <a:solidFill>
-                  <a:srgbClr val="666666"/>
-                </a:solidFill>
-                <a:latin typeface="Courier" pitchFamily="2" charset="0"/>
-              </a:rPr>
-              <a:t>*</a:t>
-            </a:r>
-            <a:r>
-              <a:rPr lang="en-US" sz="2000" dirty="0">
-                <a:solidFill>
-                  <a:prstClr val="black"/>
-                </a:solidFill>
-                <a:latin typeface="Courier" pitchFamily="2" charset="0"/>
-              </a:rPr>
-              <a:t>to</a:t>
-            </a:r>
-            <a:r>
-              <a:rPr lang="en-US" sz="2000" dirty="0">
-                <a:solidFill>
-                  <a:srgbClr val="666666"/>
-                </a:solidFill>
-                <a:latin typeface="Courier" pitchFamily="2" charset="0"/>
-              </a:rPr>
-              <a:t>++</a:t>
-            </a:r>
-            <a:r>
-              <a:rPr lang="en-US" sz="2000" dirty="0">
-                <a:solidFill>
-                  <a:prstClr val="black"/>
-                </a:solidFill>
-                <a:latin typeface="Courier" pitchFamily="2" charset="0"/>
-              </a:rPr>
-              <a:t> </a:t>
-            </a:r>
-            <a:r>
-              <a:rPr lang="en-US" sz="2000" dirty="0">
-                <a:solidFill>
-                  <a:srgbClr val="666666"/>
-                </a:solidFill>
-                <a:latin typeface="Courier" pitchFamily="2" charset="0"/>
-              </a:rPr>
-              <a:t>=</a:t>
-            </a:r>
-            <a:r>
-              <a:rPr lang="en-US" sz="2000" dirty="0">
-                <a:solidFill>
-                  <a:prstClr val="black"/>
-                </a:solidFill>
-                <a:latin typeface="Courier" pitchFamily="2" charset="0"/>
-              </a:rPr>
-              <a:t> </a:t>
-            </a:r>
-            <a:r>
-              <a:rPr lang="en-US" sz="2000" dirty="0">
-                <a:solidFill>
-                  <a:srgbClr val="666666"/>
-                </a:solidFill>
-                <a:latin typeface="Courier" pitchFamily="2" charset="0"/>
-              </a:rPr>
-              <a:t>*</a:t>
-            </a:r>
-            <a:r>
-              <a:rPr lang="en-US" sz="2000" dirty="0">
-                <a:solidFill>
-                  <a:prstClr val="black"/>
-                </a:solidFill>
-                <a:latin typeface="Courier" pitchFamily="2" charset="0"/>
-              </a:rPr>
-              <a:t>from</a:t>
-            </a:r>
-            <a:r>
-              <a:rPr lang="en-US" sz="2000" dirty="0">
-                <a:solidFill>
-                  <a:srgbClr val="666666"/>
-                </a:solidFill>
-                <a:latin typeface="Courier" pitchFamily="2" charset="0"/>
-              </a:rPr>
-              <a:t>++</a:t>
-            </a:r>
-            <a:r>
-              <a:rPr lang="en-US" sz="2000" dirty="0">
-                <a:solidFill>
-                  <a:prstClr val="black"/>
-                </a:solidFill>
-                <a:latin typeface="Courier" pitchFamily="2" charset="0"/>
-              </a:rPr>
-              <a:t>;</a:t>
-            </a:r>
-          </a:p>
-          <a:p>
-            <a:r>
-              <a:rPr lang="en-US" sz="2000" dirty="0">
-                <a:solidFill>
-                  <a:prstClr val="black"/>
-                </a:solidFill>
-                <a:latin typeface="Courier" pitchFamily="2" charset="0"/>
-              </a:rPr>
-              <a:t>		  }  </a:t>
+              <a:t>);  </a:t>
             </a:r>
           </a:p>
           <a:p>

</xml_diff>